<commit_message>
CS220 lecture 15 and s3_backup.py
</commit_message>
<xml_diff>
--- a/tyler/meena/cs220/s20/materials/lec_15_S20.pptx
+++ b/tyler/meena/cs220/s20/materials/lec_15_S20.pptx
@@ -359,6 +359,11 @@
       </a:defRPr>
     </a:lvl9pPr>
   </p:defaultTextStyle>
+  <p:extLst>
+    <p:ext uri="{EFAFB233-063F-42B5-8137-9DF3F51BA10A}">
+      <p15:sldGuideLst xmlns:p15="http://schemas.microsoft.com/office/powerpoint/2012/main"/>
+    </p:ext>
+  </p:extLst>
 </p:presentation>
 </file>
 
@@ -2177,7 +2182,7 @@
           </a:ln>
           <a:extLst>
             <a:ext uri="{C572A759-6A51-4108-AA02-DFA0A04FC94B}">
-              <ma14:wrappingTextBoxFlag xmlns:ma14="http://schemas.microsoft.com/office/mac/drawingml/2011/main" xmlns:a14="http://schemas.microsoft.com/office/drawing/2010/main" xmlns:m="http://schemas.openxmlformats.org/officeDocument/2006/math" xmlns="" val="1"/>
+              <ma14:wrappingTextBoxFlag xmlns="" xmlns:m="http://schemas.openxmlformats.org/officeDocument/2006/math" xmlns:a14="http://schemas.microsoft.com/office/drawing/2010/main" xmlns:ma14="http://schemas.microsoft.com/office/mac/drawingml/2011/main" val="1"/>
             </a:ext>
           </a:extLst>
         </p:spPr>
@@ -2216,7 +2221,7 @@
           </a:ln>
           <a:extLst>
             <a:ext uri="{C572A759-6A51-4108-AA02-DFA0A04FC94B}">
-              <ma14:wrappingTextBoxFlag xmlns:ma14="http://schemas.microsoft.com/office/mac/drawingml/2011/main" xmlns:a14="http://schemas.microsoft.com/office/drawing/2010/main" xmlns:m="http://schemas.openxmlformats.org/officeDocument/2006/math" xmlns="" val="1"/>
+              <ma14:wrappingTextBoxFlag xmlns="" xmlns:m="http://schemas.openxmlformats.org/officeDocument/2006/math" xmlns:a14="http://schemas.microsoft.com/office/drawing/2010/main" xmlns:ma14="http://schemas.microsoft.com/office/mac/drawingml/2011/main" val="1"/>
             </a:ext>
           </a:extLst>
         </p:spPr>
@@ -3126,14 +3131,23 @@
               </a:spcBef>
             </a:pPr>
             <a:r>
-              <a:rPr lang="en-US" altLang="en-US" dirty="0"/>
+              <a:rPr lang="en-US" altLang="en-US" dirty="0">
+                <a:latin typeface="Calibri" panose="020F0502020204030204" pitchFamily="34" charset="0"/>
+                <a:cs typeface="Calibri" panose="020F0502020204030204" pitchFamily="34" charset="0"/>
+              </a:rPr>
               <a:t>Meena </a:t>
             </a:r>
             <a:r>
-              <a:rPr lang="en-US" altLang="en-US" dirty="0" err="1"/>
+              <a:rPr lang="en-US" altLang="en-US" dirty="0" err="1">
+                <a:latin typeface="Calibri" panose="020F0502020204030204" pitchFamily="34" charset="0"/>
+                <a:cs typeface="Calibri" panose="020F0502020204030204" pitchFamily="34" charset="0"/>
+              </a:rPr>
               <a:t>Syamkumar</a:t>
             </a:r>
-            <a:endParaRPr lang="en-US" altLang="en-US" dirty="0"/>
+            <a:endParaRPr lang="en-US" altLang="en-US" dirty="0">
+              <a:latin typeface="Calibri" panose="020F0502020204030204" pitchFamily="34" charset="0"/>
+              <a:cs typeface="Calibri" panose="020F0502020204030204" pitchFamily="34" charset="0"/>
+            </a:endParaRPr>
           </a:p>
           <a:p>
             <a:pPr>
@@ -3142,14 +3156,23 @@
               </a:spcBef>
             </a:pPr>
             <a:r>
-              <a:rPr lang="en-US" altLang="en-US" dirty="0"/>
+              <a:rPr lang="en-US" altLang="en-US" dirty="0">
+                <a:latin typeface="Calibri" panose="020F0502020204030204" pitchFamily="34" charset="0"/>
+                <a:cs typeface="Calibri" panose="020F0502020204030204" pitchFamily="34" charset="0"/>
+              </a:rPr>
               <a:t>Mike </a:t>
             </a:r>
             <a:r>
-              <a:rPr lang="en-US" altLang="en-US" dirty="0" err="1"/>
+              <a:rPr lang="en-US" altLang="en-US" dirty="0" err="1">
+                <a:latin typeface="Calibri" panose="020F0502020204030204" pitchFamily="34" charset="0"/>
+                <a:cs typeface="Calibri" panose="020F0502020204030204" pitchFamily="34" charset="0"/>
+              </a:rPr>
               <a:t>Doescher</a:t>
             </a:r>
-            <a:endParaRPr lang="en-US" altLang="en-US" dirty="0"/>
+            <a:endParaRPr lang="en-US" altLang="en-US" dirty="0">
+              <a:latin typeface="Calibri" panose="020F0502020204030204" pitchFamily="34" charset="0"/>
+              <a:cs typeface="Calibri" panose="020F0502020204030204" pitchFamily="34" charset="0"/>
+            </a:endParaRPr>
           </a:p>
         </p:txBody>
       </p:sp>
@@ -3436,7 +3459,7 @@
           </a:ln>
           <a:extLst>
             <a:ext uri="{C572A759-6A51-4108-AA02-DFA0A04FC94B}">
-              <ma14:wrappingTextBoxFlag xmlns:ma14="http://schemas.microsoft.com/office/mac/drawingml/2011/main" xmlns:a14="http://schemas.microsoft.com/office/drawing/2010/main" xmlns:m="http://schemas.openxmlformats.org/officeDocument/2006/math" xmlns="" val="1"/>
+              <ma14:wrappingTextBoxFlag xmlns="" xmlns:m="http://schemas.openxmlformats.org/officeDocument/2006/math" xmlns:a14="http://schemas.microsoft.com/office/drawing/2010/main" xmlns:ma14="http://schemas.microsoft.com/office/mac/drawingml/2011/main" val="1"/>
             </a:ext>
           </a:extLst>
         </p:spPr>
@@ -3492,7 +3515,7 @@
           </a:ln>
           <a:extLst>
             <a:ext uri="{C572A759-6A51-4108-AA02-DFA0A04FC94B}">
-              <ma14:wrappingTextBoxFlag xmlns:ma14="http://schemas.microsoft.com/office/mac/drawingml/2011/main" xmlns:a14="http://schemas.microsoft.com/office/drawing/2010/main" xmlns:m="http://schemas.openxmlformats.org/officeDocument/2006/math" xmlns="" val="1"/>
+              <ma14:wrappingTextBoxFlag xmlns="" xmlns:m="http://schemas.openxmlformats.org/officeDocument/2006/math" xmlns:a14="http://schemas.microsoft.com/office/drawing/2010/main" xmlns:ma14="http://schemas.microsoft.com/office/mac/drawingml/2011/main" val="1"/>
             </a:ext>
           </a:extLst>
         </p:spPr>
@@ -3648,7 +3671,7 @@
           </a:ln>
           <a:extLst>
             <a:ext uri="{C572A759-6A51-4108-AA02-DFA0A04FC94B}">
-              <ma14:wrappingTextBoxFlag xmlns:ma14="http://schemas.microsoft.com/office/mac/drawingml/2011/main" xmlns:a14="http://schemas.microsoft.com/office/drawing/2010/main" xmlns:m="http://schemas.openxmlformats.org/officeDocument/2006/math" xmlns="" val="1"/>
+              <ma14:wrappingTextBoxFlag xmlns="" xmlns:m="http://schemas.openxmlformats.org/officeDocument/2006/math" xmlns:a14="http://schemas.microsoft.com/office/drawing/2010/main" xmlns:ma14="http://schemas.microsoft.com/office/mac/drawingml/2011/main" val="1"/>
             </a:ext>
           </a:extLst>
         </p:spPr>
@@ -3717,7 +3740,7 @@
           </a:ln>
           <a:extLst>
             <a:ext uri="{C572A759-6A51-4108-AA02-DFA0A04FC94B}">
-              <ma14:wrappingTextBoxFlag xmlns:ma14="http://schemas.microsoft.com/office/mac/drawingml/2011/main" xmlns:a14="http://schemas.microsoft.com/office/drawing/2010/main" xmlns:m="http://schemas.openxmlformats.org/officeDocument/2006/math" xmlns="" val="1"/>
+              <ma14:wrappingTextBoxFlag xmlns="" xmlns:m="http://schemas.openxmlformats.org/officeDocument/2006/math" xmlns:a14="http://schemas.microsoft.com/office/drawing/2010/main" xmlns:ma14="http://schemas.microsoft.com/office/mac/drawingml/2011/main" val="1"/>
             </a:ext>
           </a:extLst>
         </p:spPr>
@@ -3873,7 +3896,7 @@
           </a:ln>
           <a:extLst>
             <a:ext uri="{C572A759-6A51-4108-AA02-DFA0A04FC94B}">
-              <ma14:wrappingTextBoxFlag xmlns:ma14="http://schemas.microsoft.com/office/mac/drawingml/2011/main" xmlns:a14="http://schemas.microsoft.com/office/drawing/2010/main" xmlns:m="http://schemas.openxmlformats.org/officeDocument/2006/math" xmlns="" val="1"/>
+              <ma14:wrappingTextBoxFlag xmlns="" xmlns:m="http://schemas.openxmlformats.org/officeDocument/2006/math" xmlns:a14="http://schemas.microsoft.com/office/drawing/2010/main" xmlns:ma14="http://schemas.microsoft.com/office/mac/drawingml/2011/main" val="1"/>
             </a:ext>
           </a:extLst>
         </p:spPr>
@@ -3955,7 +3978,7 @@
           </a:ln>
           <a:extLst>
             <a:ext uri="{C572A759-6A51-4108-AA02-DFA0A04FC94B}">
-              <ma14:wrappingTextBoxFlag xmlns:ma14="http://schemas.microsoft.com/office/mac/drawingml/2011/main" xmlns:a14="http://schemas.microsoft.com/office/drawing/2010/main" xmlns:m="http://schemas.openxmlformats.org/officeDocument/2006/math" xmlns="" val="1"/>
+              <ma14:wrappingTextBoxFlag xmlns="" xmlns:m="http://schemas.openxmlformats.org/officeDocument/2006/math" xmlns:a14="http://schemas.microsoft.com/office/drawing/2010/main" xmlns:ma14="http://schemas.microsoft.com/office/mac/drawingml/2011/main" val="1"/>
             </a:ext>
           </a:extLst>
         </p:spPr>
@@ -4111,7 +4134,7 @@
           </a:ln>
           <a:extLst>
             <a:ext uri="{C572A759-6A51-4108-AA02-DFA0A04FC94B}">
-              <ma14:wrappingTextBoxFlag xmlns:ma14="http://schemas.microsoft.com/office/mac/drawingml/2011/main" xmlns:a14="http://schemas.microsoft.com/office/drawing/2010/main" xmlns:m="http://schemas.openxmlformats.org/officeDocument/2006/math" xmlns="" val="1"/>
+              <ma14:wrappingTextBoxFlag xmlns="" xmlns:m="http://schemas.openxmlformats.org/officeDocument/2006/math" xmlns:a14="http://schemas.microsoft.com/office/drawing/2010/main" xmlns:ma14="http://schemas.microsoft.com/office/mac/drawingml/2011/main" val="1"/>
             </a:ext>
           </a:extLst>
         </p:spPr>
@@ -4206,7 +4229,7 @@
           </a:ln>
           <a:extLst>
             <a:ext uri="{C572A759-6A51-4108-AA02-DFA0A04FC94B}">
-              <ma14:wrappingTextBoxFlag xmlns:ma14="http://schemas.microsoft.com/office/mac/drawingml/2011/main" xmlns:a14="http://schemas.microsoft.com/office/drawing/2010/main" xmlns:m="http://schemas.openxmlformats.org/officeDocument/2006/math" xmlns="" val="1"/>
+              <ma14:wrappingTextBoxFlag xmlns="" xmlns:m="http://schemas.openxmlformats.org/officeDocument/2006/math" xmlns:a14="http://schemas.microsoft.com/office/drawing/2010/main" xmlns:ma14="http://schemas.microsoft.com/office/mac/drawingml/2011/main" val="1"/>
             </a:ext>
           </a:extLst>
         </p:spPr>
@@ -4362,7 +4385,7 @@
           </a:ln>
           <a:extLst>
             <a:ext uri="{C572A759-6A51-4108-AA02-DFA0A04FC94B}">
-              <ma14:wrappingTextBoxFlag xmlns:ma14="http://schemas.microsoft.com/office/mac/drawingml/2011/main" xmlns:a14="http://schemas.microsoft.com/office/drawing/2010/main" xmlns:m="http://schemas.openxmlformats.org/officeDocument/2006/math" xmlns="" val="1"/>
+              <ma14:wrappingTextBoxFlag xmlns="" xmlns:m="http://schemas.openxmlformats.org/officeDocument/2006/math" xmlns:a14="http://schemas.microsoft.com/office/drawing/2010/main" xmlns:ma14="http://schemas.microsoft.com/office/mac/drawingml/2011/main" val="1"/>
             </a:ext>
           </a:extLst>
         </p:spPr>
@@ -4572,7 +4595,7 @@
           </a:ln>
           <a:extLst>
             <a:ext uri="{C572A759-6A51-4108-AA02-DFA0A04FC94B}">
-              <ma14:wrappingTextBoxFlag xmlns:ma14="http://schemas.microsoft.com/office/mac/drawingml/2011/main" xmlns:a14="http://schemas.microsoft.com/office/drawing/2010/main" xmlns:m="http://schemas.openxmlformats.org/officeDocument/2006/math" xmlns="" val="1"/>
+              <ma14:wrappingTextBoxFlag xmlns="" xmlns:m="http://schemas.openxmlformats.org/officeDocument/2006/math" xmlns:a14="http://schemas.microsoft.com/office/drawing/2010/main" xmlns:ma14="http://schemas.microsoft.com/office/mac/drawingml/2011/main" val="1"/>
             </a:ext>
           </a:extLst>
         </p:spPr>
@@ -4728,7 +4751,7 @@
           </a:ln>
           <a:extLst>
             <a:ext uri="{C572A759-6A51-4108-AA02-DFA0A04FC94B}">
-              <ma14:wrappingTextBoxFlag xmlns:ma14="http://schemas.microsoft.com/office/mac/drawingml/2011/main" xmlns:a14="http://schemas.microsoft.com/office/drawing/2010/main" xmlns:m="http://schemas.openxmlformats.org/officeDocument/2006/math" xmlns="" val="1"/>
+              <ma14:wrappingTextBoxFlag xmlns="" xmlns:m="http://schemas.openxmlformats.org/officeDocument/2006/math" xmlns:a14="http://schemas.microsoft.com/office/drawing/2010/main" xmlns:ma14="http://schemas.microsoft.com/office/mac/drawingml/2011/main" val="1"/>
             </a:ext>
           </a:extLst>
         </p:spPr>
@@ -4772,7 +4795,7 @@
           </a:ln>
           <a:extLst>
             <a:ext uri="{C572A759-6A51-4108-AA02-DFA0A04FC94B}">
-              <ma14:wrappingTextBoxFlag xmlns:ma14="http://schemas.microsoft.com/office/mac/drawingml/2011/main" xmlns:a14="http://schemas.microsoft.com/office/drawing/2010/main" xmlns:m="http://schemas.openxmlformats.org/officeDocument/2006/math" xmlns="" val="1"/>
+              <ma14:wrappingTextBoxFlag xmlns="" xmlns:m="http://schemas.openxmlformats.org/officeDocument/2006/math" xmlns:a14="http://schemas.microsoft.com/office/drawing/2010/main" xmlns:ma14="http://schemas.microsoft.com/office/mac/drawingml/2011/main" val="1"/>
             </a:ext>
           </a:extLst>
         </p:spPr>
@@ -4936,7 +4959,7 @@
           </a:ln>
           <a:extLst>
             <a:ext uri="{C572A759-6A51-4108-AA02-DFA0A04FC94B}">
-              <ma14:wrappingTextBoxFlag xmlns:ma14="http://schemas.microsoft.com/office/mac/drawingml/2011/main" xmlns:a14="http://schemas.microsoft.com/office/drawing/2010/main" xmlns:m="http://schemas.openxmlformats.org/officeDocument/2006/math" xmlns="" val="1"/>
+              <ma14:wrappingTextBoxFlag xmlns="" xmlns:m="http://schemas.openxmlformats.org/officeDocument/2006/math" xmlns:a14="http://schemas.microsoft.com/office/drawing/2010/main" xmlns:ma14="http://schemas.microsoft.com/office/mac/drawingml/2011/main" val="1"/>
             </a:ext>
           </a:extLst>
         </p:spPr>
@@ -4980,7 +5003,7 @@
           </a:ln>
           <a:extLst>
             <a:ext uri="{C572A759-6A51-4108-AA02-DFA0A04FC94B}">
-              <ma14:wrappingTextBoxFlag xmlns:ma14="http://schemas.microsoft.com/office/mac/drawingml/2011/main" xmlns:a14="http://schemas.microsoft.com/office/drawing/2010/main" xmlns:m="http://schemas.openxmlformats.org/officeDocument/2006/math" xmlns="" val="1"/>
+              <ma14:wrappingTextBoxFlag xmlns="" xmlns:m="http://schemas.openxmlformats.org/officeDocument/2006/math" xmlns:a14="http://schemas.microsoft.com/office/drawing/2010/main" xmlns:ma14="http://schemas.microsoft.com/office/mac/drawingml/2011/main" val="1"/>
             </a:ext>
           </a:extLst>
         </p:spPr>
@@ -5112,7 +5135,7 @@
           </a:ln>
           <a:extLst>
             <a:ext uri="{C572A759-6A51-4108-AA02-DFA0A04FC94B}">
-              <ma14:wrappingTextBoxFlag xmlns:ma14="http://schemas.microsoft.com/office/mac/drawingml/2011/main" xmlns:a14="http://schemas.microsoft.com/office/drawing/2010/main" xmlns:m="http://schemas.openxmlformats.org/officeDocument/2006/math" xmlns="" val="1"/>
+              <ma14:wrappingTextBoxFlag xmlns="" xmlns:m="http://schemas.openxmlformats.org/officeDocument/2006/math" xmlns:a14="http://schemas.microsoft.com/office/drawing/2010/main" xmlns:ma14="http://schemas.microsoft.com/office/mac/drawingml/2011/main" val="1"/>
             </a:ext>
           </a:extLst>
         </p:spPr>
@@ -5219,7 +5242,7 @@
           </a:ln>
           <a:extLst>
             <a:ext uri="{C572A759-6A51-4108-AA02-DFA0A04FC94B}">
-              <ma14:wrappingTextBoxFlag xmlns:ma14="http://schemas.microsoft.com/office/mac/drawingml/2011/main" xmlns:a14="http://schemas.microsoft.com/office/drawing/2010/main" xmlns:m="http://schemas.openxmlformats.org/officeDocument/2006/math" xmlns="" val="1"/>
+              <ma14:wrappingTextBoxFlag xmlns="" xmlns:m="http://schemas.openxmlformats.org/officeDocument/2006/math" xmlns:a14="http://schemas.microsoft.com/office/drawing/2010/main" xmlns:ma14="http://schemas.microsoft.com/office/mac/drawingml/2011/main" val="1"/>
             </a:ext>
           </a:extLst>
         </p:spPr>
@@ -5387,7 +5410,7 @@
           </a:ln>
           <a:extLst>
             <a:ext uri="{C572A759-6A51-4108-AA02-DFA0A04FC94B}">
-              <ma14:wrappingTextBoxFlag xmlns:ma14="http://schemas.microsoft.com/office/mac/drawingml/2011/main" xmlns:a14="http://schemas.microsoft.com/office/drawing/2010/main" xmlns:m="http://schemas.openxmlformats.org/officeDocument/2006/math" xmlns="" val="1"/>
+              <ma14:wrappingTextBoxFlag xmlns="" xmlns:m="http://schemas.openxmlformats.org/officeDocument/2006/math" xmlns:a14="http://schemas.microsoft.com/office/drawing/2010/main" xmlns:ma14="http://schemas.microsoft.com/office/mac/drawingml/2011/main" val="1"/>
             </a:ext>
           </a:extLst>
         </p:spPr>
@@ -5434,7 +5457,7 @@
           </a:ln>
           <a:extLst>
             <a:ext uri="{C572A759-6A51-4108-AA02-DFA0A04FC94B}">
-              <ma14:wrappingTextBoxFlag xmlns:ma14="http://schemas.microsoft.com/office/mac/drawingml/2011/main" xmlns:a14="http://schemas.microsoft.com/office/drawing/2010/main" xmlns:m="http://schemas.openxmlformats.org/officeDocument/2006/math" xmlns="" val="1"/>
+              <ma14:wrappingTextBoxFlag xmlns="" xmlns:m="http://schemas.openxmlformats.org/officeDocument/2006/math" xmlns:a14="http://schemas.microsoft.com/office/drawing/2010/main" xmlns:ma14="http://schemas.microsoft.com/office/mac/drawingml/2011/main" val="1"/>
             </a:ext>
           </a:extLst>
         </p:spPr>
@@ -5554,7 +5577,7 @@
           </a:ln>
           <a:extLst>
             <a:ext uri="{C572A759-6A51-4108-AA02-DFA0A04FC94B}">
-              <ma14:wrappingTextBoxFlag xmlns:ma14="http://schemas.microsoft.com/office/mac/drawingml/2011/main" xmlns:a14="http://schemas.microsoft.com/office/drawing/2010/main" xmlns:m="http://schemas.openxmlformats.org/officeDocument/2006/math" xmlns="" val="1"/>
+              <ma14:wrappingTextBoxFlag xmlns="" xmlns:m="http://schemas.openxmlformats.org/officeDocument/2006/math" xmlns:a14="http://schemas.microsoft.com/office/drawing/2010/main" xmlns:ma14="http://schemas.microsoft.com/office/mac/drawingml/2011/main" val="1"/>
             </a:ext>
           </a:extLst>
         </p:spPr>
@@ -5610,7 +5633,7 @@
           </a:ln>
           <a:extLst>
             <a:ext uri="{C572A759-6A51-4108-AA02-DFA0A04FC94B}">
-              <ma14:wrappingTextBoxFlag xmlns:ma14="http://schemas.microsoft.com/office/mac/drawingml/2011/main" xmlns:a14="http://schemas.microsoft.com/office/drawing/2010/main" xmlns:m="http://schemas.openxmlformats.org/officeDocument/2006/math" xmlns="" val="1"/>
+              <ma14:wrappingTextBoxFlag xmlns="" xmlns:m="http://schemas.openxmlformats.org/officeDocument/2006/math" xmlns:a14="http://schemas.microsoft.com/office/drawing/2010/main" xmlns:ma14="http://schemas.microsoft.com/office/mac/drawingml/2011/main" val="1"/>
             </a:ext>
           </a:extLst>
         </p:spPr>
@@ -5787,7 +5810,7 @@
           </a:ln>
           <a:extLst>
             <a:ext uri="{C572A759-6A51-4108-AA02-DFA0A04FC94B}">
-              <ma14:wrappingTextBoxFlag xmlns:ma14="http://schemas.microsoft.com/office/mac/drawingml/2011/main" xmlns:a14="http://schemas.microsoft.com/office/drawing/2010/main" xmlns:m="http://schemas.openxmlformats.org/officeDocument/2006/math" xmlns="" val="1"/>
+              <ma14:wrappingTextBoxFlag xmlns="" xmlns:m="http://schemas.openxmlformats.org/officeDocument/2006/math" xmlns:a14="http://schemas.microsoft.com/office/drawing/2010/main" xmlns:ma14="http://schemas.microsoft.com/office/mac/drawingml/2011/main" val="1"/>
             </a:ext>
           </a:extLst>
         </p:spPr>
@@ -5955,7 +5978,7 @@
           </a:ln>
           <a:extLst>
             <a:ext uri="{C572A759-6A51-4108-AA02-DFA0A04FC94B}">
-              <ma14:wrappingTextBoxFlag xmlns:ma14="http://schemas.microsoft.com/office/mac/drawingml/2011/main" xmlns:a14="http://schemas.microsoft.com/office/drawing/2010/main" xmlns:m="http://schemas.openxmlformats.org/officeDocument/2006/math" xmlns="" val="1"/>
+              <ma14:wrappingTextBoxFlag xmlns="" xmlns:m="http://schemas.openxmlformats.org/officeDocument/2006/math" xmlns:a14="http://schemas.microsoft.com/office/drawing/2010/main" xmlns:ma14="http://schemas.microsoft.com/office/mac/drawingml/2011/main" val="1"/>
             </a:ext>
           </a:extLst>
         </p:spPr>
@@ -6049,7 +6072,7 @@
           </a:ln>
           <a:extLst>
             <a:ext uri="{C572A759-6A51-4108-AA02-DFA0A04FC94B}">
-              <ma14:wrappingTextBoxFlag xmlns:ma14="http://schemas.microsoft.com/office/mac/drawingml/2011/main" xmlns:a14="http://schemas.microsoft.com/office/drawing/2010/main" xmlns:m="http://schemas.openxmlformats.org/officeDocument/2006/math" xmlns="" val="1"/>
+              <ma14:wrappingTextBoxFlag xmlns="" xmlns:m="http://schemas.openxmlformats.org/officeDocument/2006/math" xmlns:a14="http://schemas.microsoft.com/office/drawing/2010/main" xmlns:ma14="http://schemas.microsoft.com/office/mac/drawingml/2011/main" val="1"/>
             </a:ext>
           </a:extLst>
         </p:spPr>
@@ -6111,7 +6134,7 @@
           </a:ln>
           <a:extLst>
             <a:ext uri="{C572A759-6A51-4108-AA02-DFA0A04FC94B}">
-              <ma14:wrappingTextBoxFlag xmlns:ma14="http://schemas.microsoft.com/office/mac/drawingml/2011/main" xmlns:a14="http://schemas.microsoft.com/office/drawing/2010/main" xmlns:m="http://schemas.openxmlformats.org/officeDocument/2006/math" xmlns="" val="1"/>
+              <ma14:wrappingTextBoxFlag xmlns="" xmlns:m="http://schemas.openxmlformats.org/officeDocument/2006/math" xmlns:a14="http://schemas.microsoft.com/office/drawing/2010/main" xmlns:ma14="http://schemas.microsoft.com/office/mac/drawingml/2011/main" val="1"/>
             </a:ext>
           </a:extLst>
         </p:spPr>
@@ -6150,7 +6173,7 @@
           </a:ln>
           <a:extLst>
             <a:ext uri="{C572A759-6A51-4108-AA02-DFA0A04FC94B}">
-              <ma14:wrappingTextBoxFlag xmlns:ma14="http://schemas.microsoft.com/office/mac/drawingml/2011/main" xmlns:a14="http://schemas.microsoft.com/office/drawing/2010/main" xmlns:m="http://schemas.openxmlformats.org/officeDocument/2006/math" xmlns="" val="1"/>
+              <ma14:wrappingTextBoxFlag xmlns="" xmlns:m="http://schemas.openxmlformats.org/officeDocument/2006/math" xmlns:a14="http://schemas.microsoft.com/office/drawing/2010/main" xmlns:ma14="http://schemas.microsoft.com/office/mac/drawingml/2011/main" val="1"/>
             </a:ext>
           </a:extLst>
         </p:spPr>
@@ -6215,7 +6238,7 @@
           </a:ln>
           <a:extLst>
             <a:ext uri="{C572A759-6A51-4108-AA02-DFA0A04FC94B}">
-              <ma14:wrappingTextBoxFlag xmlns:ma14="http://schemas.microsoft.com/office/mac/drawingml/2011/main" xmlns:a14="http://schemas.microsoft.com/office/drawing/2010/main" xmlns:m="http://schemas.openxmlformats.org/officeDocument/2006/math" xmlns="" val="1"/>
+              <ma14:wrappingTextBoxFlag xmlns="" xmlns:m="http://schemas.openxmlformats.org/officeDocument/2006/math" xmlns:a14="http://schemas.microsoft.com/office/drawing/2010/main" xmlns:ma14="http://schemas.microsoft.com/office/mac/drawingml/2011/main" val="1"/>
             </a:ext>
           </a:extLst>
         </p:spPr>
@@ -6271,7 +6294,7 @@
           </a:ln>
           <a:extLst>
             <a:ext uri="{C572A759-6A51-4108-AA02-DFA0A04FC94B}">
-              <ma14:wrappingTextBoxFlag xmlns:ma14="http://schemas.microsoft.com/office/mac/drawingml/2011/main" xmlns:a14="http://schemas.microsoft.com/office/drawing/2010/main" xmlns:m="http://schemas.openxmlformats.org/officeDocument/2006/math" xmlns="" val="1"/>
+              <ma14:wrappingTextBoxFlag xmlns="" xmlns:m="http://schemas.openxmlformats.org/officeDocument/2006/math" xmlns:a14="http://schemas.microsoft.com/office/drawing/2010/main" xmlns:ma14="http://schemas.microsoft.com/office/mac/drawingml/2011/main" val="1"/>
             </a:ext>
           </a:extLst>
         </p:spPr>
@@ -6423,7 +6446,7 @@
           </a:ln>
           <a:extLst>
             <a:ext uri="{C572A759-6A51-4108-AA02-DFA0A04FC94B}">
-              <ma14:wrappingTextBoxFlag xmlns:ma14="http://schemas.microsoft.com/office/mac/drawingml/2011/main" xmlns:a14="http://schemas.microsoft.com/office/drawing/2010/main" xmlns:m="http://schemas.openxmlformats.org/officeDocument/2006/math" xmlns="" val="1"/>
+              <ma14:wrappingTextBoxFlag xmlns="" xmlns:m="http://schemas.openxmlformats.org/officeDocument/2006/math" xmlns:a14="http://schemas.microsoft.com/office/drawing/2010/main" xmlns:ma14="http://schemas.microsoft.com/office/mac/drawingml/2011/main" val="1"/>
             </a:ext>
           </a:extLst>
         </p:spPr>
@@ -6505,7 +6528,7 @@
           </a:ln>
           <a:extLst>
             <a:ext uri="{C572A759-6A51-4108-AA02-DFA0A04FC94B}">
-              <ma14:wrappingTextBoxFlag xmlns:ma14="http://schemas.microsoft.com/office/mac/drawingml/2011/main" xmlns:a14="http://schemas.microsoft.com/office/drawing/2010/main" xmlns:m="http://schemas.openxmlformats.org/officeDocument/2006/math" xmlns="" val="1"/>
+              <ma14:wrappingTextBoxFlag xmlns="" xmlns:m="http://schemas.openxmlformats.org/officeDocument/2006/math" xmlns:a14="http://schemas.microsoft.com/office/drawing/2010/main" xmlns:ma14="http://schemas.microsoft.com/office/mac/drawingml/2011/main" val="1"/>
             </a:ext>
           </a:extLst>
         </p:spPr>
@@ -6808,7 +6831,7 @@
           </a:ln>
           <a:extLst>
             <a:ext uri="{C572A759-6A51-4108-AA02-DFA0A04FC94B}">
-              <ma14:wrappingTextBoxFlag xmlns:ma14="http://schemas.microsoft.com/office/mac/drawingml/2011/main" xmlns:a14="http://schemas.microsoft.com/office/drawing/2010/main" xmlns:m="http://schemas.openxmlformats.org/officeDocument/2006/math" xmlns="" val="1"/>
+              <ma14:wrappingTextBoxFlag xmlns="" xmlns:m="http://schemas.openxmlformats.org/officeDocument/2006/math" xmlns:a14="http://schemas.microsoft.com/office/drawing/2010/main" xmlns:ma14="http://schemas.microsoft.com/office/mac/drawingml/2011/main" val="1"/>
             </a:ext>
           </a:extLst>
         </p:spPr>
@@ -6871,7 +6894,7 @@
           </a:ln>
           <a:extLst>
             <a:ext uri="{C572A759-6A51-4108-AA02-DFA0A04FC94B}">
-              <ma14:wrappingTextBoxFlag xmlns:ma14="http://schemas.microsoft.com/office/mac/drawingml/2011/main" xmlns:a14="http://schemas.microsoft.com/office/drawing/2010/main" xmlns:m="http://schemas.openxmlformats.org/officeDocument/2006/math" xmlns="" val="1"/>
+              <ma14:wrappingTextBoxFlag xmlns="" xmlns:m="http://schemas.openxmlformats.org/officeDocument/2006/math" xmlns:a14="http://schemas.microsoft.com/office/drawing/2010/main" xmlns:ma14="http://schemas.microsoft.com/office/mac/drawingml/2011/main" val="1"/>
             </a:ext>
           </a:extLst>
         </p:spPr>
@@ -6979,7 +7002,7 @@
           </a:ln>
           <a:extLst>
             <a:ext uri="{C572A759-6A51-4108-AA02-DFA0A04FC94B}">
-              <ma14:wrappingTextBoxFlag xmlns:ma14="http://schemas.microsoft.com/office/mac/drawingml/2011/main" xmlns:a14="http://schemas.microsoft.com/office/drawing/2010/main" xmlns:m="http://schemas.openxmlformats.org/officeDocument/2006/math" xmlns="" val="1"/>
+              <ma14:wrappingTextBoxFlag xmlns="" xmlns:m="http://schemas.openxmlformats.org/officeDocument/2006/math" xmlns:a14="http://schemas.microsoft.com/office/drawing/2010/main" xmlns:ma14="http://schemas.microsoft.com/office/mac/drawingml/2011/main" val="1"/>
             </a:ext>
           </a:extLst>
         </p:spPr>
@@ -7139,7 +7162,7 @@
           </a:ln>
           <a:extLst>
             <a:ext uri="{C572A759-6A51-4108-AA02-DFA0A04FC94B}">
-              <ma14:wrappingTextBoxFlag xmlns:ma14="http://schemas.microsoft.com/office/mac/drawingml/2011/main" xmlns:a14="http://schemas.microsoft.com/office/drawing/2010/main" xmlns:m="http://schemas.openxmlformats.org/officeDocument/2006/math" xmlns="" val="1"/>
+              <ma14:wrappingTextBoxFlag xmlns="" xmlns:m="http://schemas.openxmlformats.org/officeDocument/2006/math" xmlns:a14="http://schemas.microsoft.com/office/drawing/2010/main" xmlns:ma14="http://schemas.microsoft.com/office/mac/drawingml/2011/main" val="1"/>
             </a:ext>
           </a:extLst>
         </p:spPr>
@@ -7233,7 +7256,7 @@
           </a:ln>
           <a:extLst>
             <a:ext uri="{C572A759-6A51-4108-AA02-DFA0A04FC94B}">
-              <ma14:wrappingTextBoxFlag xmlns:ma14="http://schemas.microsoft.com/office/mac/drawingml/2011/main" xmlns:a14="http://schemas.microsoft.com/office/drawing/2010/main" xmlns:m="http://schemas.openxmlformats.org/officeDocument/2006/math" xmlns="" val="1"/>
+              <ma14:wrappingTextBoxFlag xmlns="" xmlns:m="http://schemas.openxmlformats.org/officeDocument/2006/math" xmlns:a14="http://schemas.microsoft.com/office/drawing/2010/main" xmlns:ma14="http://schemas.microsoft.com/office/mac/drawingml/2011/main" val="1"/>
             </a:ext>
           </a:extLst>
         </p:spPr>
@@ -7367,7 +7390,7 @@
           </a:ln>
           <a:extLst>
             <a:ext uri="{C572A759-6A51-4108-AA02-DFA0A04FC94B}">
-              <ma14:wrappingTextBoxFlag xmlns:ma14="http://schemas.microsoft.com/office/mac/drawingml/2011/main" xmlns:a14="http://schemas.microsoft.com/office/drawing/2010/main" xmlns:m="http://schemas.openxmlformats.org/officeDocument/2006/math" xmlns="" val="1"/>
+              <ma14:wrappingTextBoxFlag xmlns="" xmlns:m="http://schemas.openxmlformats.org/officeDocument/2006/math" xmlns:a14="http://schemas.microsoft.com/office/drawing/2010/main" xmlns:ma14="http://schemas.microsoft.com/office/mac/drawingml/2011/main" val="1"/>
             </a:ext>
           </a:extLst>
         </p:spPr>
@@ -7440,7 +7463,7 @@
           </a:ln>
           <a:extLst>
             <a:ext uri="{C572A759-6A51-4108-AA02-DFA0A04FC94B}">
-              <ma14:wrappingTextBoxFlag xmlns:ma14="http://schemas.microsoft.com/office/mac/drawingml/2011/main" xmlns:a14="http://schemas.microsoft.com/office/drawing/2010/main" xmlns:m="http://schemas.openxmlformats.org/officeDocument/2006/math" xmlns="" val="1"/>
+              <ma14:wrappingTextBoxFlag xmlns="" xmlns:m="http://schemas.openxmlformats.org/officeDocument/2006/math" xmlns:a14="http://schemas.microsoft.com/office/drawing/2010/main" xmlns:ma14="http://schemas.microsoft.com/office/mac/drawingml/2011/main" val="1"/>
             </a:ext>
           </a:extLst>
         </p:spPr>
@@ -7522,7 +7545,7 @@
           </a:ln>
           <a:extLst>
             <a:ext uri="{C572A759-6A51-4108-AA02-DFA0A04FC94B}">
-              <ma14:wrappingTextBoxFlag xmlns:ma14="http://schemas.microsoft.com/office/mac/drawingml/2011/main" xmlns:a14="http://schemas.microsoft.com/office/drawing/2010/main" xmlns:m="http://schemas.openxmlformats.org/officeDocument/2006/math" xmlns="" val="1"/>
+              <ma14:wrappingTextBoxFlag xmlns="" xmlns:m="http://schemas.openxmlformats.org/officeDocument/2006/math" xmlns:a14="http://schemas.microsoft.com/office/drawing/2010/main" xmlns:ma14="http://schemas.microsoft.com/office/mac/drawingml/2011/main" val="1"/>
             </a:ext>
           </a:extLst>
         </p:spPr>
@@ -7682,7 +7705,7 @@
           </a:ln>
           <a:extLst>
             <a:ext uri="{C572A759-6A51-4108-AA02-DFA0A04FC94B}">
-              <ma14:wrappingTextBoxFlag xmlns:ma14="http://schemas.microsoft.com/office/mac/drawingml/2011/main" xmlns:a14="http://schemas.microsoft.com/office/drawing/2010/main" xmlns:m="http://schemas.openxmlformats.org/officeDocument/2006/math" xmlns="" val="1"/>
+              <ma14:wrappingTextBoxFlag xmlns="" xmlns:m="http://schemas.openxmlformats.org/officeDocument/2006/math" xmlns:a14="http://schemas.microsoft.com/office/drawing/2010/main" xmlns:ma14="http://schemas.microsoft.com/office/mac/drawingml/2011/main" val="1"/>
             </a:ext>
           </a:extLst>
         </p:spPr>
@@ -7777,7 +7800,7 @@
           </a:ln>
           <a:extLst>
             <a:ext uri="{C572A759-6A51-4108-AA02-DFA0A04FC94B}">
-              <ma14:wrappingTextBoxFlag xmlns:ma14="http://schemas.microsoft.com/office/mac/drawingml/2011/main" xmlns:a14="http://schemas.microsoft.com/office/drawing/2010/main" xmlns:m="http://schemas.openxmlformats.org/officeDocument/2006/math" xmlns="" val="1"/>
+              <ma14:wrappingTextBoxFlag xmlns="" xmlns:m="http://schemas.openxmlformats.org/officeDocument/2006/math" xmlns:a14="http://schemas.microsoft.com/office/drawing/2010/main" xmlns:ma14="http://schemas.microsoft.com/office/mac/drawingml/2011/main" val="1"/>
             </a:ext>
           </a:extLst>
         </p:spPr>
@@ -7937,7 +7960,7 @@
           </a:ln>
           <a:extLst>
             <a:ext uri="{C572A759-6A51-4108-AA02-DFA0A04FC94B}">
-              <ma14:wrappingTextBoxFlag xmlns:ma14="http://schemas.microsoft.com/office/mac/drawingml/2011/main" xmlns:a14="http://schemas.microsoft.com/office/drawing/2010/main" xmlns:m="http://schemas.openxmlformats.org/officeDocument/2006/math" xmlns="" val="1"/>
+              <ma14:wrappingTextBoxFlag xmlns="" xmlns:m="http://schemas.openxmlformats.org/officeDocument/2006/math" xmlns:a14="http://schemas.microsoft.com/office/drawing/2010/main" xmlns:ma14="http://schemas.microsoft.com/office/mac/drawingml/2011/main" val="1"/>
             </a:ext>
           </a:extLst>
         </p:spPr>
@@ -8045,7 +8068,7 @@
           </a:ln>
           <a:extLst>
             <a:ext uri="{C572A759-6A51-4108-AA02-DFA0A04FC94B}">
-              <ma14:wrappingTextBoxFlag xmlns:ma14="http://schemas.microsoft.com/office/mac/drawingml/2011/main" xmlns:a14="http://schemas.microsoft.com/office/drawing/2010/main" xmlns:m="http://schemas.openxmlformats.org/officeDocument/2006/math" xmlns="" val="1"/>
+              <ma14:wrappingTextBoxFlag xmlns="" xmlns:m="http://schemas.openxmlformats.org/officeDocument/2006/math" xmlns:a14="http://schemas.microsoft.com/office/drawing/2010/main" xmlns:ma14="http://schemas.microsoft.com/office/mac/drawingml/2011/main" val="1"/>
             </a:ext>
           </a:extLst>
         </p:spPr>
@@ -8205,7 +8228,7 @@
           </a:ln>
           <a:extLst>
             <a:ext uri="{C572A759-6A51-4108-AA02-DFA0A04FC94B}">
-              <ma14:wrappingTextBoxFlag xmlns:ma14="http://schemas.microsoft.com/office/mac/drawingml/2011/main" xmlns:a14="http://schemas.microsoft.com/office/drawing/2010/main" xmlns:m="http://schemas.openxmlformats.org/officeDocument/2006/math" xmlns="" val="1"/>
+              <ma14:wrappingTextBoxFlag xmlns="" xmlns:m="http://schemas.openxmlformats.org/officeDocument/2006/math" xmlns:a14="http://schemas.microsoft.com/office/drawing/2010/main" xmlns:ma14="http://schemas.microsoft.com/office/mac/drawingml/2011/main" val="1"/>
             </a:ext>
           </a:extLst>
         </p:spPr>
@@ -8355,7 +8378,7 @@
           </a:ln>
           <a:extLst>
             <a:ext uri="{C572A759-6A51-4108-AA02-DFA0A04FC94B}">
-              <ma14:wrappingTextBoxFlag xmlns:ma14="http://schemas.microsoft.com/office/mac/drawingml/2011/main" xmlns:a14="http://schemas.microsoft.com/office/drawing/2010/main" xmlns:m="http://schemas.openxmlformats.org/officeDocument/2006/math" xmlns="" val="1"/>
+              <ma14:wrappingTextBoxFlag xmlns="" xmlns:m="http://schemas.openxmlformats.org/officeDocument/2006/math" xmlns:a14="http://schemas.microsoft.com/office/drawing/2010/main" xmlns:ma14="http://schemas.microsoft.com/office/mac/drawingml/2011/main" val="1"/>
             </a:ext>
           </a:extLst>
         </p:spPr>
@@ -8566,6 +8589,10 @@
               </a:defRPr>
             </a:pPr>
             <a:r>
+              <a:rPr dirty="0">
+                <a:latin typeface="Calibri" panose="020F0502020204030204" pitchFamily="34" charset="0"/>
+                <a:cs typeface="Calibri" panose="020F0502020204030204" pitchFamily="34" charset="0"/>
+              </a:rPr>
               <a:t>Goal: write a function to add a list of numbers</a:t>
             </a:r>
           </a:p>
@@ -8575,10 +8602,17 @@
               <a:buNone/>
             </a:pPr>
             <a:r>
-              <a:rPr b="1"/>
+              <a:rPr b="1" dirty="0">
+                <a:latin typeface="Calibri" panose="020F0502020204030204" pitchFamily="34" charset="0"/>
+                <a:cs typeface="Calibri" panose="020F0502020204030204" pitchFamily="34" charset="0"/>
+              </a:rPr>
               <a:t>Input</a:t>
             </a:r>
             <a:r>
+              <a:rPr dirty="0">
+                <a:latin typeface="Calibri" panose="020F0502020204030204" pitchFamily="34" charset="0"/>
+                <a:cs typeface="Calibri" panose="020F0502020204030204" pitchFamily="34" charset="0"/>
+              </a:rPr>
               <a:t>:</a:t>
             </a:r>
           </a:p>
@@ -8590,6 +8624,10 @@
               <a:defRPr sz="2800"/>
             </a:pPr>
             <a:r>
+              <a:rPr dirty="0">
+                <a:latin typeface="Calibri" panose="020F0502020204030204" pitchFamily="34" charset="0"/>
+                <a:cs typeface="Calibri" panose="020F0502020204030204" pitchFamily="34" charset="0"/>
+              </a:rPr>
               <a:t>Python list containing floats</a:t>
             </a:r>
           </a:p>
@@ -8599,10 +8637,17 @@
               <a:buNone/>
             </a:pPr>
             <a:r>
-              <a:rPr b="1"/>
+              <a:rPr b="1" dirty="0">
+                <a:latin typeface="Calibri" panose="020F0502020204030204" pitchFamily="34" charset="0"/>
+                <a:cs typeface="Calibri" panose="020F0502020204030204" pitchFamily="34" charset="0"/>
+              </a:rPr>
               <a:t>Output</a:t>
             </a:r>
             <a:r>
+              <a:rPr dirty="0">
+                <a:latin typeface="Calibri" panose="020F0502020204030204" pitchFamily="34" charset="0"/>
+                <a:cs typeface="Calibri" panose="020F0502020204030204" pitchFamily="34" charset="0"/>
+              </a:rPr>
               <a:t>:</a:t>
             </a:r>
           </a:p>
@@ -8614,6 +8659,10 @@
               <a:defRPr sz="2800"/>
             </a:pPr>
             <a:r>
+              <a:rPr dirty="0">
+                <a:latin typeface="Calibri" panose="020F0502020204030204" pitchFamily="34" charset="0"/>
+                <a:cs typeface="Calibri" panose="020F0502020204030204" pitchFamily="34" charset="0"/>
+              </a:rPr>
               <a:t>Sum of the numbers</a:t>
             </a:r>
           </a:p>
@@ -8623,43 +8672,138 @@
               <a:buNone/>
             </a:pPr>
             <a:r>
-              <a:rPr b="1"/>
+              <a:rPr b="1" dirty="0">
+                <a:latin typeface="Calibri" panose="020F0502020204030204" pitchFamily="34" charset="0"/>
+                <a:cs typeface="Calibri" panose="020F0502020204030204" pitchFamily="34" charset="0"/>
+              </a:rPr>
               <a:t>Example</a:t>
             </a:r>
             <a:r>
+              <a:rPr dirty="0">
+                <a:latin typeface="Calibri" panose="020F0502020204030204" pitchFamily="34" charset="0"/>
+                <a:cs typeface="Calibri" panose="020F0502020204030204" pitchFamily="34" charset="0"/>
+              </a:rPr>
               <a:t>:</a:t>
             </a:r>
-            <a:br/>
-            <a:r>
-              <a:rPr sz="2200"/>
-              <a:t>&gt;&gt;&gt; nums = [1, 2, 3.5]</a:t>
-            </a:r>
             <a:br>
-              <a:rPr sz="2200"/>
+              <a:rPr dirty="0">
+                <a:latin typeface="Calibri" panose="020F0502020204030204" pitchFamily="34" charset="0"/>
+                <a:cs typeface="Calibri" panose="020F0502020204030204" pitchFamily="34" charset="0"/>
+              </a:rPr>
             </a:br>
             <a:r>
-              <a:rPr sz="2200"/>
-              <a:t>&gt;&gt;&gt; add_nums(nums)</a:t>
+              <a:rPr sz="2200" dirty="0">
+                <a:latin typeface="Calibri" panose="020F0502020204030204" pitchFamily="34" charset="0"/>
+                <a:cs typeface="Calibri" panose="020F0502020204030204" pitchFamily="34" charset="0"/>
+              </a:rPr>
+              <a:t>&gt;&gt;&gt; </a:t>
+            </a:r>
+            <a:r>
+              <a:rPr sz="2200" dirty="0" err="1">
+                <a:latin typeface="Calibri" panose="020F0502020204030204" pitchFamily="34" charset="0"/>
+                <a:cs typeface="Calibri" panose="020F0502020204030204" pitchFamily="34" charset="0"/>
+              </a:rPr>
+              <a:t>nums</a:t>
+            </a:r>
+            <a:r>
+              <a:rPr sz="2200" dirty="0">
+                <a:latin typeface="Calibri" panose="020F0502020204030204" pitchFamily="34" charset="0"/>
+                <a:cs typeface="Calibri" panose="020F0502020204030204" pitchFamily="34" charset="0"/>
+              </a:rPr>
+              <a:t> = [1, 2, 3.5]</a:t>
             </a:r>
             <a:br>
-              <a:rPr sz="2200"/>
+              <a:rPr sz="2200" dirty="0">
+                <a:latin typeface="Calibri" panose="020F0502020204030204" pitchFamily="34" charset="0"/>
+                <a:cs typeface="Calibri" panose="020F0502020204030204" pitchFamily="34" charset="0"/>
+              </a:rPr>
             </a:br>
             <a:r>
-              <a:rPr sz="2200"/>
+              <a:rPr sz="2200" dirty="0">
+                <a:latin typeface="Calibri" panose="020F0502020204030204" pitchFamily="34" charset="0"/>
+                <a:cs typeface="Calibri" panose="020F0502020204030204" pitchFamily="34" charset="0"/>
+              </a:rPr>
+              <a:t>&gt;&gt;&gt; </a:t>
+            </a:r>
+            <a:r>
+              <a:rPr sz="2200" dirty="0" err="1">
+                <a:latin typeface="Calibri" panose="020F0502020204030204" pitchFamily="34" charset="0"/>
+                <a:cs typeface="Calibri" panose="020F0502020204030204" pitchFamily="34" charset="0"/>
+              </a:rPr>
+              <a:t>add_nums</a:t>
+            </a:r>
+            <a:r>
+              <a:rPr sz="2200" dirty="0">
+                <a:latin typeface="Calibri" panose="020F0502020204030204" pitchFamily="34" charset="0"/>
+                <a:cs typeface="Calibri" panose="020F0502020204030204" pitchFamily="34" charset="0"/>
+              </a:rPr>
+              <a:t>(</a:t>
+            </a:r>
+            <a:r>
+              <a:rPr sz="2200" dirty="0" err="1">
+                <a:latin typeface="Calibri" panose="020F0502020204030204" pitchFamily="34" charset="0"/>
+                <a:cs typeface="Calibri" panose="020F0502020204030204" pitchFamily="34" charset="0"/>
+              </a:rPr>
+              <a:t>nums</a:t>
+            </a:r>
+            <a:r>
+              <a:rPr sz="2200" dirty="0">
+                <a:latin typeface="Calibri" panose="020F0502020204030204" pitchFamily="34" charset="0"/>
+                <a:cs typeface="Calibri" panose="020F0502020204030204" pitchFamily="34" charset="0"/>
+              </a:rPr>
+              <a:t>)</a:t>
+            </a:r>
+            <a:br>
+              <a:rPr sz="2200" dirty="0">
+                <a:latin typeface="Calibri" panose="020F0502020204030204" pitchFamily="34" charset="0"/>
+                <a:cs typeface="Calibri" panose="020F0502020204030204" pitchFamily="34" charset="0"/>
+              </a:rPr>
+            </a:br>
+            <a:r>
+              <a:rPr sz="2200" dirty="0">
+                <a:latin typeface="Calibri" panose="020F0502020204030204" pitchFamily="34" charset="0"/>
+                <a:cs typeface="Calibri" panose="020F0502020204030204" pitchFamily="34" charset="0"/>
+              </a:rPr>
               <a:t>6.5</a:t>
             </a:r>
             <a:br>
-              <a:rPr sz="2200"/>
+              <a:rPr sz="2200" dirty="0">
+                <a:latin typeface="Calibri" panose="020F0502020204030204" pitchFamily="34" charset="0"/>
+                <a:cs typeface="Calibri" panose="020F0502020204030204" pitchFamily="34" charset="0"/>
+              </a:rPr>
             </a:br>
             <a:r>
-              <a:rPr sz="2200"/>
-              <a:t>&gt;&gt;&gt; add_nums([20, 30.1])</a:t>
+              <a:rPr sz="2200" dirty="0">
+                <a:latin typeface="Calibri" panose="020F0502020204030204" pitchFamily="34" charset="0"/>
+                <a:cs typeface="Calibri" panose="020F0502020204030204" pitchFamily="34" charset="0"/>
+              </a:rPr>
+              <a:t>&gt;&gt;&gt; </a:t>
+            </a:r>
+            <a:r>
+              <a:rPr sz="2200" dirty="0" err="1">
+                <a:latin typeface="Calibri" panose="020F0502020204030204" pitchFamily="34" charset="0"/>
+                <a:cs typeface="Calibri" panose="020F0502020204030204" pitchFamily="34" charset="0"/>
+              </a:rPr>
+              <a:t>add_nums</a:t>
+            </a:r>
+            <a:r>
+              <a:rPr sz="2200" dirty="0">
+                <a:latin typeface="Calibri" panose="020F0502020204030204" pitchFamily="34" charset="0"/>
+                <a:cs typeface="Calibri" panose="020F0502020204030204" pitchFamily="34" charset="0"/>
+              </a:rPr>
+              <a:t>([20, 30.1])</a:t>
             </a:r>
             <a:br>
-              <a:rPr sz="2200"/>
+              <a:rPr sz="2200" dirty="0">
+                <a:latin typeface="Calibri" panose="020F0502020204030204" pitchFamily="34" charset="0"/>
+                <a:cs typeface="Calibri" panose="020F0502020204030204" pitchFamily="34" charset="0"/>
+              </a:rPr>
             </a:br>
             <a:r>
-              <a:rPr sz="2200"/>
+              <a:rPr sz="2200" dirty="0">
+                <a:latin typeface="Calibri" panose="020F0502020204030204" pitchFamily="34" charset="0"/>
+                <a:cs typeface="Calibri" panose="020F0502020204030204" pitchFamily="34" charset="0"/>
+              </a:rPr>
               <a:t>50.1</a:t>
             </a:r>
           </a:p>
@@ -8752,6 +8896,10 @@
               <a:buNone/>
             </a:pPr>
             <a:r>
+              <a:rPr lang="en-US" dirty="0">
+                <a:latin typeface="Calibri" panose="020F0502020204030204" pitchFamily="34" charset="0"/>
+                <a:cs typeface="Calibri" panose="020F0502020204030204" pitchFamily="34" charset="0"/>
+              </a:rPr>
               <a:t>From Strings to Lists</a:t>
             </a:r>
           </a:p>
@@ -8770,6 +8918,10 @@
               </a:defRPr>
             </a:pPr>
             <a:r>
+              <a:rPr lang="en-US" dirty="0">
+                <a:latin typeface="Calibri" panose="020F0502020204030204" pitchFamily="34" charset="0"/>
+                <a:cs typeface="Calibri" panose="020F0502020204030204" pitchFamily="34" charset="0"/>
+              </a:rPr>
               <a:t>More Sequence Capabilities</a:t>
             </a:r>
           </a:p>
@@ -8779,6 +8931,10 @@
               <a:buNone/>
             </a:pPr>
             <a:r>
+              <a:rPr lang="en-US" dirty="0">
+                <a:latin typeface="Calibri" panose="020F0502020204030204" pitchFamily="34" charset="0"/>
+                <a:cs typeface="Calibri" panose="020F0502020204030204" pitchFamily="34" charset="0"/>
+              </a:rPr>
               <a:t>Difference 1: Flexibility of Types</a:t>
             </a:r>
           </a:p>
@@ -8788,6 +8944,10 @@
               <a:buNone/>
             </a:pPr>
             <a:r>
+              <a:rPr lang="en-US" dirty="0">
+                <a:latin typeface="Calibri" panose="020F0502020204030204" pitchFamily="34" charset="0"/>
+                <a:cs typeface="Calibri" panose="020F0502020204030204" pitchFamily="34" charset="0"/>
+              </a:rPr>
               <a:t>Difference 2: Mutability</a:t>
             </a:r>
           </a:p>
@@ -8797,6 +8957,10 @@
               <a:buNone/>
             </a:pPr>
             <a:r>
+              <a:rPr lang="en-US" dirty="0">
+                <a:latin typeface="Calibri" panose="020F0502020204030204" pitchFamily="34" charset="0"/>
+                <a:cs typeface="Calibri" panose="020F0502020204030204" pitchFamily="34" charset="0"/>
+              </a:rPr>
               <a:t>Transforming between Strings and Lists</a:t>
             </a:r>
           </a:p>
@@ -8892,6 +9056,10 @@
               <a:buNone/>
             </a:pPr>
             <a:r>
+              <a:rPr dirty="0">
+                <a:latin typeface="Calibri" panose="020F0502020204030204" pitchFamily="34" charset="0"/>
+                <a:cs typeface="Calibri" panose="020F0502020204030204" pitchFamily="34" charset="0"/>
+              </a:rPr>
               <a:t>indexing</a:t>
             </a:r>
           </a:p>
@@ -8901,6 +9069,10 @@
               <a:buNone/>
             </a:pPr>
             <a:r>
+              <a:rPr dirty="0">
+                <a:latin typeface="Calibri" panose="020F0502020204030204" pitchFamily="34" charset="0"/>
+                <a:cs typeface="Calibri" panose="020F0502020204030204" pitchFamily="34" charset="0"/>
+              </a:rPr>
               <a:t>slicing</a:t>
             </a:r>
           </a:p>
@@ -8910,6 +9082,10 @@
               <a:buNone/>
             </a:pPr>
             <a:r>
+              <a:rPr dirty="0">
+                <a:latin typeface="Calibri" panose="020F0502020204030204" pitchFamily="34" charset="0"/>
+                <a:cs typeface="Calibri" panose="020F0502020204030204" pitchFamily="34" charset="0"/>
+              </a:rPr>
               <a:t>for loops</a:t>
             </a:r>
           </a:p>
@@ -8919,8 +9095,16 @@
               <a:buNone/>
             </a:pPr>
             <a:r>
+              <a:rPr dirty="0" err="1">
+                <a:latin typeface="Calibri" panose="020F0502020204030204" pitchFamily="34" charset="0"/>
+                <a:cs typeface="Calibri" panose="020F0502020204030204" pitchFamily="34" charset="0"/>
+              </a:rPr>
               <a:t>len</a:t>
             </a:r>
+            <a:endParaRPr dirty="0">
+              <a:latin typeface="Calibri" panose="020F0502020204030204" pitchFamily="34" charset="0"/>
+              <a:cs typeface="Calibri" panose="020F0502020204030204" pitchFamily="34" charset="0"/>
+            </a:endParaRPr>
           </a:p>
           <a:p>
             <a:pPr marL="0" lvl="5" indent="0">
@@ -8928,6 +9112,10 @@
               <a:buNone/>
             </a:pPr>
             <a:r>
+              <a:rPr dirty="0">
+                <a:latin typeface="Calibri" panose="020F0502020204030204" pitchFamily="34" charset="0"/>
+                <a:cs typeface="Calibri" panose="020F0502020204030204" pitchFamily="34" charset="0"/>
+              </a:rPr>
               <a:t>concatenation</a:t>
             </a:r>
           </a:p>
@@ -8937,6 +9125,10 @@
               <a:buNone/>
             </a:pPr>
             <a:r>
+              <a:rPr dirty="0">
+                <a:latin typeface="Calibri" panose="020F0502020204030204" pitchFamily="34" charset="0"/>
+                <a:cs typeface="Calibri" panose="020F0502020204030204" pitchFamily="34" charset="0"/>
+              </a:rPr>
               <a:t>in</a:t>
             </a:r>
           </a:p>
@@ -8946,6 +9138,10 @@
               <a:buNone/>
             </a:pPr>
             <a:r>
+              <a:rPr dirty="0">
+                <a:latin typeface="Calibri" panose="020F0502020204030204" pitchFamily="34" charset="0"/>
+                <a:cs typeface="Calibri" panose="020F0502020204030204" pitchFamily="34" charset="0"/>
+              </a:rPr>
               <a:t>multiply by an int</a:t>
             </a:r>
           </a:p>
@@ -8973,7 +9169,7 @@
           </a:ln>
           <a:extLst>
             <a:ext uri="{C572A759-6A51-4108-AA02-DFA0A04FC94B}">
-              <ma14:wrappingTextBoxFlag xmlns:ma14="http://schemas.microsoft.com/office/mac/drawingml/2011/main" xmlns:a14="http://schemas.microsoft.com/office/drawing/2010/main" xmlns:m="http://schemas.openxmlformats.org/officeDocument/2006/math" xmlns="" val="1"/>
+              <ma14:wrappingTextBoxFlag xmlns="" xmlns:m="http://schemas.openxmlformats.org/officeDocument/2006/math" xmlns:a14="http://schemas.microsoft.com/office/drawing/2010/main" xmlns:ma14="http://schemas.microsoft.com/office/mac/drawingml/2011/main" val="1"/>
             </a:ext>
           </a:extLst>
         </p:spPr>
@@ -9024,7 +9220,7 @@
           </a:ln>
           <a:extLst>
             <a:ext uri="{C572A759-6A51-4108-AA02-DFA0A04FC94B}">
-              <ma14:wrappingTextBoxFlag xmlns:ma14="http://schemas.microsoft.com/office/mac/drawingml/2011/main" xmlns:a14="http://schemas.microsoft.com/office/drawing/2010/main" xmlns:m="http://schemas.openxmlformats.org/officeDocument/2006/math" xmlns="" val="1"/>
+              <ma14:wrappingTextBoxFlag xmlns="" xmlns:m="http://schemas.openxmlformats.org/officeDocument/2006/math" xmlns:a14="http://schemas.microsoft.com/office/drawing/2010/main" xmlns:ma14="http://schemas.microsoft.com/office/mac/drawingml/2011/main" val="1"/>
             </a:ext>
           </a:extLst>
         </p:spPr>
@@ -9072,7 +9268,7 @@
           </a:ln>
           <a:extLst>
             <a:ext uri="{C572A759-6A51-4108-AA02-DFA0A04FC94B}">
-              <ma14:wrappingTextBoxFlag xmlns:ma14="http://schemas.microsoft.com/office/mac/drawingml/2011/main" xmlns:a14="http://schemas.microsoft.com/office/drawing/2010/main" xmlns:m="http://schemas.openxmlformats.org/officeDocument/2006/math" xmlns="" val="1"/>
+              <ma14:wrappingTextBoxFlag xmlns="" xmlns:m="http://schemas.openxmlformats.org/officeDocument/2006/math" xmlns:a14="http://schemas.microsoft.com/office/drawing/2010/main" xmlns:ma14="http://schemas.microsoft.com/office/mac/drawingml/2011/main" val="1"/>
             </a:ext>
           </a:extLst>
         </p:spPr>
@@ -9120,7 +9316,7 @@
           </a:ln>
           <a:extLst>
             <a:ext uri="{C572A759-6A51-4108-AA02-DFA0A04FC94B}">
-              <ma14:wrappingTextBoxFlag xmlns:ma14="http://schemas.microsoft.com/office/mac/drawingml/2011/main" xmlns:a14="http://schemas.microsoft.com/office/drawing/2010/main" xmlns:m="http://schemas.openxmlformats.org/officeDocument/2006/math" xmlns="" val="1"/>
+              <ma14:wrappingTextBoxFlag xmlns="" xmlns:m="http://schemas.openxmlformats.org/officeDocument/2006/math" xmlns:a14="http://schemas.microsoft.com/office/drawing/2010/main" xmlns:ma14="http://schemas.microsoft.com/office/mac/drawingml/2011/main" val="1"/>
             </a:ext>
           </a:extLst>
         </p:spPr>
@@ -9171,7 +9367,7 @@
           </a:ln>
           <a:extLst>
             <a:ext uri="{C572A759-6A51-4108-AA02-DFA0A04FC94B}">
-              <ma14:wrappingTextBoxFlag xmlns:ma14="http://schemas.microsoft.com/office/mac/drawingml/2011/main" xmlns:a14="http://schemas.microsoft.com/office/drawing/2010/main" xmlns:m="http://schemas.openxmlformats.org/officeDocument/2006/math" xmlns="" val="1"/>
+              <ma14:wrappingTextBoxFlag xmlns="" xmlns:m="http://schemas.openxmlformats.org/officeDocument/2006/math" xmlns:a14="http://schemas.microsoft.com/office/drawing/2010/main" xmlns:ma14="http://schemas.microsoft.com/office/mac/drawingml/2011/main" val="1"/>
             </a:ext>
           </a:extLst>
         </p:spPr>
@@ -9222,7 +9418,7 @@
           </a:ln>
           <a:extLst>
             <a:ext uri="{C572A759-6A51-4108-AA02-DFA0A04FC94B}">
-              <ma14:wrappingTextBoxFlag xmlns:ma14="http://schemas.microsoft.com/office/mac/drawingml/2011/main" xmlns:a14="http://schemas.microsoft.com/office/drawing/2010/main" xmlns:m="http://schemas.openxmlformats.org/officeDocument/2006/math" xmlns="" val="1"/>
+              <ma14:wrappingTextBoxFlag xmlns="" xmlns:m="http://schemas.openxmlformats.org/officeDocument/2006/math" xmlns:a14="http://schemas.microsoft.com/office/drawing/2010/main" xmlns:ma14="http://schemas.microsoft.com/office/mac/drawingml/2011/main" val="1"/>
             </a:ext>
           </a:extLst>
         </p:spPr>
@@ -9273,7 +9469,7 @@
           </a:ln>
           <a:extLst>
             <a:ext uri="{C572A759-6A51-4108-AA02-DFA0A04FC94B}">
-              <ma14:wrappingTextBoxFlag xmlns:ma14="http://schemas.microsoft.com/office/mac/drawingml/2011/main" xmlns:a14="http://schemas.microsoft.com/office/drawing/2010/main" xmlns:m="http://schemas.openxmlformats.org/officeDocument/2006/math" xmlns="" val="1"/>
+              <ma14:wrappingTextBoxFlag xmlns="" xmlns:m="http://schemas.openxmlformats.org/officeDocument/2006/math" xmlns:a14="http://schemas.microsoft.com/office/drawing/2010/main" xmlns:ma14="http://schemas.microsoft.com/office/mac/drawingml/2011/main" val="1"/>
             </a:ext>
           </a:extLst>
         </p:spPr>
@@ -9318,7 +9514,7 @@
           </a:ln>
           <a:extLst>
             <a:ext uri="{C572A759-6A51-4108-AA02-DFA0A04FC94B}">
-              <ma14:wrappingTextBoxFlag xmlns:ma14="http://schemas.microsoft.com/office/mac/drawingml/2011/main" xmlns:a14="http://schemas.microsoft.com/office/drawing/2010/main" xmlns:m="http://schemas.openxmlformats.org/officeDocument/2006/math" xmlns="" val="1"/>
+              <ma14:wrappingTextBoxFlag xmlns="" xmlns:m="http://schemas.openxmlformats.org/officeDocument/2006/math" xmlns:a14="http://schemas.microsoft.com/office/drawing/2010/main" xmlns:ma14="http://schemas.microsoft.com/office/mac/drawingml/2011/main" val="1"/>
             </a:ext>
           </a:extLst>
         </p:spPr>
@@ -9456,7 +9652,7 @@
           </a:ln>
           <a:extLst>
             <a:ext uri="{C572A759-6A51-4108-AA02-DFA0A04FC94B}">
-              <ma14:wrappingTextBoxFlag xmlns:ma14="http://schemas.microsoft.com/office/mac/drawingml/2011/main" xmlns:a14="http://schemas.microsoft.com/office/drawing/2010/main" xmlns:m="http://schemas.openxmlformats.org/officeDocument/2006/math" xmlns="" val="1"/>
+              <ma14:wrappingTextBoxFlag xmlns="" xmlns:m="http://schemas.openxmlformats.org/officeDocument/2006/math" xmlns:a14="http://schemas.microsoft.com/office/drawing/2010/main" xmlns:ma14="http://schemas.microsoft.com/office/mac/drawingml/2011/main" val="1"/>
             </a:ext>
           </a:extLst>
         </p:spPr>
@@ -9500,7 +9696,7 @@
           </a:ln>
           <a:extLst>
             <a:ext uri="{C572A759-6A51-4108-AA02-DFA0A04FC94B}">
-              <ma14:wrappingTextBoxFlag xmlns:ma14="http://schemas.microsoft.com/office/mac/drawingml/2011/main" xmlns:a14="http://schemas.microsoft.com/office/drawing/2010/main" xmlns:m="http://schemas.openxmlformats.org/officeDocument/2006/math" xmlns="" val="1"/>
+              <ma14:wrappingTextBoxFlag xmlns="" xmlns:m="http://schemas.openxmlformats.org/officeDocument/2006/math" xmlns:a14="http://schemas.microsoft.com/office/drawing/2010/main" xmlns:ma14="http://schemas.microsoft.com/office/mac/drawingml/2011/main" val="1"/>
             </a:ext>
           </a:extLst>
         </p:spPr>
@@ -9544,7 +9740,7 @@
           </a:ln>
           <a:extLst>
             <a:ext uri="{C572A759-6A51-4108-AA02-DFA0A04FC94B}">
-              <ma14:wrappingTextBoxFlag xmlns:ma14="http://schemas.microsoft.com/office/mac/drawingml/2011/main" xmlns:a14="http://schemas.microsoft.com/office/drawing/2010/main" xmlns:m="http://schemas.openxmlformats.org/officeDocument/2006/math" xmlns="" val="1"/>
+              <ma14:wrappingTextBoxFlag xmlns="" xmlns:m="http://schemas.openxmlformats.org/officeDocument/2006/math" xmlns:a14="http://schemas.microsoft.com/office/drawing/2010/main" xmlns:ma14="http://schemas.microsoft.com/office/mac/drawingml/2011/main" val="1"/>
             </a:ext>
           </a:extLst>
         </p:spPr>
@@ -9620,7 +9816,7 @@
           </a:ln>
           <a:extLst>
             <a:ext uri="{C572A759-6A51-4108-AA02-DFA0A04FC94B}">
-              <ma14:wrappingTextBoxFlag xmlns:ma14="http://schemas.microsoft.com/office/mac/drawingml/2011/main" xmlns:a14="http://schemas.microsoft.com/office/drawing/2010/main" xmlns:m="http://schemas.openxmlformats.org/officeDocument/2006/math" xmlns="" val="1"/>
+              <ma14:wrappingTextBoxFlag xmlns="" xmlns:m="http://schemas.openxmlformats.org/officeDocument/2006/math" xmlns:a14="http://schemas.microsoft.com/office/drawing/2010/main" xmlns:ma14="http://schemas.microsoft.com/office/mac/drawingml/2011/main" val="1"/>
             </a:ext>
           </a:extLst>
         </p:spPr>
@@ -9932,7 +10128,7 @@
           </a:ln>
           <a:extLst>
             <a:ext uri="{C572A759-6A51-4108-AA02-DFA0A04FC94B}">
-              <ma14:wrappingTextBoxFlag xmlns:ma14="http://schemas.microsoft.com/office/mac/drawingml/2011/main" xmlns:a14="http://schemas.microsoft.com/office/drawing/2010/main" xmlns:m="http://schemas.openxmlformats.org/officeDocument/2006/math" xmlns="" val="1"/>
+              <ma14:wrappingTextBoxFlag xmlns="" xmlns:m="http://schemas.openxmlformats.org/officeDocument/2006/math" xmlns:a14="http://schemas.microsoft.com/office/drawing/2010/main" xmlns:ma14="http://schemas.microsoft.com/office/mac/drawingml/2011/main" val="1"/>
             </a:ext>
           </a:extLst>
         </p:spPr>
@@ -9976,7 +10172,7 @@
           </a:ln>
           <a:extLst>
             <a:ext uri="{C572A759-6A51-4108-AA02-DFA0A04FC94B}">
-              <ma14:wrappingTextBoxFlag xmlns:ma14="http://schemas.microsoft.com/office/mac/drawingml/2011/main" xmlns:a14="http://schemas.microsoft.com/office/drawing/2010/main" xmlns:m="http://schemas.openxmlformats.org/officeDocument/2006/math" xmlns="" val="1"/>
+              <ma14:wrappingTextBoxFlag xmlns="" xmlns:m="http://schemas.openxmlformats.org/officeDocument/2006/math" xmlns:a14="http://schemas.microsoft.com/office/drawing/2010/main" xmlns:ma14="http://schemas.microsoft.com/office/mac/drawingml/2011/main" val="1"/>
             </a:ext>
           </a:extLst>
         </p:spPr>
@@ -10020,7 +10216,7 @@
           </a:ln>
           <a:extLst>
             <a:ext uri="{C572A759-6A51-4108-AA02-DFA0A04FC94B}">
-              <ma14:wrappingTextBoxFlag xmlns:ma14="http://schemas.microsoft.com/office/mac/drawingml/2011/main" xmlns:a14="http://schemas.microsoft.com/office/drawing/2010/main" xmlns:m="http://schemas.openxmlformats.org/officeDocument/2006/math" xmlns="" val="1"/>
+              <ma14:wrappingTextBoxFlag xmlns="" xmlns:m="http://schemas.openxmlformats.org/officeDocument/2006/math" xmlns:a14="http://schemas.microsoft.com/office/drawing/2010/main" xmlns:ma14="http://schemas.microsoft.com/office/mac/drawingml/2011/main" val="1"/>
             </a:ext>
           </a:extLst>
         </p:spPr>
@@ -10108,7 +10304,7 @@
           </a:ln>
           <a:extLst>
             <a:ext uri="{C572A759-6A51-4108-AA02-DFA0A04FC94B}">
-              <ma14:wrappingTextBoxFlag xmlns:ma14="http://schemas.microsoft.com/office/mac/drawingml/2011/main" xmlns:a14="http://schemas.microsoft.com/office/drawing/2010/main" xmlns:m="http://schemas.openxmlformats.org/officeDocument/2006/math" xmlns="" val="1"/>
+              <ma14:wrappingTextBoxFlag xmlns="" xmlns:m="http://schemas.openxmlformats.org/officeDocument/2006/math" xmlns:a14="http://schemas.microsoft.com/office/drawing/2010/main" xmlns:ma14="http://schemas.microsoft.com/office/mac/drawingml/2011/main" val="1"/>
             </a:ext>
           </a:extLst>
         </p:spPr>
@@ -10295,7 +10491,7 @@
           </a:ln>
           <a:extLst>
             <a:ext uri="{C572A759-6A51-4108-AA02-DFA0A04FC94B}">
-              <ma14:wrappingTextBoxFlag xmlns:ma14="http://schemas.microsoft.com/office/mac/drawingml/2011/main" xmlns:a14="http://schemas.microsoft.com/office/drawing/2010/main" xmlns:m="http://schemas.openxmlformats.org/officeDocument/2006/math" xmlns="" val="1"/>
+              <ma14:wrappingTextBoxFlag xmlns="" xmlns:m="http://schemas.openxmlformats.org/officeDocument/2006/math" xmlns:a14="http://schemas.microsoft.com/office/drawing/2010/main" xmlns:ma14="http://schemas.microsoft.com/office/mac/drawingml/2011/main" val="1"/>
             </a:ext>
           </a:extLst>
         </p:spPr>
@@ -10339,7 +10535,7 @@
           </a:ln>
           <a:extLst>
             <a:ext uri="{C572A759-6A51-4108-AA02-DFA0A04FC94B}">
-              <ma14:wrappingTextBoxFlag xmlns:ma14="http://schemas.microsoft.com/office/mac/drawingml/2011/main" xmlns:a14="http://schemas.microsoft.com/office/drawing/2010/main" xmlns:m="http://schemas.openxmlformats.org/officeDocument/2006/math" xmlns="" val="1"/>
+              <ma14:wrappingTextBoxFlag xmlns="" xmlns:m="http://schemas.openxmlformats.org/officeDocument/2006/math" xmlns:a14="http://schemas.microsoft.com/office/drawing/2010/main" xmlns:ma14="http://schemas.microsoft.com/office/mac/drawingml/2011/main" val="1"/>
             </a:ext>
           </a:extLst>
         </p:spPr>
@@ -10383,7 +10579,7 @@
           </a:ln>
           <a:extLst>
             <a:ext uri="{C572A759-6A51-4108-AA02-DFA0A04FC94B}">
-              <ma14:wrappingTextBoxFlag xmlns:ma14="http://schemas.microsoft.com/office/mac/drawingml/2011/main" xmlns:a14="http://schemas.microsoft.com/office/drawing/2010/main" xmlns:m="http://schemas.openxmlformats.org/officeDocument/2006/math" xmlns="" val="1"/>
+              <ma14:wrappingTextBoxFlag xmlns="" xmlns:m="http://schemas.openxmlformats.org/officeDocument/2006/math" xmlns:a14="http://schemas.microsoft.com/office/drawing/2010/main" xmlns:ma14="http://schemas.microsoft.com/office/mac/drawingml/2011/main" val="1"/>
             </a:ext>
           </a:extLst>
         </p:spPr>
@@ -10466,7 +10662,7 @@
           </a:ln>
           <a:extLst>
             <a:ext uri="{C572A759-6A51-4108-AA02-DFA0A04FC94B}">
-              <ma14:wrappingTextBoxFlag xmlns:ma14="http://schemas.microsoft.com/office/mac/drawingml/2011/main" xmlns:a14="http://schemas.microsoft.com/office/drawing/2010/main" xmlns:m="http://schemas.openxmlformats.org/officeDocument/2006/math" xmlns="" val="1"/>
+              <ma14:wrappingTextBoxFlag xmlns="" xmlns:m="http://schemas.openxmlformats.org/officeDocument/2006/math" xmlns:a14="http://schemas.microsoft.com/office/drawing/2010/main" xmlns:ma14="http://schemas.microsoft.com/office/mac/drawingml/2011/main" val="1"/>
             </a:ext>
           </a:extLst>
         </p:spPr>
@@ -10648,7 +10844,7 @@
           </a:ln>
           <a:extLst>
             <a:ext uri="{C572A759-6A51-4108-AA02-DFA0A04FC94B}">
-              <ma14:wrappingTextBoxFlag xmlns:ma14="http://schemas.microsoft.com/office/mac/drawingml/2011/main" xmlns:a14="http://schemas.microsoft.com/office/drawing/2010/main" xmlns:m="http://schemas.openxmlformats.org/officeDocument/2006/math" xmlns="" val="1"/>
+              <ma14:wrappingTextBoxFlag xmlns="" xmlns:m="http://schemas.openxmlformats.org/officeDocument/2006/math" xmlns:a14="http://schemas.microsoft.com/office/drawing/2010/main" xmlns:ma14="http://schemas.microsoft.com/office/mac/drawingml/2011/main" val="1"/>
             </a:ext>
           </a:extLst>
         </p:spPr>
@@ -10692,7 +10888,7 @@
           </a:ln>
           <a:extLst>
             <a:ext uri="{C572A759-6A51-4108-AA02-DFA0A04FC94B}">
-              <ma14:wrappingTextBoxFlag xmlns:ma14="http://schemas.microsoft.com/office/mac/drawingml/2011/main" xmlns:a14="http://schemas.microsoft.com/office/drawing/2010/main" xmlns:m="http://schemas.openxmlformats.org/officeDocument/2006/math" xmlns="" val="1"/>
+              <ma14:wrappingTextBoxFlag xmlns="" xmlns:m="http://schemas.openxmlformats.org/officeDocument/2006/math" xmlns:a14="http://schemas.microsoft.com/office/drawing/2010/main" xmlns:ma14="http://schemas.microsoft.com/office/mac/drawingml/2011/main" val="1"/>
             </a:ext>
           </a:extLst>
         </p:spPr>
@@ -10736,7 +10932,7 @@
           </a:ln>
           <a:extLst>
             <a:ext uri="{C572A759-6A51-4108-AA02-DFA0A04FC94B}">
-              <ma14:wrappingTextBoxFlag xmlns:ma14="http://schemas.microsoft.com/office/mac/drawingml/2011/main" xmlns:a14="http://schemas.microsoft.com/office/drawing/2010/main" xmlns:m="http://schemas.openxmlformats.org/officeDocument/2006/math" xmlns="" val="1"/>
+              <ma14:wrappingTextBoxFlag xmlns="" xmlns:m="http://schemas.openxmlformats.org/officeDocument/2006/math" xmlns:a14="http://schemas.microsoft.com/office/drawing/2010/main" xmlns:ma14="http://schemas.microsoft.com/office/mac/drawingml/2011/main" val="1"/>
             </a:ext>
           </a:extLst>
         </p:spPr>
@@ -10852,7 +11048,7 @@
           </a:ln>
           <a:extLst>
             <a:ext uri="{C572A759-6A51-4108-AA02-DFA0A04FC94B}">
-              <ma14:wrappingTextBoxFlag xmlns:ma14="http://schemas.microsoft.com/office/mac/drawingml/2011/main" xmlns:a14="http://schemas.microsoft.com/office/drawing/2010/main" xmlns:m="http://schemas.openxmlformats.org/officeDocument/2006/math" xmlns="" val="1"/>
+              <ma14:wrappingTextBoxFlag xmlns="" xmlns:m="http://schemas.openxmlformats.org/officeDocument/2006/math" xmlns:a14="http://schemas.microsoft.com/office/drawing/2010/main" xmlns:ma14="http://schemas.microsoft.com/office/mac/drawingml/2011/main" val="1"/>
             </a:ext>
           </a:extLst>
         </p:spPr>
@@ -11067,7 +11263,7 @@
           </a:ln>
           <a:extLst>
             <a:ext uri="{C572A759-6A51-4108-AA02-DFA0A04FC94B}">
-              <ma14:wrappingTextBoxFlag xmlns:ma14="http://schemas.microsoft.com/office/mac/drawingml/2011/main" xmlns:a14="http://schemas.microsoft.com/office/drawing/2010/main" xmlns:m="http://schemas.openxmlformats.org/officeDocument/2006/math" xmlns="" val="1"/>
+              <ma14:wrappingTextBoxFlag xmlns="" xmlns:m="http://schemas.openxmlformats.org/officeDocument/2006/math" xmlns:a14="http://schemas.microsoft.com/office/drawing/2010/main" xmlns:ma14="http://schemas.microsoft.com/office/mac/drawingml/2011/main" val="1"/>
             </a:ext>
           </a:extLst>
         </p:spPr>
@@ -11111,7 +11307,7 @@
           </a:ln>
           <a:extLst>
             <a:ext uri="{C572A759-6A51-4108-AA02-DFA0A04FC94B}">
-              <ma14:wrappingTextBoxFlag xmlns:ma14="http://schemas.microsoft.com/office/mac/drawingml/2011/main" xmlns:a14="http://schemas.microsoft.com/office/drawing/2010/main" xmlns:m="http://schemas.openxmlformats.org/officeDocument/2006/math" xmlns="" val="1"/>
+              <ma14:wrappingTextBoxFlag xmlns="" xmlns:m="http://schemas.openxmlformats.org/officeDocument/2006/math" xmlns:a14="http://schemas.microsoft.com/office/drawing/2010/main" xmlns:ma14="http://schemas.microsoft.com/office/mac/drawingml/2011/main" val="1"/>
             </a:ext>
           </a:extLst>
         </p:spPr>
@@ -11155,7 +11351,7 @@
           </a:ln>
           <a:extLst>
             <a:ext uri="{C572A759-6A51-4108-AA02-DFA0A04FC94B}">
-              <ma14:wrappingTextBoxFlag xmlns:ma14="http://schemas.microsoft.com/office/mac/drawingml/2011/main" xmlns:a14="http://schemas.microsoft.com/office/drawing/2010/main" xmlns:m="http://schemas.openxmlformats.org/officeDocument/2006/math" xmlns="" val="1"/>
+              <ma14:wrappingTextBoxFlag xmlns="" xmlns:m="http://schemas.openxmlformats.org/officeDocument/2006/math" xmlns:a14="http://schemas.microsoft.com/office/drawing/2010/main" xmlns:ma14="http://schemas.microsoft.com/office/mac/drawingml/2011/main" val="1"/>
             </a:ext>
           </a:extLst>
         </p:spPr>
@@ -11243,7 +11439,7 @@
           </a:ln>
           <a:extLst>
             <a:ext uri="{C572A759-6A51-4108-AA02-DFA0A04FC94B}">
-              <ma14:wrappingTextBoxFlag xmlns:ma14="http://schemas.microsoft.com/office/mac/drawingml/2011/main" xmlns:a14="http://schemas.microsoft.com/office/drawing/2010/main" xmlns:m="http://schemas.openxmlformats.org/officeDocument/2006/math" xmlns="" val="1"/>
+              <ma14:wrappingTextBoxFlag xmlns="" xmlns:m="http://schemas.openxmlformats.org/officeDocument/2006/math" xmlns:a14="http://schemas.microsoft.com/office/drawing/2010/main" xmlns:ma14="http://schemas.microsoft.com/office/mac/drawingml/2011/main" val="1"/>
             </a:ext>
           </a:extLst>
         </p:spPr>
@@ -11524,7 +11720,7 @@
           </a:ln>
           <a:extLst>
             <a:ext uri="{C572A759-6A51-4108-AA02-DFA0A04FC94B}">
-              <ma14:wrappingTextBoxFlag xmlns:ma14="http://schemas.microsoft.com/office/mac/drawingml/2011/main" xmlns:a14="http://schemas.microsoft.com/office/drawing/2010/main" xmlns:m="http://schemas.openxmlformats.org/officeDocument/2006/math" xmlns="" val="1"/>
+              <ma14:wrappingTextBoxFlag xmlns="" xmlns:m="http://schemas.openxmlformats.org/officeDocument/2006/math" xmlns:a14="http://schemas.microsoft.com/office/drawing/2010/main" xmlns:ma14="http://schemas.microsoft.com/office/mac/drawingml/2011/main" val="1"/>
             </a:ext>
           </a:extLst>
         </p:spPr>
@@ -11559,7 +11755,7 @@
           </a:ln>
           <a:extLst>
             <a:ext uri="{C572A759-6A51-4108-AA02-DFA0A04FC94B}">
-              <ma14:wrappingTextBoxFlag xmlns:ma14="http://schemas.microsoft.com/office/mac/drawingml/2011/main" xmlns:a14="http://schemas.microsoft.com/office/drawing/2010/main" xmlns:m="http://schemas.openxmlformats.org/officeDocument/2006/math" xmlns="" val="1"/>
+              <ma14:wrappingTextBoxFlag xmlns="" xmlns:m="http://schemas.openxmlformats.org/officeDocument/2006/math" xmlns:a14="http://schemas.microsoft.com/office/drawing/2010/main" xmlns:ma14="http://schemas.microsoft.com/office/mac/drawingml/2011/main" val="1"/>
             </a:ext>
           </a:extLst>
         </p:spPr>
@@ -11594,7 +11790,7 @@
           </a:ln>
           <a:extLst>
             <a:ext uri="{C572A759-6A51-4108-AA02-DFA0A04FC94B}">
-              <ma14:wrappingTextBoxFlag xmlns:ma14="http://schemas.microsoft.com/office/mac/drawingml/2011/main" xmlns:a14="http://schemas.microsoft.com/office/drawing/2010/main" xmlns:m="http://schemas.openxmlformats.org/officeDocument/2006/math" xmlns="" val="1"/>
+              <ma14:wrappingTextBoxFlag xmlns="" xmlns:m="http://schemas.openxmlformats.org/officeDocument/2006/math" xmlns:a14="http://schemas.microsoft.com/office/drawing/2010/main" xmlns:ma14="http://schemas.microsoft.com/office/mac/drawingml/2011/main" val="1"/>
             </a:ext>
           </a:extLst>
         </p:spPr>
@@ -11744,7 +11940,7 @@
           </a:ln>
           <a:extLst>
             <a:ext uri="{C572A759-6A51-4108-AA02-DFA0A04FC94B}">
-              <ma14:wrappingTextBoxFlag xmlns:ma14="http://schemas.microsoft.com/office/mac/drawingml/2011/main" xmlns:a14="http://schemas.microsoft.com/office/drawing/2010/main" xmlns:m="http://schemas.openxmlformats.org/officeDocument/2006/math" xmlns="" val="1"/>
+              <ma14:wrappingTextBoxFlag xmlns="" xmlns:m="http://schemas.openxmlformats.org/officeDocument/2006/math" xmlns:a14="http://schemas.microsoft.com/office/drawing/2010/main" xmlns:ma14="http://schemas.microsoft.com/office/mac/drawingml/2011/main" val="1"/>
             </a:ext>
           </a:extLst>
         </p:spPr>
@@ -11782,7 +11978,7 @@
           </a:ln>
           <a:extLst>
             <a:ext uri="{C572A759-6A51-4108-AA02-DFA0A04FC94B}">
-              <ma14:wrappingTextBoxFlag xmlns:ma14="http://schemas.microsoft.com/office/mac/drawingml/2011/main" xmlns:a14="http://schemas.microsoft.com/office/drawing/2010/main" xmlns:m="http://schemas.openxmlformats.org/officeDocument/2006/math" xmlns="" val="1"/>
+              <ma14:wrappingTextBoxFlag xmlns="" xmlns:m="http://schemas.openxmlformats.org/officeDocument/2006/math" xmlns:a14="http://schemas.microsoft.com/office/drawing/2010/main" xmlns:ma14="http://schemas.microsoft.com/office/mac/drawingml/2011/main" val="1"/>
             </a:ext>
           </a:extLst>
         </p:spPr>
@@ -11820,7 +12016,7 @@
           </a:ln>
           <a:extLst>
             <a:ext uri="{C572A759-6A51-4108-AA02-DFA0A04FC94B}">
-              <ma14:wrappingTextBoxFlag xmlns:ma14="http://schemas.microsoft.com/office/mac/drawingml/2011/main" xmlns:a14="http://schemas.microsoft.com/office/drawing/2010/main" xmlns:m="http://schemas.openxmlformats.org/officeDocument/2006/math" xmlns="" val="1"/>
+              <ma14:wrappingTextBoxFlag xmlns="" xmlns:m="http://schemas.openxmlformats.org/officeDocument/2006/math" xmlns:a14="http://schemas.microsoft.com/office/drawing/2010/main" xmlns:ma14="http://schemas.microsoft.com/office/mac/drawingml/2011/main" val="1"/>
             </a:ext>
           </a:extLst>
         </p:spPr>
@@ -11855,7 +12051,7 @@
           </a:ln>
           <a:extLst>
             <a:ext uri="{C572A759-6A51-4108-AA02-DFA0A04FC94B}">
-              <ma14:wrappingTextBoxFlag xmlns:ma14="http://schemas.microsoft.com/office/mac/drawingml/2011/main" xmlns:a14="http://schemas.microsoft.com/office/drawing/2010/main" xmlns:m="http://schemas.openxmlformats.org/officeDocument/2006/math" xmlns="" val="1"/>
+              <ma14:wrappingTextBoxFlag xmlns="" xmlns:m="http://schemas.openxmlformats.org/officeDocument/2006/math" xmlns:a14="http://schemas.microsoft.com/office/drawing/2010/main" xmlns:ma14="http://schemas.microsoft.com/office/mac/drawingml/2011/main" val="1"/>
             </a:ext>
           </a:extLst>
         </p:spPr>
@@ -11984,7 +12180,7 @@
           </a:ln>
           <a:extLst>
             <a:ext uri="{C572A759-6A51-4108-AA02-DFA0A04FC94B}">
-              <ma14:wrappingTextBoxFlag xmlns:ma14="http://schemas.microsoft.com/office/mac/drawingml/2011/main" xmlns:a14="http://schemas.microsoft.com/office/drawing/2010/main" xmlns:m="http://schemas.openxmlformats.org/officeDocument/2006/math" xmlns="" val="1"/>
+              <ma14:wrappingTextBoxFlag xmlns="" xmlns:m="http://schemas.openxmlformats.org/officeDocument/2006/math" xmlns:a14="http://schemas.microsoft.com/office/drawing/2010/main" xmlns:ma14="http://schemas.microsoft.com/office/mac/drawingml/2011/main" val="1"/>
             </a:ext>
           </a:extLst>
         </p:spPr>
@@ -12087,6 +12283,10 @@
               <a:buNone/>
             </a:pPr>
             <a:r>
+              <a:rPr dirty="0">
+                <a:latin typeface="Calibri" panose="020F0502020204030204" pitchFamily="34" charset="0"/>
+                <a:cs typeface="Calibri" panose="020F0502020204030204" pitchFamily="34" charset="0"/>
+              </a:rPr>
               <a:t>From Strings to Lists</a:t>
             </a:r>
           </a:p>
@@ -12096,6 +12296,10 @@
               <a:buNone/>
             </a:pPr>
             <a:r>
+              <a:rPr dirty="0">
+                <a:latin typeface="Calibri" panose="020F0502020204030204" pitchFamily="34" charset="0"/>
+                <a:cs typeface="Calibri" panose="020F0502020204030204" pitchFamily="34" charset="0"/>
+              </a:rPr>
               <a:t>More Sequence Capabilities</a:t>
             </a:r>
           </a:p>
@@ -12114,6 +12318,10 @@
               </a:defRPr>
             </a:pPr>
             <a:r>
+              <a:rPr dirty="0">
+                <a:latin typeface="Calibri" panose="020F0502020204030204" pitchFamily="34" charset="0"/>
+                <a:cs typeface="Calibri" panose="020F0502020204030204" pitchFamily="34" charset="0"/>
+              </a:rPr>
               <a:t>Difference 1: Flexibility of Types</a:t>
             </a:r>
           </a:p>
@@ -12123,6 +12331,10 @@
               <a:buNone/>
             </a:pPr>
             <a:r>
+              <a:rPr dirty="0">
+                <a:latin typeface="Calibri" panose="020F0502020204030204" pitchFamily="34" charset="0"/>
+                <a:cs typeface="Calibri" panose="020F0502020204030204" pitchFamily="34" charset="0"/>
+              </a:rPr>
               <a:t>Difference 2: Mutability</a:t>
             </a:r>
           </a:p>
@@ -12132,6 +12344,10 @@
               <a:buNone/>
             </a:pPr>
             <a:r>
+              <a:rPr dirty="0">
+                <a:latin typeface="Calibri" panose="020F0502020204030204" pitchFamily="34" charset="0"/>
+                <a:cs typeface="Calibri" panose="020F0502020204030204" pitchFamily="34" charset="0"/>
+              </a:rPr>
               <a:t>Transforming between Strings and Lists</a:t>
             </a:r>
           </a:p>
@@ -12185,7 +12401,7 @@
           </a:ln>
           <a:extLst>
             <a:ext uri="{C572A759-6A51-4108-AA02-DFA0A04FC94B}">
-              <ma14:wrappingTextBoxFlag xmlns:ma14="http://schemas.microsoft.com/office/mac/drawingml/2011/main" xmlns:a14="http://schemas.microsoft.com/office/drawing/2010/main" xmlns:m="http://schemas.openxmlformats.org/officeDocument/2006/math" xmlns="" val="1"/>
+              <ma14:wrappingTextBoxFlag xmlns="" xmlns:m="http://schemas.openxmlformats.org/officeDocument/2006/math" xmlns:a14="http://schemas.microsoft.com/office/drawing/2010/main" xmlns:ma14="http://schemas.microsoft.com/office/mac/drawingml/2011/main" val="1"/>
             </a:ext>
           </a:extLst>
         </p:spPr>
@@ -12294,6 +12510,10 @@
               <a:buNone/>
             </a:pPr>
             <a:r>
+              <a:rPr dirty="0">
+                <a:latin typeface="Calibri" panose="020F0502020204030204" pitchFamily="34" charset="0"/>
+                <a:cs typeface="Calibri" panose="020F0502020204030204" pitchFamily="34" charset="0"/>
+              </a:rPr>
               <a:t>string, bool, int, float</a:t>
             </a:r>
           </a:p>
@@ -12303,6 +12523,10 @@
               <a:buNone/>
             </a:pPr>
             <a:r>
+              <a:rPr dirty="0">
+                <a:latin typeface="Calibri" panose="020F0502020204030204" pitchFamily="34" charset="0"/>
+                <a:cs typeface="Calibri" panose="020F0502020204030204" pitchFamily="34" charset="0"/>
+              </a:rPr>
               <a:t>even other lists!</a:t>
             </a:r>
           </a:p>
@@ -12327,7 +12551,7 @@
           </a:ln>
           <a:extLst>
             <a:ext uri="{C572A759-6A51-4108-AA02-DFA0A04FC94B}">
-              <ma14:wrappingTextBoxFlag xmlns:ma14="http://schemas.microsoft.com/office/mac/drawingml/2011/main" xmlns:a14="http://schemas.microsoft.com/office/drawing/2010/main" xmlns:m="http://schemas.openxmlformats.org/officeDocument/2006/math" xmlns="" val="1"/>
+              <ma14:wrappingTextBoxFlag xmlns="" xmlns:m="http://schemas.openxmlformats.org/officeDocument/2006/math" xmlns:a14="http://schemas.microsoft.com/office/drawing/2010/main" xmlns:ma14="http://schemas.microsoft.com/office/mac/drawingml/2011/main" val="1"/>
             </a:ext>
           </a:extLst>
         </p:spPr>
@@ -12366,7 +12590,7 @@
           </a:ln>
           <a:extLst>
             <a:ext uri="{C572A759-6A51-4108-AA02-DFA0A04FC94B}">
-              <ma14:wrappingTextBoxFlag xmlns:ma14="http://schemas.microsoft.com/office/mac/drawingml/2011/main" xmlns:a14="http://schemas.microsoft.com/office/drawing/2010/main" xmlns:m="http://schemas.openxmlformats.org/officeDocument/2006/math" xmlns="" val="1"/>
+              <ma14:wrappingTextBoxFlag xmlns="" xmlns:m="http://schemas.openxmlformats.org/officeDocument/2006/math" xmlns:a14="http://schemas.microsoft.com/office/drawing/2010/main" xmlns:ma14="http://schemas.microsoft.com/office/mac/drawingml/2011/main" val="1"/>
             </a:ext>
           </a:extLst>
         </p:spPr>
@@ -12467,7 +12691,7 @@
           </a:ln>
           <a:extLst>
             <a:ext uri="{C572A759-6A51-4108-AA02-DFA0A04FC94B}">
-              <ma14:wrappingTextBoxFlag xmlns:ma14="http://schemas.microsoft.com/office/mac/drawingml/2011/main" xmlns:a14="http://schemas.microsoft.com/office/drawing/2010/main" xmlns:m="http://schemas.openxmlformats.org/officeDocument/2006/math" xmlns="" val="1"/>
+              <ma14:wrappingTextBoxFlag xmlns="" xmlns:m="http://schemas.openxmlformats.org/officeDocument/2006/math" xmlns:a14="http://schemas.microsoft.com/office/drawing/2010/main" xmlns:ma14="http://schemas.microsoft.com/office/mac/drawingml/2011/main" val="1"/>
             </a:ext>
           </a:extLst>
         </p:spPr>
@@ -12648,7 +12872,7 @@
           </a:ln>
           <a:extLst>
             <a:ext uri="{C572A759-6A51-4108-AA02-DFA0A04FC94B}">
-              <ma14:wrappingTextBoxFlag xmlns:ma14="http://schemas.microsoft.com/office/mac/drawingml/2011/main" xmlns:a14="http://schemas.microsoft.com/office/drawing/2010/main" xmlns:m="http://schemas.openxmlformats.org/officeDocument/2006/math" xmlns="" val="1"/>
+              <ma14:wrappingTextBoxFlag xmlns="" xmlns:m="http://schemas.openxmlformats.org/officeDocument/2006/math" xmlns:a14="http://schemas.microsoft.com/office/drawing/2010/main" xmlns:ma14="http://schemas.microsoft.com/office/mac/drawingml/2011/main" val="1"/>
             </a:ext>
           </a:extLst>
         </p:spPr>
@@ -12756,7 +12980,7 @@
           </a:ln>
           <a:extLst>
             <a:ext uri="{C572A759-6A51-4108-AA02-DFA0A04FC94B}">
-              <ma14:wrappingTextBoxFlag xmlns:ma14="http://schemas.microsoft.com/office/mac/drawingml/2011/main" xmlns:a14="http://schemas.microsoft.com/office/drawing/2010/main" xmlns:m="http://schemas.openxmlformats.org/officeDocument/2006/math" xmlns="" val="1"/>
+              <ma14:wrappingTextBoxFlag xmlns="" xmlns:m="http://schemas.openxmlformats.org/officeDocument/2006/math" xmlns:a14="http://schemas.microsoft.com/office/drawing/2010/main" xmlns:ma14="http://schemas.microsoft.com/office/mac/drawingml/2011/main" val="1"/>
             </a:ext>
           </a:extLst>
         </p:spPr>
@@ -12890,6 +13114,7 @@
               <a:buNone/>
             </a:pPr>
             <a:r>
+              <a:rPr dirty="0"/>
               <a:t>From Strings to Lists</a:t>
             </a:r>
           </a:p>
@@ -12899,6 +13124,7 @@
               <a:buNone/>
             </a:pPr>
             <a:r>
+              <a:rPr dirty="0"/>
               <a:t>More Sequence Capabilities</a:t>
             </a:r>
           </a:p>
@@ -12908,6 +13134,7 @@
               <a:buNone/>
             </a:pPr>
             <a:r>
+              <a:rPr dirty="0"/>
               <a:t>Difference 1: Flexibility of Types</a:t>
             </a:r>
           </a:p>
@@ -12926,7 +13153,15 @@
               </a:defRPr>
             </a:pPr>
             <a:r>
-              <a:t>Difference 2: Mutability</a:t>
+              <a:rPr dirty="0">
+                <a:latin typeface="Calibri" panose="020F0502020204030204" pitchFamily="34" charset="0"/>
+                <a:cs typeface="Calibri" panose="020F0502020204030204" pitchFamily="34" charset="0"/>
+              </a:rPr>
+              <a:t>Difference</a:t>
+            </a:r>
+            <a:r>
+              <a:rPr dirty="0"/>
+              <a:t> 2: Mutability</a:t>
             </a:r>
           </a:p>
           <a:p>
@@ -12935,6 +13170,7 @@
               <a:buNone/>
             </a:pPr>
             <a:r>
+              <a:rPr dirty="0"/>
               <a:t>Transforming between Strings and Lists</a:t>
             </a:r>
           </a:p>
@@ -13316,7 +13552,7 @@
           </a:ln>
           <a:extLst>
             <a:ext uri="{C572A759-6A51-4108-AA02-DFA0A04FC94B}">
-              <ma14:wrappingTextBoxFlag xmlns:ma14="http://schemas.microsoft.com/office/mac/drawingml/2011/main" xmlns:a14="http://schemas.microsoft.com/office/drawing/2010/main" xmlns:m="http://schemas.openxmlformats.org/officeDocument/2006/math" xmlns="" val="1"/>
+              <ma14:wrappingTextBoxFlag xmlns="" xmlns:m="http://schemas.openxmlformats.org/officeDocument/2006/math" xmlns:a14="http://schemas.microsoft.com/office/drawing/2010/main" xmlns:ma14="http://schemas.microsoft.com/office/mac/drawingml/2011/main" val="1"/>
             </a:ext>
           </a:extLst>
         </p:spPr>
@@ -13355,7 +13591,7 @@
           </a:ln>
           <a:extLst>
             <a:ext uri="{C572A759-6A51-4108-AA02-DFA0A04FC94B}">
-              <ma14:wrappingTextBoxFlag xmlns:ma14="http://schemas.microsoft.com/office/mac/drawingml/2011/main" xmlns:a14="http://schemas.microsoft.com/office/drawing/2010/main" xmlns:m="http://schemas.openxmlformats.org/officeDocument/2006/math" xmlns="" val="1"/>
+              <ma14:wrappingTextBoxFlag xmlns="" xmlns:m="http://schemas.openxmlformats.org/officeDocument/2006/math" xmlns:a14="http://schemas.microsoft.com/office/drawing/2010/main" xmlns:ma14="http://schemas.microsoft.com/office/mac/drawingml/2011/main" val="1"/>
             </a:ext>
           </a:extLst>
         </p:spPr>
@@ -13394,7 +13630,7 @@
           </a:ln>
           <a:extLst>
             <a:ext uri="{C572A759-6A51-4108-AA02-DFA0A04FC94B}">
-              <ma14:wrappingTextBoxFlag xmlns:ma14="http://schemas.microsoft.com/office/mac/drawingml/2011/main" xmlns:a14="http://schemas.microsoft.com/office/drawing/2010/main" xmlns:m="http://schemas.openxmlformats.org/officeDocument/2006/math" xmlns="" val="1"/>
+              <ma14:wrappingTextBoxFlag xmlns="" xmlns:m="http://schemas.openxmlformats.org/officeDocument/2006/math" xmlns:a14="http://schemas.microsoft.com/office/drawing/2010/main" xmlns:ma14="http://schemas.microsoft.com/office/mac/drawingml/2011/main" val="1"/>
             </a:ext>
           </a:extLst>
         </p:spPr>
@@ -13437,7 +13673,7 @@
           </a:ln>
           <a:extLst>
             <a:ext uri="{C572A759-6A51-4108-AA02-DFA0A04FC94B}">
-              <ma14:wrappingTextBoxFlag xmlns:ma14="http://schemas.microsoft.com/office/mac/drawingml/2011/main" xmlns:a14="http://schemas.microsoft.com/office/drawing/2010/main" xmlns:m="http://schemas.openxmlformats.org/officeDocument/2006/math" xmlns="" val="1"/>
+              <ma14:wrappingTextBoxFlag xmlns="" xmlns:m="http://schemas.openxmlformats.org/officeDocument/2006/math" xmlns:a14="http://schemas.microsoft.com/office/drawing/2010/main" xmlns:ma14="http://schemas.microsoft.com/office/mac/drawingml/2011/main" val="1"/>
             </a:ext>
           </a:extLst>
         </p:spPr>
@@ -13480,7 +13716,7 @@
           </a:ln>
           <a:extLst>
             <a:ext uri="{C572A759-6A51-4108-AA02-DFA0A04FC94B}">
-              <ma14:wrappingTextBoxFlag xmlns:ma14="http://schemas.microsoft.com/office/mac/drawingml/2011/main" xmlns:a14="http://schemas.microsoft.com/office/drawing/2010/main" xmlns:m="http://schemas.openxmlformats.org/officeDocument/2006/math" xmlns="" val="1"/>
+              <ma14:wrappingTextBoxFlag xmlns="" xmlns:m="http://schemas.openxmlformats.org/officeDocument/2006/math" xmlns:a14="http://schemas.microsoft.com/office/drawing/2010/main" xmlns:ma14="http://schemas.microsoft.com/office/mac/drawingml/2011/main" val="1"/>
             </a:ext>
           </a:extLst>
         </p:spPr>
@@ -13524,7 +13760,7 @@
           </a:ln>
           <a:extLst>
             <a:ext uri="{C572A759-6A51-4108-AA02-DFA0A04FC94B}">
-              <ma14:wrappingTextBoxFlag xmlns:ma14="http://schemas.microsoft.com/office/mac/drawingml/2011/main" xmlns:a14="http://schemas.microsoft.com/office/drawing/2010/main" xmlns:m="http://schemas.openxmlformats.org/officeDocument/2006/math" xmlns="" val="1"/>
+              <ma14:wrappingTextBoxFlag xmlns="" xmlns:m="http://schemas.openxmlformats.org/officeDocument/2006/math" xmlns:a14="http://schemas.microsoft.com/office/drawing/2010/main" xmlns:ma14="http://schemas.microsoft.com/office/mac/drawingml/2011/main" val="1"/>
             </a:ext>
           </a:extLst>
         </p:spPr>
@@ -13568,7 +13804,7 @@
           </a:ln>
           <a:extLst>
             <a:ext uri="{C572A759-6A51-4108-AA02-DFA0A04FC94B}">
-              <ma14:wrappingTextBoxFlag xmlns:ma14="http://schemas.microsoft.com/office/mac/drawingml/2011/main" xmlns:a14="http://schemas.microsoft.com/office/drawing/2010/main" xmlns:m="http://schemas.openxmlformats.org/officeDocument/2006/math" xmlns="" val="1"/>
+              <ma14:wrappingTextBoxFlag xmlns="" xmlns:m="http://schemas.openxmlformats.org/officeDocument/2006/math" xmlns:a14="http://schemas.microsoft.com/office/drawing/2010/main" xmlns:ma14="http://schemas.microsoft.com/office/mac/drawingml/2011/main" val="1"/>
             </a:ext>
           </a:extLst>
         </p:spPr>
@@ -13612,7 +13848,7 @@
           </a:ln>
           <a:extLst>
             <a:ext uri="{C572A759-6A51-4108-AA02-DFA0A04FC94B}">
-              <ma14:wrappingTextBoxFlag xmlns:ma14="http://schemas.microsoft.com/office/mac/drawingml/2011/main" xmlns:a14="http://schemas.microsoft.com/office/drawing/2010/main" xmlns:m="http://schemas.openxmlformats.org/officeDocument/2006/math" xmlns="" val="1"/>
+              <ma14:wrappingTextBoxFlag xmlns="" xmlns:m="http://schemas.openxmlformats.org/officeDocument/2006/math" xmlns:a14="http://schemas.microsoft.com/office/drawing/2010/main" xmlns:ma14="http://schemas.microsoft.com/office/mac/drawingml/2011/main" val="1"/>
             </a:ext>
           </a:extLst>
         </p:spPr>
@@ -13656,7 +13892,7 @@
           </a:ln>
           <a:extLst>
             <a:ext uri="{C572A759-6A51-4108-AA02-DFA0A04FC94B}">
-              <ma14:wrappingTextBoxFlag xmlns:ma14="http://schemas.microsoft.com/office/mac/drawingml/2011/main" xmlns:a14="http://schemas.microsoft.com/office/drawing/2010/main" xmlns:m="http://schemas.openxmlformats.org/officeDocument/2006/math" xmlns="" val="1"/>
+              <ma14:wrappingTextBoxFlag xmlns="" xmlns:m="http://schemas.openxmlformats.org/officeDocument/2006/math" xmlns:a14="http://schemas.microsoft.com/office/drawing/2010/main" xmlns:ma14="http://schemas.microsoft.com/office/mac/drawingml/2011/main" val="1"/>
             </a:ext>
           </a:extLst>
         </p:spPr>
@@ -13700,7 +13936,7 @@
           </a:ln>
           <a:extLst>
             <a:ext uri="{C572A759-6A51-4108-AA02-DFA0A04FC94B}">
-              <ma14:wrappingTextBoxFlag xmlns:ma14="http://schemas.microsoft.com/office/mac/drawingml/2011/main" xmlns:a14="http://schemas.microsoft.com/office/drawing/2010/main" xmlns:m="http://schemas.openxmlformats.org/officeDocument/2006/math" xmlns="" val="1"/>
+              <ma14:wrappingTextBoxFlag xmlns="" xmlns:m="http://schemas.openxmlformats.org/officeDocument/2006/math" xmlns:a14="http://schemas.microsoft.com/office/drawing/2010/main" xmlns:ma14="http://schemas.microsoft.com/office/mac/drawingml/2011/main" val="1"/>
             </a:ext>
           </a:extLst>
         </p:spPr>
@@ -13744,7 +13980,7 @@
           </a:ln>
           <a:extLst>
             <a:ext uri="{C572A759-6A51-4108-AA02-DFA0A04FC94B}">
-              <ma14:wrappingTextBoxFlag xmlns:ma14="http://schemas.microsoft.com/office/mac/drawingml/2011/main" xmlns:a14="http://schemas.microsoft.com/office/drawing/2010/main" xmlns:m="http://schemas.openxmlformats.org/officeDocument/2006/math" xmlns="" val="1"/>
+              <ma14:wrappingTextBoxFlag xmlns="" xmlns:m="http://schemas.openxmlformats.org/officeDocument/2006/math" xmlns:a14="http://schemas.microsoft.com/office/drawing/2010/main" xmlns:ma14="http://schemas.microsoft.com/office/mac/drawingml/2011/main" val="1"/>
             </a:ext>
           </a:extLst>
         </p:spPr>
@@ -13788,7 +14024,7 @@
           </a:ln>
           <a:extLst>
             <a:ext uri="{C572A759-6A51-4108-AA02-DFA0A04FC94B}">
-              <ma14:wrappingTextBoxFlag xmlns:ma14="http://schemas.microsoft.com/office/mac/drawingml/2011/main" xmlns:a14="http://schemas.microsoft.com/office/drawing/2010/main" xmlns:m="http://schemas.openxmlformats.org/officeDocument/2006/math" xmlns="" val="1"/>
+              <ma14:wrappingTextBoxFlag xmlns="" xmlns:m="http://schemas.openxmlformats.org/officeDocument/2006/math" xmlns:a14="http://schemas.microsoft.com/office/drawing/2010/main" xmlns:ma14="http://schemas.microsoft.com/office/mac/drawingml/2011/main" val="1"/>
             </a:ext>
           </a:extLst>
         </p:spPr>
@@ -14646,7 +14882,7 @@
           </a:ln>
           <a:extLst>
             <a:ext uri="{C572A759-6A51-4108-AA02-DFA0A04FC94B}">
-              <ma14:wrappingTextBoxFlag xmlns:ma14="http://schemas.microsoft.com/office/mac/drawingml/2011/main" xmlns:a14="http://schemas.microsoft.com/office/drawing/2010/main" xmlns:m="http://schemas.openxmlformats.org/officeDocument/2006/math" xmlns="" val="1"/>
+              <ma14:wrappingTextBoxFlag xmlns="" xmlns:m="http://schemas.openxmlformats.org/officeDocument/2006/math" xmlns:a14="http://schemas.microsoft.com/office/drawing/2010/main" xmlns:ma14="http://schemas.microsoft.com/office/mac/drawingml/2011/main" val="1"/>
             </a:ext>
           </a:extLst>
         </p:spPr>
@@ -14790,7 +15026,7 @@
           </a:ln>
           <a:extLst>
             <a:ext uri="{C572A759-6A51-4108-AA02-DFA0A04FC94B}">
-              <ma14:wrappingTextBoxFlag xmlns:ma14="http://schemas.microsoft.com/office/mac/drawingml/2011/main" xmlns:a14="http://schemas.microsoft.com/office/drawing/2010/main" xmlns:m="http://schemas.openxmlformats.org/officeDocument/2006/math" xmlns="" val="1"/>
+              <ma14:wrappingTextBoxFlag xmlns="" xmlns:m="http://schemas.openxmlformats.org/officeDocument/2006/math" xmlns:a14="http://schemas.microsoft.com/office/drawing/2010/main" xmlns:ma14="http://schemas.microsoft.com/office/mac/drawingml/2011/main" val="1"/>
             </a:ext>
           </a:extLst>
         </p:spPr>
@@ -14843,7 +15079,7 @@
           </a:ln>
           <a:extLst>
             <a:ext uri="{C572A759-6A51-4108-AA02-DFA0A04FC94B}">
-              <ma14:wrappingTextBoxFlag xmlns:ma14="http://schemas.microsoft.com/office/mac/drawingml/2011/main" xmlns:a14="http://schemas.microsoft.com/office/drawing/2010/main" xmlns:m="http://schemas.openxmlformats.org/officeDocument/2006/math" xmlns="" val="1"/>
+              <ma14:wrappingTextBoxFlag xmlns="" xmlns:m="http://schemas.openxmlformats.org/officeDocument/2006/math" xmlns:a14="http://schemas.microsoft.com/office/drawing/2010/main" xmlns:ma14="http://schemas.microsoft.com/office/mac/drawingml/2011/main" val="1"/>
             </a:ext>
           </a:extLst>
         </p:spPr>
@@ -14893,7 +15129,7 @@
           </a:ln>
           <a:extLst>
             <a:ext uri="{C572A759-6A51-4108-AA02-DFA0A04FC94B}">
-              <ma14:wrappingTextBoxFlag xmlns:ma14="http://schemas.microsoft.com/office/mac/drawingml/2011/main" xmlns:a14="http://schemas.microsoft.com/office/drawing/2010/main" xmlns:m="http://schemas.openxmlformats.org/officeDocument/2006/math" xmlns="" val="1"/>
+              <ma14:wrappingTextBoxFlag xmlns="" xmlns:m="http://schemas.openxmlformats.org/officeDocument/2006/math" xmlns:a14="http://schemas.microsoft.com/office/drawing/2010/main" xmlns:ma14="http://schemas.microsoft.com/office/mac/drawingml/2011/main" val="1"/>
             </a:ext>
           </a:extLst>
         </p:spPr>
@@ -14943,7 +15179,7 @@
           </a:ln>
           <a:extLst>
             <a:ext uri="{C572A759-6A51-4108-AA02-DFA0A04FC94B}">
-              <ma14:wrappingTextBoxFlag xmlns:ma14="http://schemas.microsoft.com/office/mac/drawingml/2011/main" xmlns:a14="http://schemas.microsoft.com/office/drawing/2010/main" xmlns:m="http://schemas.openxmlformats.org/officeDocument/2006/math" xmlns="" val="1"/>
+              <ma14:wrappingTextBoxFlag xmlns="" xmlns:m="http://schemas.openxmlformats.org/officeDocument/2006/math" xmlns:a14="http://schemas.microsoft.com/office/drawing/2010/main" xmlns:ma14="http://schemas.microsoft.com/office/mac/drawingml/2011/main" val="1"/>
             </a:ext>
           </a:extLst>
         </p:spPr>
@@ -14993,7 +15229,7 @@
           </a:ln>
           <a:extLst>
             <a:ext uri="{C572A759-6A51-4108-AA02-DFA0A04FC94B}">
-              <ma14:wrappingTextBoxFlag xmlns:ma14="http://schemas.microsoft.com/office/mac/drawingml/2011/main" xmlns:a14="http://schemas.microsoft.com/office/drawing/2010/main" xmlns:m="http://schemas.openxmlformats.org/officeDocument/2006/math" xmlns="" val="1"/>
+              <ma14:wrappingTextBoxFlag xmlns="" xmlns:m="http://schemas.openxmlformats.org/officeDocument/2006/math" xmlns:a14="http://schemas.microsoft.com/office/drawing/2010/main" xmlns:ma14="http://schemas.microsoft.com/office/mac/drawingml/2011/main" val="1"/>
             </a:ext>
           </a:extLst>
         </p:spPr>
@@ -15043,7 +15279,7 @@
           </a:ln>
           <a:extLst>
             <a:ext uri="{C572A759-6A51-4108-AA02-DFA0A04FC94B}">
-              <ma14:wrappingTextBoxFlag xmlns:ma14="http://schemas.microsoft.com/office/mac/drawingml/2011/main" xmlns:a14="http://schemas.microsoft.com/office/drawing/2010/main" xmlns:m="http://schemas.openxmlformats.org/officeDocument/2006/math" xmlns="" val="1"/>
+              <ma14:wrappingTextBoxFlag xmlns="" xmlns:m="http://schemas.openxmlformats.org/officeDocument/2006/math" xmlns:a14="http://schemas.microsoft.com/office/drawing/2010/main" xmlns:ma14="http://schemas.microsoft.com/office/mac/drawingml/2011/main" val="1"/>
             </a:ext>
           </a:extLst>
         </p:spPr>
@@ -15096,7 +15332,7 @@
           </a:ln>
           <a:extLst>
             <a:ext uri="{C572A759-6A51-4108-AA02-DFA0A04FC94B}">
-              <ma14:wrappingTextBoxFlag xmlns:ma14="http://schemas.microsoft.com/office/mac/drawingml/2011/main" xmlns:a14="http://schemas.microsoft.com/office/drawing/2010/main" xmlns:m="http://schemas.openxmlformats.org/officeDocument/2006/math" xmlns="" val="1"/>
+              <ma14:wrappingTextBoxFlag xmlns="" xmlns:m="http://schemas.openxmlformats.org/officeDocument/2006/math" xmlns:a14="http://schemas.microsoft.com/office/drawing/2010/main" xmlns:ma14="http://schemas.microsoft.com/office/mac/drawingml/2011/main" val="1"/>
             </a:ext>
           </a:extLst>
         </p:spPr>
@@ -15138,7 +15374,7 @@
           </a:ln>
           <a:extLst>
             <a:ext uri="{C572A759-6A51-4108-AA02-DFA0A04FC94B}">
-              <ma14:wrappingTextBoxFlag xmlns:ma14="http://schemas.microsoft.com/office/mac/drawingml/2011/main" xmlns:a14="http://schemas.microsoft.com/office/drawing/2010/main" xmlns:m="http://schemas.openxmlformats.org/officeDocument/2006/math" xmlns="" val="1"/>
+              <ma14:wrappingTextBoxFlag xmlns="" xmlns:m="http://schemas.openxmlformats.org/officeDocument/2006/math" xmlns:a14="http://schemas.microsoft.com/office/drawing/2010/main" xmlns:ma14="http://schemas.microsoft.com/office/mac/drawingml/2011/main" val="1"/>
             </a:ext>
           </a:extLst>
         </p:spPr>
@@ -15185,7 +15421,7 @@
           </a:ln>
           <a:extLst>
             <a:ext uri="{C572A759-6A51-4108-AA02-DFA0A04FC94B}">
-              <ma14:wrappingTextBoxFlag xmlns:ma14="http://schemas.microsoft.com/office/mac/drawingml/2011/main" xmlns:a14="http://schemas.microsoft.com/office/drawing/2010/main" xmlns:m="http://schemas.openxmlformats.org/officeDocument/2006/math" xmlns="" val="1"/>
+              <ma14:wrappingTextBoxFlag xmlns="" xmlns:m="http://schemas.openxmlformats.org/officeDocument/2006/math" xmlns:a14="http://schemas.microsoft.com/office/drawing/2010/main" xmlns:ma14="http://schemas.microsoft.com/office/mac/drawingml/2011/main" val="1"/>
             </a:ext>
           </a:extLst>
         </p:spPr>
@@ -15232,7 +15468,7 @@
           </a:ln>
           <a:extLst>
             <a:ext uri="{C572A759-6A51-4108-AA02-DFA0A04FC94B}">
-              <ma14:wrappingTextBoxFlag xmlns:ma14="http://schemas.microsoft.com/office/mac/drawingml/2011/main" xmlns:a14="http://schemas.microsoft.com/office/drawing/2010/main" xmlns:m="http://schemas.openxmlformats.org/officeDocument/2006/math" xmlns="" val="1"/>
+              <ma14:wrappingTextBoxFlag xmlns="" xmlns:m="http://schemas.openxmlformats.org/officeDocument/2006/math" xmlns:a14="http://schemas.microsoft.com/office/drawing/2010/main" xmlns:ma14="http://schemas.microsoft.com/office/mac/drawingml/2011/main" val="1"/>
             </a:ext>
           </a:extLst>
         </p:spPr>
@@ -15279,7 +15515,7 @@
           </a:ln>
           <a:extLst>
             <a:ext uri="{C572A759-6A51-4108-AA02-DFA0A04FC94B}">
-              <ma14:wrappingTextBoxFlag xmlns:ma14="http://schemas.microsoft.com/office/mac/drawingml/2011/main" xmlns:a14="http://schemas.microsoft.com/office/drawing/2010/main" xmlns:m="http://schemas.openxmlformats.org/officeDocument/2006/math" xmlns="" val="1"/>
+              <ma14:wrappingTextBoxFlag xmlns="" xmlns:m="http://schemas.openxmlformats.org/officeDocument/2006/math" xmlns:a14="http://schemas.microsoft.com/office/drawing/2010/main" xmlns:ma14="http://schemas.microsoft.com/office/mac/drawingml/2011/main" val="1"/>
             </a:ext>
           </a:extLst>
         </p:spPr>
@@ -15337,7 +15573,7 @@
           </a:ln>
           <a:extLst>
             <a:ext uri="{C572A759-6A51-4108-AA02-DFA0A04FC94B}">
-              <ma14:wrappingTextBoxFlag xmlns:ma14="http://schemas.microsoft.com/office/mac/drawingml/2011/main" xmlns:a14="http://schemas.microsoft.com/office/drawing/2010/main" xmlns:m="http://schemas.openxmlformats.org/officeDocument/2006/math" xmlns="" val="1"/>
+              <ma14:wrappingTextBoxFlag xmlns="" xmlns:m="http://schemas.openxmlformats.org/officeDocument/2006/math" xmlns:a14="http://schemas.microsoft.com/office/drawing/2010/main" xmlns:ma14="http://schemas.microsoft.com/office/mac/drawingml/2011/main" val="1"/>
             </a:ext>
           </a:extLst>
         </p:spPr>
@@ -15390,7 +15626,7 @@
           </a:ln>
           <a:extLst>
             <a:ext uri="{C572A759-6A51-4108-AA02-DFA0A04FC94B}">
-              <ma14:wrappingTextBoxFlag xmlns:ma14="http://schemas.microsoft.com/office/mac/drawingml/2011/main" xmlns:a14="http://schemas.microsoft.com/office/drawing/2010/main" xmlns:m="http://schemas.openxmlformats.org/officeDocument/2006/math" xmlns="" val="1"/>
+              <ma14:wrappingTextBoxFlag xmlns="" xmlns:m="http://schemas.openxmlformats.org/officeDocument/2006/math" xmlns:a14="http://schemas.microsoft.com/office/drawing/2010/main" xmlns:ma14="http://schemas.microsoft.com/office/mac/drawingml/2011/main" val="1"/>
             </a:ext>
           </a:extLst>
         </p:spPr>
@@ -15443,7 +15679,7 @@
           </a:ln>
           <a:extLst>
             <a:ext uri="{C572A759-6A51-4108-AA02-DFA0A04FC94B}">
-              <ma14:wrappingTextBoxFlag xmlns:ma14="http://schemas.microsoft.com/office/mac/drawingml/2011/main" xmlns:a14="http://schemas.microsoft.com/office/drawing/2010/main" xmlns:m="http://schemas.openxmlformats.org/officeDocument/2006/math" xmlns="" val="1"/>
+              <ma14:wrappingTextBoxFlag xmlns="" xmlns:m="http://schemas.openxmlformats.org/officeDocument/2006/math" xmlns:a14="http://schemas.microsoft.com/office/drawing/2010/main" xmlns:ma14="http://schemas.microsoft.com/office/mac/drawingml/2011/main" val="1"/>
             </a:ext>
           </a:extLst>
         </p:spPr>
@@ -15496,7 +15732,7 @@
           </a:ln>
           <a:extLst>
             <a:ext uri="{C572A759-6A51-4108-AA02-DFA0A04FC94B}">
-              <ma14:wrappingTextBoxFlag xmlns:ma14="http://schemas.microsoft.com/office/mac/drawingml/2011/main" xmlns:a14="http://schemas.microsoft.com/office/drawing/2010/main" xmlns:m="http://schemas.openxmlformats.org/officeDocument/2006/math" xmlns="" val="1"/>
+              <ma14:wrappingTextBoxFlag xmlns="" xmlns:m="http://schemas.openxmlformats.org/officeDocument/2006/math" xmlns:a14="http://schemas.microsoft.com/office/drawing/2010/main" xmlns:ma14="http://schemas.microsoft.com/office/mac/drawingml/2011/main" val="1"/>
             </a:ext>
           </a:extLst>
         </p:spPr>
@@ -15546,7 +15782,7 @@
           </a:ln>
           <a:extLst>
             <a:ext uri="{C572A759-6A51-4108-AA02-DFA0A04FC94B}">
-              <ma14:wrappingTextBoxFlag xmlns:ma14="http://schemas.microsoft.com/office/mac/drawingml/2011/main" xmlns:a14="http://schemas.microsoft.com/office/drawing/2010/main" xmlns:m="http://schemas.openxmlformats.org/officeDocument/2006/math" xmlns="" val="1"/>
+              <ma14:wrappingTextBoxFlag xmlns="" xmlns:m="http://schemas.openxmlformats.org/officeDocument/2006/math" xmlns:a14="http://schemas.microsoft.com/office/drawing/2010/main" xmlns:ma14="http://schemas.microsoft.com/office/mac/drawingml/2011/main" val="1"/>
             </a:ext>
           </a:extLst>
         </p:spPr>
@@ -15588,7 +15824,7 @@
           </a:ln>
           <a:extLst>
             <a:ext uri="{C572A759-6A51-4108-AA02-DFA0A04FC94B}">
-              <ma14:wrappingTextBoxFlag xmlns:ma14="http://schemas.microsoft.com/office/mac/drawingml/2011/main" xmlns:a14="http://schemas.microsoft.com/office/drawing/2010/main" xmlns:m="http://schemas.openxmlformats.org/officeDocument/2006/math" xmlns="" val="1"/>
+              <ma14:wrappingTextBoxFlag xmlns="" xmlns:m="http://schemas.openxmlformats.org/officeDocument/2006/math" xmlns:a14="http://schemas.microsoft.com/office/drawing/2010/main" xmlns:ma14="http://schemas.microsoft.com/office/mac/drawingml/2011/main" val="1"/>
             </a:ext>
           </a:extLst>
         </p:spPr>
@@ -15635,7 +15871,7 @@
           </a:ln>
           <a:extLst>
             <a:ext uri="{C572A759-6A51-4108-AA02-DFA0A04FC94B}">
-              <ma14:wrappingTextBoxFlag xmlns:ma14="http://schemas.microsoft.com/office/mac/drawingml/2011/main" xmlns:a14="http://schemas.microsoft.com/office/drawing/2010/main" xmlns:m="http://schemas.openxmlformats.org/officeDocument/2006/math" xmlns="" val="1"/>
+              <ma14:wrappingTextBoxFlag xmlns="" xmlns:m="http://schemas.openxmlformats.org/officeDocument/2006/math" xmlns:a14="http://schemas.microsoft.com/office/drawing/2010/main" xmlns:ma14="http://schemas.microsoft.com/office/mac/drawingml/2011/main" val="1"/>
             </a:ext>
           </a:extLst>
         </p:spPr>
@@ -15682,7 +15918,7 @@
           </a:ln>
           <a:extLst>
             <a:ext uri="{C572A759-6A51-4108-AA02-DFA0A04FC94B}">
-              <ma14:wrappingTextBoxFlag xmlns:ma14="http://schemas.microsoft.com/office/mac/drawingml/2011/main" xmlns:a14="http://schemas.microsoft.com/office/drawing/2010/main" xmlns:m="http://schemas.openxmlformats.org/officeDocument/2006/math" xmlns="" val="1"/>
+              <ma14:wrappingTextBoxFlag xmlns="" xmlns:m="http://schemas.openxmlformats.org/officeDocument/2006/math" xmlns:a14="http://schemas.microsoft.com/office/drawing/2010/main" xmlns:ma14="http://schemas.microsoft.com/office/mac/drawingml/2011/main" val="1"/>
             </a:ext>
           </a:extLst>
         </p:spPr>
@@ -15729,7 +15965,7 @@
           </a:ln>
           <a:extLst>
             <a:ext uri="{C572A759-6A51-4108-AA02-DFA0A04FC94B}">
-              <ma14:wrappingTextBoxFlag xmlns:ma14="http://schemas.microsoft.com/office/mac/drawingml/2011/main" xmlns:a14="http://schemas.microsoft.com/office/drawing/2010/main" xmlns:m="http://schemas.openxmlformats.org/officeDocument/2006/math" xmlns="" val="1"/>
+              <ma14:wrappingTextBoxFlag xmlns="" xmlns:m="http://schemas.openxmlformats.org/officeDocument/2006/math" xmlns:a14="http://schemas.microsoft.com/office/drawing/2010/main" xmlns:ma14="http://schemas.microsoft.com/office/mac/drawingml/2011/main" val="1"/>
             </a:ext>
           </a:extLst>
         </p:spPr>
@@ -15776,7 +16012,7 @@
           </a:ln>
           <a:extLst>
             <a:ext uri="{C572A759-6A51-4108-AA02-DFA0A04FC94B}">
-              <ma14:wrappingTextBoxFlag xmlns:ma14="http://schemas.microsoft.com/office/mac/drawingml/2011/main" xmlns:a14="http://schemas.microsoft.com/office/drawing/2010/main" xmlns:m="http://schemas.openxmlformats.org/officeDocument/2006/math" xmlns="" val="1"/>
+              <ma14:wrappingTextBoxFlag xmlns="" xmlns:m="http://schemas.openxmlformats.org/officeDocument/2006/math" xmlns:a14="http://schemas.microsoft.com/office/drawing/2010/main" xmlns:ma14="http://schemas.microsoft.com/office/mac/drawingml/2011/main" val="1"/>
             </a:ext>
           </a:extLst>
         </p:spPr>
@@ -15823,7 +16059,7 @@
           </a:ln>
           <a:extLst>
             <a:ext uri="{C572A759-6A51-4108-AA02-DFA0A04FC94B}">
-              <ma14:wrappingTextBoxFlag xmlns:ma14="http://schemas.microsoft.com/office/mac/drawingml/2011/main" xmlns:a14="http://schemas.microsoft.com/office/drawing/2010/main" xmlns:m="http://schemas.openxmlformats.org/officeDocument/2006/math" xmlns="" val="1"/>
+              <ma14:wrappingTextBoxFlag xmlns="" xmlns:m="http://schemas.openxmlformats.org/officeDocument/2006/math" xmlns:a14="http://schemas.microsoft.com/office/drawing/2010/main" xmlns:ma14="http://schemas.microsoft.com/office/mac/drawingml/2011/main" val="1"/>
             </a:ext>
           </a:extLst>
         </p:spPr>
@@ -15870,7 +16106,7 @@
           </a:ln>
           <a:extLst>
             <a:ext uri="{C572A759-6A51-4108-AA02-DFA0A04FC94B}">
-              <ma14:wrappingTextBoxFlag xmlns:ma14="http://schemas.microsoft.com/office/mac/drawingml/2011/main" xmlns:a14="http://schemas.microsoft.com/office/drawing/2010/main" xmlns:m="http://schemas.openxmlformats.org/officeDocument/2006/math" xmlns="" val="1"/>
+              <ma14:wrappingTextBoxFlag xmlns="" xmlns:m="http://schemas.openxmlformats.org/officeDocument/2006/math" xmlns:a14="http://schemas.microsoft.com/office/drawing/2010/main" xmlns:ma14="http://schemas.microsoft.com/office/mac/drawingml/2011/main" val="1"/>
             </a:ext>
           </a:extLst>
         </p:spPr>
@@ -15917,7 +16153,7 @@
           </a:ln>
           <a:extLst>
             <a:ext uri="{C572A759-6A51-4108-AA02-DFA0A04FC94B}">
-              <ma14:wrappingTextBoxFlag xmlns:ma14="http://schemas.microsoft.com/office/mac/drawingml/2011/main" xmlns:a14="http://schemas.microsoft.com/office/drawing/2010/main" xmlns:m="http://schemas.openxmlformats.org/officeDocument/2006/math" xmlns="" val="1"/>
+              <ma14:wrappingTextBoxFlag xmlns="" xmlns:m="http://schemas.openxmlformats.org/officeDocument/2006/math" xmlns:a14="http://schemas.microsoft.com/office/drawing/2010/main" xmlns:ma14="http://schemas.microsoft.com/office/mac/drawingml/2011/main" val="1"/>
             </a:ext>
           </a:extLst>
         </p:spPr>
@@ -15964,7 +16200,7 @@
           </a:ln>
           <a:extLst>
             <a:ext uri="{C572A759-6A51-4108-AA02-DFA0A04FC94B}">
-              <ma14:wrappingTextBoxFlag xmlns:ma14="http://schemas.microsoft.com/office/mac/drawingml/2011/main" xmlns:a14="http://schemas.microsoft.com/office/drawing/2010/main" xmlns:m="http://schemas.openxmlformats.org/officeDocument/2006/math" xmlns="" val="1"/>
+              <ma14:wrappingTextBoxFlag xmlns="" xmlns:m="http://schemas.openxmlformats.org/officeDocument/2006/math" xmlns:a14="http://schemas.microsoft.com/office/drawing/2010/main" xmlns:ma14="http://schemas.microsoft.com/office/mac/drawingml/2011/main" val="1"/>
             </a:ext>
           </a:extLst>
         </p:spPr>
@@ -16003,7 +16239,7 @@
           </a:ln>
           <a:extLst>
             <a:ext uri="{C572A759-6A51-4108-AA02-DFA0A04FC94B}">
-              <ma14:wrappingTextBoxFlag xmlns:ma14="http://schemas.microsoft.com/office/mac/drawingml/2011/main" xmlns:a14="http://schemas.microsoft.com/office/drawing/2010/main" xmlns:m="http://schemas.openxmlformats.org/officeDocument/2006/math" xmlns="" val="1"/>
+              <ma14:wrappingTextBoxFlag xmlns="" xmlns:m="http://schemas.openxmlformats.org/officeDocument/2006/math" xmlns:a14="http://schemas.microsoft.com/office/drawing/2010/main" xmlns:ma14="http://schemas.microsoft.com/office/mac/drawingml/2011/main" val="1"/>
             </a:ext>
           </a:extLst>
         </p:spPr>
@@ -16098,7 +16334,7 @@
           </a:ln>
           <a:extLst>
             <a:ext uri="{C572A759-6A51-4108-AA02-DFA0A04FC94B}">
-              <ma14:wrappingTextBoxFlag xmlns:ma14="http://schemas.microsoft.com/office/mac/drawingml/2011/main" xmlns:a14="http://schemas.microsoft.com/office/drawing/2010/main" xmlns:m="http://schemas.openxmlformats.org/officeDocument/2006/math" xmlns="" val="1"/>
+              <ma14:wrappingTextBoxFlag xmlns="" xmlns:m="http://schemas.openxmlformats.org/officeDocument/2006/math" xmlns:a14="http://schemas.microsoft.com/office/drawing/2010/main" xmlns:ma14="http://schemas.microsoft.com/office/mac/drawingml/2011/main" val="1"/>
             </a:ext>
           </a:extLst>
         </p:spPr>
@@ -16886,7 +17122,7 @@
           </a:ln>
           <a:extLst>
             <a:ext uri="{C572A759-6A51-4108-AA02-DFA0A04FC94B}">
-              <ma14:wrappingTextBoxFlag xmlns:ma14="http://schemas.microsoft.com/office/mac/drawingml/2011/main" xmlns:a14="http://schemas.microsoft.com/office/drawing/2010/main" xmlns:m="http://schemas.openxmlformats.org/officeDocument/2006/math" xmlns="" val="1"/>
+              <ma14:wrappingTextBoxFlag xmlns="" xmlns:m="http://schemas.openxmlformats.org/officeDocument/2006/math" xmlns:a14="http://schemas.microsoft.com/office/drawing/2010/main" xmlns:ma14="http://schemas.microsoft.com/office/mac/drawingml/2011/main" val="1"/>
             </a:ext>
           </a:extLst>
         </p:spPr>
@@ -16936,7 +17172,7 @@
           </a:ln>
           <a:extLst>
             <a:ext uri="{C572A759-6A51-4108-AA02-DFA0A04FC94B}">
-              <ma14:wrappingTextBoxFlag xmlns:ma14="http://schemas.microsoft.com/office/mac/drawingml/2011/main" xmlns:a14="http://schemas.microsoft.com/office/drawing/2010/main" xmlns:m="http://schemas.openxmlformats.org/officeDocument/2006/math" xmlns="" val="1"/>
+              <ma14:wrappingTextBoxFlag xmlns="" xmlns:m="http://schemas.openxmlformats.org/officeDocument/2006/math" xmlns:a14="http://schemas.microsoft.com/office/drawing/2010/main" xmlns:ma14="http://schemas.microsoft.com/office/mac/drawingml/2011/main" val="1"/>
             </a:ext>
           </a:extLst>
         </p:spPr>
@@ -17075,6 +17311,7 @@
               <a:buNone/>
             </a:pPr>
             <a:r>
+              <a:rPr dirty="0"/>
               <a:t>Common Modifications</a:t>
             </a:r>
           </a:p>
@@ -17086,8 +17323,23 @@
               <a:defRPr sz="2800"/>
             </a:pPr>
             <a:r>
-              <a:t>L[index] = new_value</a:t>
-            </a:r>
+              <a:rPr dirty="0">
+                <a:latin typeface="Calibri" panose="020F0502020204030204" pitchFamily="34" charset="0"/>
+                <a:cs typeface="Calibri" panose="020F0502020204030204" pitchFamily="34" charset="0"/>
+              </a:rPr>
+              <a:t>L[index] = </a:t>
+            </a:r>
+            <a:r>
+              <a:rPr dirty="0" err="1">
+                <a:latin typeface="Calibri" panose="020F0502020204030204" pitchFamily="34" charset="0"/>
+                <a:cs typeface="Calibri" panose="020F0502020204030204" pitchFamily="34" charset="0"/>
+              </a:rPr>
+              <a:t>new_value</a:t>
+            </a:r>
+            <a:endParaRPr dirty="0">
+              <a:latin typeface="Calibri" panose="020F0502020204030204" pitchFamily="34" charset="0"/>
+              <a:cs typeface="Calibri" panose="020F0502020204030204" pitchFamily="34" charset="0"/>
+            </a:endParaRPr>
           </a:p>
           <a:p>
             <a:pPr marL="635000" indent="-444500">
@@ -17097,7 +17349,32 @@
               <a:defRPr sz="2800"/>
             </a:pPr>
             <a:r>
-              <a:t>L.append(new_value)</a:t>
+              <a:rPr dirty="0" err="1">
+                <a:latin typeface="Calibri" panose="020F0502020204030204" pitchFamily="34" charset="0"/>
+                <a:cs typeface="Calibri" panose="020F0502020204030204" pitchFamily="34" charset="0"/>
+              </a:rPr>
+              <a:t>L.append</a:t>
+            </a:r>
+            <a:r>
+              <a:rPr dirty="0">
+                <a:latin typeface="Calibri" panose="020F0502020204030204" pitchFamily="34" charset="0"/>
+                <a:cs typeface="Calibri" panose="020F0502020204030204" pitchFamily="34" charset="0"/>
+              </a:rPr>
+              <a:t>(</a:t>
+            </a:r>
+            <a:r>
+              <a:rPr dirty="0" err="1">
+                <a:latin typeface="Calibri" panose="020F0502020204030204" pitchFamily="34" charset="0"/>
+                <a:cs typeface="Calibri" panose="020F0502020204030204" pitchFamily="34" charset="0"/>
+              </a:rPr>
+              <a:t>new_value</a:t>
+            </a:r>
+            <a:r>
+              <a:rPr dirty="0">
+                <a:latin typeface="Calibri" panose="020F0502020204030204" pitchFamily="34" charset="0"/>
+                <a:cs typeface="Calibri" panose="020F0502020204030204" pitchFamily="34" charset="0"/>
+              </a:rPr>
+              <a:t>)</a:t>
             </a:r>
           </a:p>
           <a:p>
@@ -17108,7 +17385,32 @@
               <a:defRPr sz="2800"/>
             </a:pPr>
             <a:r>
-              <a:t>L.extend(another_list)</a:t>
+              <a:rPr dirty="0" err="1">
+                <a:latin typeface="Calibri" panose="020F0502020204030204" pitchFamily="34" charset="0"/>
+                <a:cs typeface="Calibri" panose="020F0502020204030204" pitchFamily="34" charset="0"/>
+              </a:rPr>
+              <a:t>L.extend</a:t>
+            </a:r>
+            <a:r>
+              <a:rPr dirty="0">
+                <a:latin typeface="Calibri" panose="020F0502020204030204" pitchFamily="34" charset="0"/>
+                <a:cs typeface="Calibri" panose="020F0502020204030204" pitchFamily="34" charset="0"/>
+              </a:rPr>
+              <a:t>(</a:t>
+            </a:r>
+            <a:r>
+              <a:rPr dirty="0" err="1">
+                <a:latin typeface="Calibri" panose="020F0502020204030204" pitchFamily="34" charset="0"/>
+                <a:cs typeface="Calibri" panose="020F0502020204030204" pitchFamily="34" charset="0"/>
+              </a:rPr>
+              <a:t>another_list</a:t>
+            </a:r>
+            <a:r>
+              <a:rPr dirty="0">
+                <a:latin typeface="Calibri" panose="020F0502020204030204" pitchFamily="34" charset="0"/>
+                <a:cs typeface="Calibri" panose="020F0502020204030204" pitchFamily="34" charset="0"/>
+              </a:rPr>
+              <a:t>)</a:t>
             </a:r>
           </a:p>
           <a:p>
@@ -17119,7 +17421,18 @@
               <a:defRPr sz="2800"/>
             </a:pPr>
             <a:r>
-              <a:t>L.pop(index)</a:t>
+              <a:rPr dirty="0" err="1">
+                <a:latin typeface="Calibri" panose="020F0502020204030204" pitchFamily="34" charset="0"/>
+                <a:cs typeface="Calibri" panose="020F0502020204030204" pitchFamily="34" charset="0"/>
+              </a:rPr>
+              <a:t>L.pop</a:t>
+            </a:r>
+            <a:r>
+              <a:rPr dirty="0">
+                <a:latin typeface="Calibri" panose="020F0502020204030204" pitchFamily="34" charset="0"/>
+                <a:cs typeface="Calibri" panose="020F0502020204030204" pitchFamily="34" charset="0"/>
+              </a:rPr>
+              <a:t>(index)</a:t>
             </a:r>
           </a:p>
           <a:p>
@@ -17130,10 +17443,23 @@
               <a:defRPr sz="2800"/>
             </a:pPr>
             <a:r>
-              <a:t>L.sort()</a:t>
-            </a:r>
-            <a:br/>
-            <a:endParaRPr/>
+              <a:rPr dirty="0" err="1">
+                <a:latin typeface="Calibri" panose="020F0502020204030204" pitchFamily="34" charset="0"/>
+                <a:cs typeface="Calibri" panose="020F0502020204030204" pitchFamily="34" charset="0"/>
+              </a:rPr>
+              <a:t>L.sort</a:t>
+            </a:r>
+            <a:r>
+              <a:rPr dirty="0">
+                <a:latin typeface="Calibri" panose="020F0502020204030204" pitchFamily="34" charset="0"/>
+                <a:cs typeface="Calibri" panose="020F0502020204030204" pitchFamily="34" charset="0"/>
+              </a:rPr>
+              <a:t>()</a:t>
+            </a:r>
+            <a:br>
+              <a:rPr dirty="0"/>
+            </a:br>
+            <a:endParaRPr dirty="0"/>
           </a:p>
           <a:p>
             <a:pPr marL="0" indent="0">
@@ -17145,6 +17471,7 @@
               <a:defRPr sz="2800"/>
             </a:pPr>
             <a:r>
+              <a:rPr dirty="0"/>
               <a:t>Example code:</a:t>
             </a:r>
           </a:p>
@@ -17160,27 +17487,59 @@
               </a:defRPr>
             </a:pPr>
             <a:r>
+              <a:rPr dirty="0"/>
               <a:t>L = [3,2,1]</a:t>
             </a:r>
-            <a:br/>
-            <a:r>
-              <a:t>L.append(0)</a:t>
-            </a:r>
-            <a:br/>
-            <a:r>
-              <a:t>L.extend([9, 8])</a:t>
-            </a:r>
-            <a:br/>
-            <a:r>
+            <a:br>
+              <a:rPr dirty="0"/>
+            </a:br>
+            <a:r>
+              <a:rPr dirty="0" err="1"/>
+              <a:t>L.append</a:t>
+            </a:r>
+            <a:r>
+              <a:rPr dirty="0"/>
+              <a:t>(0)</a:t>
+            </a:r>
+            <a:br>
+              <a:rPr dirty="0"/>
+            </a:br>
+            <a:r>
+              <a:rPr dirty="0" err="1"/>
+              <a:t>L.extend</a:t>
+            </a:r>
+            <a:r>
+              <a:rPr dirty="0"/>
+              <a:t>([9, 8])</a:t>
+            </a:r>
+            <a:br>
+              <a:rPr dirty="0"/>
+            </a:br>
+            <a:r>
+              <a:rPr dirty="0"/>
               <a:t>L[1] = -1</a:t>
             </a:r>
-            <a:br/>
-            <a:r>
-              <a:t>L.sort()</a:t>
-            </a:r>
-            <a:br/>
-            <a:r>
-              <a:t>L.pop(0)</a:t>
+            <a:br>
+              <a:rPr dirty="0"/>
+            </a:br>
+            <a:r>
+              <a:rPr dirty="0" err="1"/>
+              <a:t>L.sort</a:t>
+            </a:r>
+            <a:r>
+              <a:rPr dirty="0"/>
+              <a:t>()</a:t>
+            </a:r>
+            <a:br>
+              <a:rPr dirty="0"/>
+            </a:br>
+            <a:r>
+              <a:rPr dirty="0" err="1"/>
+              <a:t>L.pop</a:t>
+            </a:r>
+            <a:r>
+              <a:rPr dirty="0"/>
+              <a:t>(0)</a:t>
             </a:r>
           </a:p>
         </p:txBody>
@@ -17204,7 +17563,7 @@
           </a:ln>
           <a:extLst>
             <a:ext uri="{C572A759-6A51-4108-AA02-DFA0A04FC94B}">
-              <ma14:wrappingTextBoxFlag xmlns:ma14="http://schemas.microsoft.com/office/mac/drawingml/2011/main" xmlns:a14="http://schemas.microsoft.com/office/drawing/2010/main" xmlns:m="http://schemas.openxmlformats.org/officeDocument/2006/math" xmlns="" val="1"/>
+              <ma14:wrappingTextBoxFlag xmlns="" xmlns:m="http://schemas.openxmlformats.org/officeDocument/2006/math" xmlns:a14="http://schemas.microsoft.com/office/drawing/2010/main" xmlns:ma14="http://schemas.microsoft.com/office/mac/drawingml/2011/main" val="1"/>
             </a:ext>
           </a:extLst>
         </p:spPr>
@@ -17343,6 +17702,10 @@
               </a:defRPr>
             </a:pPr>
             <a:r>
+              <a:rPr dirty="0">
+                <a:latin typeface="Calibri" panose="020F0502020204030204" pitchFamily="34" charset="0"/>
+                <a:cs typeface="Calibri" panose="020F0502020204030204" pitchFamily="34" charset="0"/>
+              </a:rPr>
               <a:t>Goal: write a function to find the median of a list of numbers</a:t>
             </a:r>
           </a:p>
@@ -17352,10 +17715,17 @@
               <a:buNone/>
             </a:pPr>
             <a:r>
-              <a:rPr b="1"/>
+              <a:rPr b="1" dirty="0">
+                <a:latin typeface="Calibri" panose="020F0502020204030204" pitchFamily="34" charset="0"/>
+                <a:cs typeface="Calibri" panose="020F0502020204030204" pitchFamily="34" charset="0"/>
+              </a:rPr>
               <a:t>Input</a:t>
             </a:r>
             <a:r>
+              <a:rPr dirty="0">
+                <a:latin typeface="Calibri" panose="020F0502020204030204" pitchFamily="34" charset="0"/>
+                <a:cs typeface="Calibri" panose="020F0502020204030204" pitchFamily="34" charset="0"/>
+              </a:rPr>
               <a:t>:</a:t>
             </a:r>
           </a:p>
@@ -17367,6 +17737,10 @@
               <a:defRPr sz="2800"/>
             </a:pPr>
             <a:r>
+              <a:rPr dirty="0">
+                <a:latin typeface="Calibri" panose="020F0502020204030204" pitchFamily="34" charset="0"/>
+                <a:cs typeface="Calibri" panose="020F0502020204030204" pitchFamily="34" charset="0"/>
+              </a:rPr>
               <a:t>Python list containing floats</a:t>
             </a:r>
           </a:p>
@@ -17376,10 +17750,17 @@
               <a:buNone/>
             </a:pPr>
             <a:r>
-              <a:rPr b="1"/>
+              <a:rPr b="1" dirty="0">
+                <a:latin typeface="Calibri" panose="020F0502020204030204" pitchFamily="34" charset="0"/>
+                <a:cs typeface="Calibri" panose="020F0502020204030204" pitchFamily="34" charset="0"/>
+              </a:rPr>
               <a:t>Output</a:t>
             </a:r>
             <a:r>
+              <a:rPr dirty="0">
+                <a:latin typeface="Calibri" panose="020F0502020204030204" pitchFamily="34" charset="0"/>
+                <a:cs typeface="Calibri" panose="020F0502020204030204" pitchFamily="34" charset="0"/>
+              </a:rPr>
               <a:t>:</a:t>
             </a:r>
           </a:p>
@@ -17391,6 +17772,10 @@
               <a:defRPr sz="2800"/>
             </a:pPr>
             <a:r>
+              <a:rPr dirty="0">
+                <a:latin typeface="Calibri" panose="020F0502020204030204" pitchFamily="34" charset="0"/>
+                <a:cs typeface="Calibri" panose="020F0502020204030204" pitchFamily="34" charset="0"/>
+              </a:rPr>
               <a:t>The median</a:t>
             </a:r>
           </a:p>
@@ -17400,43 +17785,110 @@
               <a:buNone/>
             </a:pPr>
             <a:r>
-              <a:rPr b="1"/>
+              <a:rPr b="1" dirty="0">
+                <a:latin typeface="Calibri" panose="020F0502020204030204" pitchFamily="34" charset="0"/>
+                <a:cs typeface="Calibri" panose="020F0502020204030204" pitchFamily="34" charset="0"/>
+              </a:rPr>
               <a:t>Example</a:t>
             </a:r>
             <a:r>
+              <a:rPr dirty="0">
+                <a:latin typeface="Calibri" panose="020F0502020204030204" pitchFamily="34" charset="0"/>
+                <a:cs typeface="Calibri" panose="020F0502020204030204" pitchFamily="34" charset="0"/>
+              </a:rPr>
               <a:t>:</a:t>
             </a:r>
-            <a:br/>
-            <a:r>
-              <a:rPr sz="2200"/>
-              <a:t>&gt;&gt;&gt; nums = [1,5,2,9,8]</a:t>
-            </a:r>
             <a:br>
-              <a:rPr sz="2200"/>
+              <a:rPr dirty="0">
+                <a:latin typeface="Calibri" panose="020F0502020204030204" pitchFamily="34" charset="0"/>
+                <a:cs typeface="Calibri" panose="020F0502020204030204" pitchFamily="34" charset="0"/>
+              </a:rPr>
             </a:br>
             <a:r>
-              <a:rPr sz="2200"/>
-              <a:t>&gt;&gt;&gt; median(nums)</a:t>
+              <a:rPr sz="2200" dirty="0">
+                <a:latin typeface="Calibri" panose="020F0502020204030204" pitchFamily="34" charset="0"/>
+                <a:cs typeface="Calibri" panose="020F0502020204030204" pitchFamily="34" charset="0"/>
+              </a:rPr>
+              <a:t>&gt;&gt;&gt; </a:t>
+            </a:r>
+            <a:r>
+              <a:rPr sz="2200" dirty="0" err="1">
+                <a:latin typeface="Calibri" panose="020F0502020204030204" pitchFamily="34" charset="0"/>
+                <a:cs typeface="Calibri" panose="020F0502020204030204" pitchFamily="34" charset="0"/>
+              </a:rPr>
+              <a:t>nums</a:t>
+            </a:r>
+            <a:r>
+              <a:rPr sz="2200" dirty="0">
+                <a:latin typeface="Calibri" panose="020F0502020204030204" pitchFamily="34" charset="0"/>
+                <a:cs typeface="Calibri" panose="020F0502020204030204" pitchFamily="34" charset="0"/>
+              </a:rPr>
+              <a:t> = [1,5,2,9,8]</a:t>
             </a:r>
             <a:br>
-              <a:rPr sz="2200"/>
+              <a:rPr sz="2200" dirty="0">
+                <a:latin typeface="Calibri" panose="020F0502020204030204" pitchFamily="34" charset="0"/>
+                <a:cs typeface="Calibri" panose="020F0502020204030204" pitchFamily="34" charset="0"/>
+              </a:rPr>
             </a:br>
             <a:r>
-              <a:rPr sz="2200"/>
+              <a:rPr sz="2200" dirty="0">
+                <a:latin typeface="Calibri" panose="020F0502020204030204" pitchFamily="34" charset="0"/>
+                <a:cs typeface="Calibri" panose="020F0502020204030204" pitchFamily="34" charset="0"/>
+              </a:rPr>
+              <a:t>&gt;&gt;&gt; median(</a:t>
+            </a:r>
+            <a:r>
+              <a:rPr sz="2200" dirty="0" err="1">
+                <a:latin typeface="Calibri" panose="020F0502020204030204" pitchFamily="34" charset="0"/>
+                <a:cs typeface="Calibri" panose="020F0502020204030204" pitchFamily="34" charset="0"/>
+              </a:rPr>
+              <a:t>nums</a:t>
+            </a:r>
+            <a:r>
+              <a:rPr sz="2200" dirty="0">
+                <a:latin typeface="Calibri" panose="020F0502020204030204" pitchFamily="34" charset="0"/>
+                <a:cs typeface="Calibri" panose="020F0502020204030204" pitchFamily="34" charset="0"/>
+              </a:rPr>
+              <a:t>)</a:t>
+            </a:r>
+            <a:br>
+              <a:rPr sz="2200" dirty="0">
+                <a:latin typeface="Calibri" panose="020F0502020204030204" pitchFamily="34" charset="0"/>
+                <a:cs typeface="Calibri" panose="020F0502020204030204" pitchFamily="34" charset="0"/>
+              </a:rPr>
+            </a:br>
+            <a:r>
+              <a:rPr sz="2200" dirty="0">
+                <a:latin typeface="Calibri" panose="020F0502020204030204" pitchFamily="34" charset="0"/>
+                <a:cs typeface="Calibri" panose="020F0502020204030204" pitchFamily="34" charset="0"/>
+              </a:rPr>
               <a:t>5</a:t>
             </a:r>
             <a:br>
-              <a:rPr sz="2200"/>
+              <a:rPr sz="2200" dirty="0">
+                <a:latin typeface="Calibri" panose="020F0502020204030204" pitchFamily="34" charset="0"/>
+                <a:cs typeface="Calibri" panose="020F0502020204030204" pitchFamily="34" charset="0"/>
+              </a:rPr>
             </a:br>
             <a:r>
-              <a:rPr sz="2200"/>
+              <a:rPr sz="2200" dirty="0">
+                <a:latin typeface="Calibri" panose="020F0502020204030204" pitchFamily="34" charset="0"/>
+                <a:cs typeface="Calibri" panose="020F0502020204030204" pitchFamily="34" charset="0"/>
+              </a:rPr>
               <a:t>&gt;&gt;&gt; median([1, 20, 30, 100])</a:t>
             </a:r>
             <a:br>
-              <a:rPr sz="2200"/>
+              <a:rPr sz="2200" dirty="0">
+                <a:latin typeface="Calibri" panose="020F0502020204030204" pitchFamily="34" charset="0"/>
+                <a:cs typeface="Calibri" panose="020F0502020204030204" pitchFamily="34" charset="0"/>
+              </a:rPr>
             </a:br>
             <a:r>
-              <a:rPr sz="2200"/>
+              <a:rPr sz="2200" dirty="0">
+                <a:latin typeface="Calibri" panose="020F0502020204030204" pitchFamily="34" charset="0"/>
+                <a:cs typeface="Calibri" panose="020F0502020204030204" pitchFamily="34" charset="0"/>
+              </a:rPr>
               <a:t>25</a:t>
             </a:r>
           </a:p>
@@ -17529,6 +17981,7 @@
               <a:buNone/>
             </a:pPr>
             <a:r>
+              <a:rPr dirty="0"/>
               <a:t>From Strings to Lists</a:t>
             </a:r>
           </a:p>
@@ -17538,6 +17991,7 @@
               <a:buNone/>
             </a:pPr>
             <a:r>
+              <a:rPr dirty="0"/>
               <a:t>More Sequence Capabilities</a:t>
             </a:r>
           </a:p>
@@ -17547,7 +18001,15 @@
               <a:buNone/>
             </a:pPr>
             <a:r>
-              <a:t>Difference 1: Flexibility of Types</a:t>
+              <a:rPr dirty="0">
+                <a:latin typeface="Calibri" panose="020F0502020204030204" pitchFamily="34" charset="0"/>
+                <a:cs typeface="Calibri" panose="020F0502020204030204" pitchFamily="34" charset="0"/>
+              </a:rPr>
+              <a:t>Difference</a:t>
+            </a:r>
+            <a:r>
+              <a:rPr dirty="0"/>
+              <a:t> 1: Flexibility of Types</a:t>
             </a:r>
           </a:p>
           <a:p>
@@ -17556,6 +18018,7 @@
               <a:buNone/>
             </a:pPr>
             <a:r>
+              <a:rPr dirty="0"/>
               <a:t>Difference 2: Mutability</a:t>
             </a:r>
           </a:p>
@@ -17574,6 +18037,7 @@
               </a:defRPr>
             </a:pPr>
             <a:r>
+              <a:rPr dirty="0"/>
               <a:t>Transforming between Strings and Lists</a:t>
             </a:r>
           </a:p>
@@ -17657,7 +18121,7 @@
           </a:ln>
           <a:extLst>
             <a:ext uri="{C572A759-6A51-4108-AA02-DFA0A04FC94B}">
-              <ma14:wrappingTextBoxFlag xmlns:ma14="http://schemas.microsoft.com/office/mac/drawingml/2011/main" xmlns:a14="http://schemas.microsoft.com/office/drawing/2010/main" xmlns:m="http://schemas.openxmlformats.org/officeDocument/2006/math" xmlns="" val="1"/>
+              <ma14:wrappingTextBoxFlag xmlns="" xmlns:m="http://schemas.openxmlformats.org/officeDocument/2006/math" xmlns:a14="http://schemas.microsoft.com/office/drawing/2010/main" xmlns:ma14="http://schemas.microsoft.com/office/mac/drawingml/2011/main" val="1"/>
             </a:ext>
           </a:extLst>
         </p:spPr>
@@ -17752,7 +18216,7 @@
           </a:ln>
           <a:extLst>
             <a:ext uri="{C572A759-6A51-4108-AA02-DFA0A04FC94B}">
-              <ma14:wrappingTextBoxFlag xmlns:ma14="http://schemas.microsoft.com/office/mac/drawingml/2011/main" xmlns:a14="http://schemas.microsoft.com/office/drawing/2010/main" xmlns:m="http://schemas.openxmlformats.org/officeDocument/2006/math" xmlns="" val="1"/>
+              <ma14:wrappingTextBoxFlag xmlns="" xmlns:m="http://schemas.openxmlformats.org/officeDocument/2006/math" xmlns:a14="http://schemas.microsoft.com/office/drawing/2010/main" xmlns:ma14="http://schemas.microsoft.com/office/mac/drawingml/2011/main" val="1"/>
             </a:ext>
           </a:extLst>
         </p:spPr>
@@ -17846,7 +18310,7 @@
           </a:ln>
           <a:extLst>
             <a:ext uri="{C572A759-6A51-4108-AA02-DFA0A04FC94B}">
-              <ma14:wrappingTextBoxFlag xmlns:ma14="http://schemas.microsoft.com/office/mac/drawingml/2011/main" xmlns:a14="http://schemas.microsoft.com/office/drawing/2010/main" xmlns:m="http://schemas.openxmlformats.org/officeDocument/2006/math" xmlns="" val="1"/>
+              <ma14:wrappingTextBoxFlag xmlns="" xmlns:m="http://schemas.openxmlformats.org/officeDocument/2006/math" xmlns:a14="http://schemas.microsoft.com/office/drawing/2010/main" xmlns:ma14="http://schemas.microsoft.com/office/mac/drawingml/2011/main" val="1"/>
             </a:ext>
           </a:extLst>
         </p:spPr>
@@ -17897,7 +18361,7 @@
           </a:ln>
           <a:extLst>
             <a:ext uri="{C572A759-6A51-4108-AA02-DFA0A04FC94B}">
-              <ma14:wrappingTextBoxFlag xmlns:ma14="http://schemas.microsoft.com/office/mac/drawingml/2011/main" xmlns:a14="http://schemas.microsoft.com/office/drawing/2010/main" xmlns:m="http://schemas.openxmlformats.org/officeDocument/2006/math" xmlns="" val="1"/>
+              <ma14:wrappingTextBoxFlag xmlns="" xmlns:m="http://schemas.openxmlformats.org/officeDocument/2006/math" xmlns:a14="http://schemas.microsoft.com/office/drawing/2010/main" xmlns:ma14="http://schemas.microsoft.com/office/mac/drawingml/2011/main" val="1"/>
             </a:ext>
           </a:extLst>
         </p:spPr>
@@ -18003,7 +18467,7 @@
           </a:ln>
           <a:extLst>
             <a:ext uri="{C572A759-6A51-4108-AA02-DFA0A04FC94B}">
-              <ma14:wrappingTextBoxFlag xmlns:ma14="http://schemas.microsoft.com/office/mac/drawingml/2011/main" xmlns:a14="http://schemas.microsoft.com/office/drawing/2010/main" xmlns:m="http://schemas.openxmlformats.org/officeDocument/2006/math" xmlns="" val="1"/>
+              <ma14:wrappingTextBoxFlag xmlns="" xmlns:m="http://schemas.openxmlformats.org/officeDocument/2006/math" xmlns:a14="http://schemas.microsoft.com/office/drawing/2010/main" xmlns:ma14="http://schemas.microsoft.com/office/mac/drawingml/2011/main" val="1"/>
             </a:ext>
           </a:extLst>
         </p:spPr>
@@ -18141,7 +18605,7 @@
           </a:ln>
           <a:extLst>
             <a:ext uri="{C572A759-6A51-4108-AA02-DFA0A04FC94B}">
-              <ma14:wrappingTextBoxFlag xmlns:ma14="http://schemas.microsoft.com/office/mac/drawingml/2011/main" xmlns:a14="http://schemas.microsoft.com/office/drawing/2010/main" xmlns:m="http://schemas.openxmlformats.org/officeDocument/2006/math" xmlns="" val="1"/>
+              <ma14:wrappingTextBoxFlag xmlns="" xmlns:m="http://schemas.openxmlformats.org/officeDocument/2006/math" xmlns:a14="http://schemas.microsoft.com/office/drawing/2010/main" xmlns:ma14="http://schemas.microsoft.com/office/mac/drawingml/2011/main" val="1"/>
             </a:ext>
           </a:extLst>
         </p:spPr>
@@ -18192,7 +18656,7 @@
           </a:ln>
           <a:extLst>
             <a:ext uri="{C572A759-6A51-4108-AA02-DFA0A04FC94B}">
-              <ma14:wrappingTextBoxFlag xmlns:ma14="http://schemas.microsoft.com/office/mac/drawingml/2011/main" xmlns:a14="http://schemas.microsoft.com/office/drawing/2010/main" xmlns:m="http://schemas.openxmlformats.org/officeDocument/2006/math" xmlns="" val="1"/>
+              <ma14:wrappingTextBoxFlag xmlns="" xmlns:m="http://schemas.openxmlformats.org/officeDocument/2006/math" xmlns:a14="http://schemas.microsoft.com/office/drawing/2010/main" xmlns:ma14="http://schemas.microsoft.com/office/mac/drawingml/2011/main" val="1"/>
             </a:ext>
           </a:extLst>
         </p:spPr>
@@ -18243,7 +18707,7 @@
           </a:ln>
           <a:extLst>
             <a:ext uri="{C572A759-6A51-4108-AA02-DFA0A04FC94B}">
-              <ma14:wrappingTextBoxFlag xmlns:ma14="http://schemas.microsoft.com/office/mac/drawingml/2011/main" xmlns:a14="http://schemas.microsoft.com/office/drawing/2010/main" xmlns:m="http://schemas.openxmlformats.org/officeDocument/2006/math" xmlns="" val="1"/>
+              <ma14:wrappingTextBoxFlag xmlns="" xmlns:m="http://schemas.openxmlformats.org/officeDocument/2006/math" xmlns:a14="http://schemas.microsoft.com/office/drawing/2010/main" xmlns:ma14="http://schemas.microsoft.com/office/mac/drawingml/2011/main" val="1"/>
             </a:ext>
           </a:extLst>
         </p:spPr>
@@ -18317,7 +18781,7 @@
           </a:ln>
           <a:extLst>
             <a:ext uri="{C572A759-6A51-4108-AA02-DFA0A04FC94B}">
-              <ma14:wrappingTextBoxFlag xmlns:ma14="http://schemas.microsoft.com/office/mac/drawingml/2011/main" xmlns:a14="http://schemas.microsoft.com/office/drawing/2010/main" xmlns:m="http://schemas.openxmlformats.org/officeDocument/2006/math" xmlns="" val="1"/>
+              <ma14:wrappingTextBoxFlag xmlns="" xmlns:m="http://schemas.openxmlformats.org/officeDocument/2006/math" xmlns:a14="http://schemas.microsoft.com/office/drawing/2010/main" xmlns:ma14="http://schemas.microsoft.com/office/mac/drawingml/2011/main" val="1"/>
             </a:ext>
           </a:extLst>
         </p:spPr>
@@ -18430,7 +18894,7 @@
           </a:ln>
           <a:extLst>
             <a:ext uri="{C572A759-6A51-4108-AA02-DFA0A04FC94B}">
-              <ma14:wrappingTextBoxFlag xmlns:ma14="http://schemas.microsoft.com/office/mac/drawingml/2011/main" xmlns:a14="http://schemas.microsoft.com/office/drawing/2010/main" xmlns:m="http://schemas.openxmlformats.org/officeDocument/2006/math" xmlns="" val="1"/>
+              <ma14:wrappingTextBoxFlag xmlns="" xmlns:m="http://schemas.openxmlformats.org/officeDocument/2006/math" xmlns:a14="http://schemas.microsoft.com/office/drawing/2010/main" xmlns:ma14="http://schemas.microsoft.com/office/mac/drawingml/2011/main" val="1"/>
             </a:ext>
           </a:extLst>
         </p:spPr>
@@ -18568,7 +19032,7 @@
           </a:ln>
           <a:extLst>
             <a:ext uri="{C572A759-6A51-4108-AA02-DFA0A04FC94B}">
-              <ma14:wrappingTextBoxFlag xmlns:ma14="http://schemas.microsoft.com/office/mac/drawingml/2011/main" xmlns:a14="http://schemas.microsoft.com/office/drawing/2010/main" xmlns:m="http://schemas.openxmlformats.org/officeDocument/2006/math" xmlns="" val="1"/>
+              <ma14:wrappingTextBoxFlag xmlns="" xmlns:m="http://schemas.openxmlformats.org/officeDocument/2006/math" xmlns:a14="http://schemas.microsoft.com/office/drawing/2010/main" xmlns:ma14="http://schemas.microsoft.com/office/mac/drawingml/2011/main" val="1"/>
             </a:ext>
           </a:extLst>
         </p:spPr>
@@ -18619,7 +19083,7 @@
           </a:ln>
           <a:extLst>
             <a:ext uri="{C572A759-6A51-4108-AA02-DFA0A04FC94B}">
-              <ma14:wrappingTextBoxFlag xmlns:ma14="http://schemas.microsoft.com/office/mac/drawingml/2011/main" xmlns:a14="http://schemas.microsoft.com/office/drawing/2010/main" xmlns:m="http://schemas.openxmlformats.org/officeDocument/2006/math" xmlns="" val="1"/>
+              <ma14:wrappingTextBoxFlag xmlns="" xmlns:m="http://schemas.openxmlformats.org/officeDocument/2006/math" xmlns:a14="http://schemas.microsoft.com/office/drawing/2010/main" xmlns:ma14="http://schemas.microsoft.com/office/mac/drawingml/2011/main" val="1"/>
             </a:ext>
           </a:extLst>
         </p:spPr>
@@ -18666,7 +19130,7 @@
           </a:ln>
           <a:extLst>
             <a:ext uri="{C572A759-6A51-4108-AA02-DFA0A04FC94B}">
-              <ma14:wrappingTextBoxFlag xmlns:ma14="http://schemas.microsoft.com/office/mac/drawingml/2011/main" xmlns:a14="http://schemas.microsoft.com/office/drawing/2010/main" xmlns:m="http://schemas.openxmlformats.org/officeDocument/2006/math" xmlns="" val="1"/>
+              <ma14:wrappingTextBoxFlag xmlns="" xmlns:m="http://schemas.openxmlformats.org/officeDocument/2006/math" xmlns:a14="http://schemas.microsoft.com/office/drawing/2010/main" xmlns:ma14="http://schemas.microsoft.com/office/mac/drawingml/2011/main" val="1"/>
             </a:ext>
           </a:extLst>
         </p:spPr>
@@ -18744,7 +19208,7 @@
           </a:ln>
           <a:extLst>
             <a:ext uri="{C572A759-6A51-4108-AA02-DFA0A04FC94B}">
-              <ma14:wrappingTextBoxFlag xmlns:ma14="http://schemas.microsoft.com/office/mac/drawingml/2011/main" xmlns:a14="http://schemas.microsoft.com/office/drawing/2010/main" xmlns:m="http://schemas.openxmlformats.org/officeDocument/2006/math" xmlns="" val="1"/>
+              <ma14:wrappingTextBoxFlag xmlns="" xmlns:m="http://schemas.openxmlformats.org/officeDocument/2006/math" xmlns:a14="http://schemas.microsoft.com/office/drawing/2010/main" xmlns:ma14="http://schemas.microsoft.com/office/mac/drawingml/2011/main" val="1"/>
             </a:ext>
           </a:extLst>
         </p:spPr>
@@ -18857,7 +19321,7 @@
           </a:ln>
           <a:extLst>
             <a:ext uri="{C572A759-6A51-4108-AA02-DFA0A04FC94B}">
-              <ma14:wrappingTextBoxFlag xmlns:ma14="http://schemas.microsoft.com/office/mac/drawingml/2011/main" xmlns:a14="http://schemas.microsoft.com/office/drawing/2010/main" xmlns:m="http://schemas.openxmlformats.org/officeDocument/2006/math" xmlns="" val="1"/>
+              <ma14:wrappingTextBoxFlag xmlns="" xmlns:m="http://schemas.openxmlformats.org/officeDocument/2006/math" xmlns:a14="http://schemas.microsoft.com/office/drawing/2010/main" xmlns:ma14="http://schemas.microsoft.com/office/mac/drawingml/2011/main" val="1"/>
             </a:ext>
           </a:extLst>
         </p:spPr>
@@ -18995,7 +19459,7 @@
           </a:ln>
           <a:extLst>
             <a:ext uri="{C572A759-6A51-4108-AA02-DFA0A04FC94B}">
-              <ma14:wrappingTextBoxFlag xmlns:ma14="http://schemas.microsoft.com/office/mac/drawingml/2011/main" xmlns:a14="http://schemas.microsoft.com/office/drawing/2010/main" xmlns:m="http://schemas.openxmlformats.org/officeDocument/2006/math" xmlns="" val="1"/>
+              <ma14:wrappingTextBoxFlag xmlns="" xmlns:m="http://schemas.openxmlformats.org/officeDocument/2006/math" xmlns:a14="http://schemas.microsoft.com/office/drawing/2010/main" xmlns:ma14="http://schemas.microsoft.com/office/mac/drawingml/2011/main" val="1"/>
             </a:ext>
           </a:extLst>
         </p:spPr>
@@ -19046,7 +19510,7 @@
           </a:ln>
           <a:extLst>
             <a:ext uri="{C572A759-6A51-4108-AA02-DFA0A04FC94B}">
-              <ma14:wrappingTextBoxFlag xmlns:ma14="http://schemas.microsoft.com/office/mac/drawingml/2011/main" xmlns:a14="http://schemas.microsoft.com/office/drawing/2010/main" xmlns:m="http://schemas.openxmlformats.org/officeDocument/2006/math" xmlns="" val="1"/>
+              <ma14:wrappingTextBoxFlag xmlns="" xmlns:m="http://schemas.openxmlformats.org/officeDocument/2006/math" xmlns:a14="http://schemas.microsoft.com/office/drawing/2010/main" xmlns:ma14="http://schemas.microsoft.com/office/mac/drawingml/2011/main" val="1"/>
             </a:ext>
           </a:extLst>
         </p:spPr>
@@ -19137,7 +19601,7 @@
           </a:ln>
           <a:extLst>
             <a:ext uri="{C572A759-6A51-4108-AA02-DFA0A04FC94B}">
-              <ma14:wrappingTextBoxFlag xmlns:ma14="http://schemas.microsoft.com/office/mac/drawingml/2011/main" xmlns:a14="http://schemas.microsoft.com/office/drawing/2010/main" xmlns:m="http://schemas.openxmlformats.org/officeDocument/2006/math" xmlns="" val="1"/>
+              <ma14:wrappingTextBoxFlag xmlns="" xmlns:m="http://schemas.openxmlformats.org/officeDocument/2006/math" xmlns:a14="http://schemas.microsoft.com/office/drawing/2010/main" xmlns:ma14="http://schemas.microsoft.com/office/mac/drawingml/2011/main" val="1"/>
             </a:ext>
           </a:extLst>
         </p:spPr>
@@ -19184,7 +19648,7 @@
           </a:ln>
           <a:extLst>
             <a:ext uri="{C572A759-6A51-4108-AA02-DFA0A04FC94B}">
-              <ma14:wrappingTextBoxFlag xmlns:ma14="http://schemas.microsoft.com/office/mac/drawingml/2011/main" xmlns:a14="http://schemas.microsoft.com/office/drawing/2010/main" xmlns:m="http://schemas.openxmlformats.org/officeDocument/2006/math" xmlns="" val="1"/>
+              <ma14:wrappingTextBoxFlag xmlns="" xmlns:m="http://schemas.openxmlformats.org/officeDocument/2006/math" xmlns:a14="http://schemas.microsoft.com/office/drawing/2010/main" xmlns:ma14="http://schemas.microsoft.com/office/mac/drawingml/2011/main" val="1"/>
             </a:ext>
           </a:extLst>
         </p:spPr>
@@ -19258,7 +19722,7 @@
           </a:ln>
           <a:extLst>
             <a:ext uri="{C572A759-6A51-4108-AA02-DFA0A04FC94B}">
-              <ma14:wrappingTextBoxFlag xmlns:ma14="http://schemas.microsoft.com/office/mac/drawingml/2011/main" xmlns:a14="http://schemas.microsoft.com/office/drawing/2010/main" xmlns:m="http://schemas.openxmlformats.org/officeDocument/2006/math" xmlns="" val="1"/>
+              <ma14:wrappingTextBoxFlag xmlns="" xmlns:m="http://schemas.openxmlformats.org/officeDocument/2006/math" xmlns:a14="http://schemas.microsoft.com/office/drawing/2010/main" xmlns:ma14="http://schemas.microsoft.com/office/mac/drawingml/2011/main" val="1"/>
             </a:ext>
           </a:extLst>
         </p:spPr>
@@ -19371,7 +19835,7 @@
           </a:ln>
           <a:extLst>
             <a:ext uri="{C572A759-6A51-4108-AA02-DFA0A04FC94B}">
-              <ma14:wrappingTextBoxFlag xmlns:ma14="http://schemas.microsoft.com/office/mac/drawingml/2011/main" xmlns:a14="http://schemas.microsoft.com/office/drawing/2010/main" xmlns:m="http://schemas.openxmlformats.org/officeDocument/2006/math" xmlns="" val="1"/>
+              <ma14:wrappingTextBoxFlag xmlns="" xmlns:m="http://schemas.openxmlformats.org/officeDocument/2006/math" xmlns:a14="http://schemas.microsoft.com/office/drawing/2010/main" xmlns:ma14="http://schemas.microsoft.com/office/mac/drawingml/2011/main" val="1"/>
             </a:ext>
           </a:extLst>
         </p:spPr>
@@ -19509,7 +19973,7 @@
           </a:ln>
           <a:extLst>
             <a:ext uri="{C572A759-6A51-4108-AA02-DFA0A04FC94B}">
-              <ma14:wrappingTextBoxFlag xmlns:ma14="http://schemas.microsoft.com/office/mac/drawingml/2011/main" xmlns:a14="http://schemas.microsoft.com/office/drawing/2010/main" xmlns:m="http://schemas.openxmlformats.org/officeDocument/2006/math" xmlns="" val="1"/>
+              <ma14:wrappingTextBoxFlag xmlns="" xmlns:m="http://schemas.openxmlformats.org/officeDocument/2006/math" xmlns:a14="http://schemas.microsoft.com/office/drawing/2010/main" xmlns:ma14="http://schemas.microsoft.com/office/mac/drawingml/2011/main" val="1"/>
             </a:ext>
           </a:extLst>
         </p:spPr>
@@ -19560,7 +20024,7 @@
           </a:ln>
           <a:extLst>
             <a:ext uri="{C572A759-6A51-4108-AA02-DFA0A04FC94B}">
-              <ma14:wrappingTextBoxFlag xmlns:ma14="http://schemas.microsoft.com/office/mac/drawingml/2011/main" xmlns:a14="http://schemas.microsoft.com/office/drawing/2010/main" xmlns:m="http://schemas.openxmlformats.org/officeDocument/2006/math" xmlns="" val="1"/>
+              <ma14:wrappingTextBoxFlag xmlns="" xmlns:m="http://schemas.openxmlformats.org/officeDocument/2006/math" xmlns:a14="http://schemas.microsoft.com/office/drawing/2010/main" xmlns:ma14="http://schemas.microsoft.com/office/mac/drawingml/2011/main" val="1"/>
             </a:ext>
           </a:extLst>
         </p:spPr>
@@ -19611,7 +20075,7 @@
           </a:ln>
           <a:extLst>
             <a:ext uri="{C572A759-6A51-4108-AA02-DFA0A04FC94B}">
-              <ma14:wrappingTextBoxFlag xmlns:ma14="http://schemas.microsoft.com/office/mac/drawingml/2011/main" xmlns:a14="http://schemas.microsoft.com/office/drawing/2010/main" xmlns:m="http://schemas.openxmlformats.org/officeDocument/2006/math" xmlns="" val="1"/>
+              <ma14:wrappingTextBoxFlag xmlns="" xmlns:m="http://schemas.openxmlformats.org/officeDocument/2006/math" xmlns:a14="http://schemas.microsoft.com/office/drawing/2010/main" xmlns:ma14="http://schemas.microsoft.com/office/mac/drawingml/2011/main" val="1"/>
             </a:ext>
           </a:extLst>
         </p:spPr>
@@ -19685,7 +20149,7 @@
           </a:ln>
           <a:extLst>
             <a:ext uri="{C572A759-6A51-4108-AA02-DFA0A04FC94B}">
-              <ma14:wrappingTextBoxFlag xmlns:ma14="http://schemas.microsoft.com/office/mac/drawingml/2011/main" xmlns:a14="http://schemas.microsoft.com/office/drawing/2010/main" xmlns:m="http://schemas.openxmlformats.org/officeDocument/2006/math" xmlns="" val="1"/>
+              <ma14:wrappingTextBoxFlag xmlns="" xmlns:m="http://schemas.openxmlformats.org/officeDocument/2006/math" xmlns:a14="http://schemas.microsoft.com/office/drawing/2010/main" xmlns:ma14="http://schemas.microsoft.com/office/mac/drawingml/2011/main" val="1"/>
             </a:ext>
           </a:extLst>
         </p:spPr>
@@ -19995,6 +20459,7 @@
               </a:defRPr>
             </a:pPr>
             <a:r>
+              <a:rPr dirty="0"/>
               <a:t>Goal: write a function to replace curse words with stars</a:t>
             </a:r>
           </a:p>
@@ -20004,6 +20469,7 @@
               <a:buNone/>
             </a:pPr>
             <a:r>
+              <a:rPr dirty="0"/>
               <a:t>Input:</a:t>
             </a:r>
           </a:p>
@@ -20015,6 +20481,7 @@
               <a:defRPr sz="2800"/>
             </a:pPr>
             <a:r>
+              <a:rPr dirty="0"/>
               <a:t>A profane string</a:t>
             </a:r>
           </a:p>
@@ -20024,6 +20491,7 @@
               <a:buNone/>
             </a:pPr>
             <a:r>
+              <a:rPr dirty="0"/>
               <a:t>Output:</a:t>
             </a:r>
           </a:p>
@@ -20035,6 +20503,7 @@
               <a:defRPr sz="2800"/>
             </a:pPr>
             <a:r>
+              <a:rPr dirty="0"/>
               <a:t>A sanitized string</a:t>
             </a:r>
           </a:p>
@@ -20044,18 +20513,21 @@
               <a:buNone/>
             </a:pPr>
             <a:r>
+              <a:rPr dirty="0"/>
               <a:t>Example:</a:t>
             </a:r>
-            <a:br/>
             <a:br>
-              <a:rPr sz="2200"/>
+              <a:rPr dirty="0"/>
             </a:br>
-            <a:r>
-              <a:rPr sz="2800"/>
+            <a:br>
+              <a:rPr sz="2200" dirty="0"/>
+            </a:br>
+            <a:r>
+              <a:rPr sz="2800" dirty="0"/>
               <a:t>&gt;&gt;&gt; censor(“</a:t>
             </a:r>
             <a:r>
-              <a:rPr sz="2800">
+              <a:rPr sz="2800" dirty="0">
                 <a:solidFill>
                   <a:schemeClr val="accent5">
                     <a:hueOff val="-82419"/>
@@ -20067,18 +20539,18 @@
               <a:t>OMG</a:t>
             </a:r>
             <a:r>
-              <a:rPr sz="2800"/>
+              <a:rPr sz="2800" dirty="0"/>
               <a:t> this class is so fun”)</a:t>
             </a:r>
             <a:br>
-              <a:rPr sz="2800"/>
+              <a:rPr sz="2800" dirty="0"/>
             </a:br>
             <a:r>
-              <a:rPr sz="2800"/>
+              <a:rPr sz="2800" dirty="0"/>
               <a:t>‘</a:t>
             </a:r>
             <a:r>
-              <a:rPr sz="2800">
+              <a:rPr sz="2800" dirty="0">
                 <a:solidFill>
                   <a:schemeClr val="accent3">
                     <a:hueOff val="362282"/>
@@ -20090,18 +20562,18 @@
               <a:t>***</a:t>
             </a:r>
             <a:r>
-              <a:rPr sz="2800"/>
+              <a:rPr sz="2800" dirty="0"/>
               <a:t> this class is so fun’</a:t>
             </a:r>
             <a:br>
-              <a:rPr sz="2800"/>
+              <a:rPr sz="2800" dirty="0"/>
             </a:br>
             <a:r>
-              <a:rPr sz="2800"/>
+              <a:rPr sz="2800" dirty="0"/>
               <a:t>&gt;&gt;&gt; censor(“the </a:t>
             </a:r>
             <a:r>
-              <a:rPr sz="2800">
+              <a:rPr sz="2800" dirty="0">
                 <a:solidFill>
                   <a:schemeClr val="accent5">
                     <a:hueOff val="-82419"/>
@@ -20113,11 +20585,11 @@
               <a:t>midterm</a:t>
             </a:r>
             <a:r>
-              <a:rPr sz="2800"/>
+              <a:rPr sz="2800" dirty="0"/>
               <a:t> is </a:t>
             </a:r>
             <a:r>
-              <a:rPr sz="2800">
+              <a:rPr sz="2800" dirty="0">
                 <a:solidFill>
                   <a:schemeClr val="accent5">
                     <a:hueOff val="-82419"/>
@@ -20129,18 +20601,18 @@
               <a:t>darn</a:t>
             </a:r>
             <a:r>
-              <a:rPr sz="2800"/>
+              <a:rPr sz="2800" dirty="0"/>
               <a:t> soon”)</a:t>
             </a:r>
             <a:br>
-              <a:rPr sz="2800"/>
+              <a:rPr sz="2800" dirty="0"/>
             </a:br>
             <a:r>
-              <a:rPr sz="2800"/>
+              <a:rPr sz="2800" dirty="0"/>
               <a:t>‘the </a:t>
             </a:r>
             <a:r>
-              <a:rPr sz="2800">
+              <a:rPr sz="2800" dirty="0">
                 <a:solidFill>
                   <a:schemeClr val="accent3">
                     <a:hueOff val="362282"/>
@@ -20152,11 +20624,11 @@
               <a:t>*******</a:t>
             </a:r>
             <a:r>
-              <a:rPr sz="2800"/>
+              <a:rPr sz="2800" dirty="0"/>
               <a:t> was </a:t>
             </a:r>
             <a:r>
-              <a:rPr sz="2800">
+              <a:rPr sz="2800" dirty="0">
                 <a:solidFill>
                   <a:schemeClr val="accent3">
                     <a:hueOff val="362282"/>
@@ -20168,7 +20640,7 @@
               <a:t>****</a:t>
             </a:r>
             <a:r>
-              <a:rPr sz="2800"/>
+              <a:rPr sz="2800" dirty="0"/>
               <a:t> tough’</a:t>
             </a:r>
           </a:p>
@@ -20182,8 +20654,8 @@
         </p:nvSpPr>
         <p:spPr>
           <a:xfrm>
-            <a:off x="4891856" y="8395984"/>
-            <a:ext cx="4592688" cy="812801"/>
+            <a:off x="4891898" y="8381757"/>
+            <a:ext cx="4592604" cy="841256"/>
           </a:xfrm>
           <a:prstGeom prst="rect">
             <a:avLst/>
@@ -20193,7 +20665,7 @@
           </a:ln>
           <a:extLst>
             <a:ext uri="{C572A759-6A51-4108-AA02-DFA0A04FC94B}">
-              <ma14:wrappingTextBoxFlag xmlns:ma14="http://schemas.microsoft.com/office/mac/drawingml/2011/main" xmlns:a14="http://schemas.microsoft.com/office/drawing/2010/main" xmlns:m="http://schemas.openxmlformats.org/officeDocument/2006/math" xmlns="" val="1"/>
+              <ma14:wrappingTextBoxFlag xmlns="" xmlns:m="http://schemas.openxmlformats.org/officeDocument/2006/math" xmlns:a14="http://schemas.microsoft.com/office/drawing/2010/main" xmlns:ma14="http://schemas.microsoft.com/office/mac/drawingml/2011/main" val="1"/>
             </a:ext>
           </a:extLst>
         </p:spPr>
@@ -20215,7 +20687,19 @@
               </a:defRPr>
             </a:pPr>
             <a:r>
-              <a:t>replaces offensive words like “darn”</a:t>
+              <a:rPr dirty="0"/>
+              <a:t>replaces </a:t>
+            </a:r>
+            <a:r>
+              <a:rPr dirty="0">
+                <a:latin typeface="Calibri" panose="020F0502020204030204" pitchFamily="34" charset="0"/>
+                <a:cs typeface="Calibri" panose="020F0502020204030204" pitchFamily="34" charset="0"/>
+              </a:rPr>
+              <a:t>offensive</a:t>
+            </a:r>
+            <a:r>
+              <a:rPr dirty="0"/>
+              <a:t> words like “darn”</a:t>
             </a:r>
           </a:p>
           <a:p>
@@ -20231,6 +20715,7 @@
               </a:defRPr>
             </a:pPr>
             <a:r>
+              <a:rPr dirty="0"/>
               <a:t>and “midterm” with stars</a:t>
             </a:r>
           </a:p>
@@ -20458,7 +20943,7 @@
           </a:ln>
           <a:extLst>
             <a:ext uri="{C572A759-6A51-4108-AA02-DFA0A04FC94B}">
-              <ma14:wrappingTextBoxFlag xmlns:ma14="http://schemas.microsoft.com/office/mac/drawingml/2011/main" xmlns:a14="http://schemas.microsoft.com/office/drawing/2010/main" xmlns:m="http://schemas.openxmlformats.org/officeDocument/2006/math" xmlns="" val="1"/>
+              <ma14:wrappingTextBoxFlag xmlns="" xmlns:m="http://schemas.openxmlformats.org/officeDocument/2006/math" xmlns:a14="http://schemas.microsoft.com/office/drawing/2010/main" xmlns:ma14="http://schemas.microsoft.com/office/mac/drawingml/2011/main" val="1"/>
             </a:ext>
           </a:extLst>
         </p:spPr>
@@ -20502,7 +20987,7 @@
           </a:ln>
           <a:extLst>
             <a:ext uri="{C572A759-6A51-4108-AA02-DFA0A04FC94B}">
-              <ma14:wrappingTextBoxFlag xmlns:ma14="http://schemas.microsoft.com/office/mac/drawingml/2011/main" xmlns:a14="http://schemas.microsoft.com/office/drawing/2010/main" xmlns:m="http://schemas.openxmlformats.org/officeDocument/2006/math" xmlns="" val="1"/>
+              <ma14:wrappingTextBoxFlag xmlns="" xmlns:m="http://schemas.openxmlformats.org/officeDocument/2006/math" xmlns:a14="http://schemas.microsoft.com/office/drawing/2010/main" xmlns:ma14="http://schemas.microsoft.com/office/mac/drawingml/2011/main" val="1"/>
             </a:ext>
           </a:extLst>
         </p:spPr>
@@ -20820,7 +21305,7 @@
           </a:ln>
           <a:extLst>
             <a:ext uri="{C572A759-6A51-4108-AA02-DFA0A04FC94B}">
-              <ma14:wrappingTextBoxFlag xmlns:ma14="http://schemas.microsoft.com/office/mac/drawingml/2011/main" xmlns:a14="http://schemas.microsoft.com/office/drawing/2010/main" xmlns:m="http://schemas.openxmlformats.org/officeDocument/2006/math" xmlns="" val="1"/>
+              <ma14:wrappingTextBoxFlag xmlns="" xmlns:m="http://schemas.openxmlformats.org/officeDocument/2006/math" xmlns:a14="http://schemas.microsoft.com/office/drawing/2010/main" xmlns:ma14="http://schemas.microsoft.com/office/mac/drawingml/2011/main" val="1"/>
             </a:ext>
           </a:extLst>
         </p:spPr>
@@ -20876,7 +21361,7 @@
           </a:ln>
           <a:extLst>
             <a:ext uri="{C572A759-6A51-4108-AA02-DFA0A04FC94B}">
-              <ma14:wrappingTextBoxFlag xmlns:ma14="http://schemas.microsoft.com/office/mac/drawingml/2011/main" xmlns:a14="http://schemas.microsoft.com/office/drawing/2010/main" xmlns:m="http://schemas.openxmlformats.org/officeDocument/2006/math" xmlns="" val="1"/>
+              <ma14:wrappingTextBoxFlag xmlns="" xmlns:m="http://schemas.openxmlformats.org/officeDocument/2006/math" xmlns:a14="http://schemas.microsoft.com/office/drawing/2010/main" xmlns:ma14="http://schemas.microsoft.com/office/mac/drawingml/2011/main" val="1"/>
             </a:ext>
           </a:extLst>
         </p:spPr>
@@ -21032,7 +21517,7 @@
           </a:ln>
           <a:extLst>
             <a:ext uri="{C572A759-6A51-4108-AA02-DFA0A04FC94B}">
-              <ma14:wrappingTextBoxFlag xmlns:ma14="http://schemas.microsoft.com/office/mac/drawingml/2011/main" xmlns:a14="http://schemas.microsoft.com/office/drawing/2010/main" xmlns:m="http://schemas.openxmlformats.org/officeDocument/2006/math" xmlns="" val="1"/>
+              <ma14:wrappingTextBoxFlag xmlns="" xmlns:m="http://schemas.openxmlformats.org/officeDocument/2006/math" xmlns:a14="http://schemas.microsoft.com/office/drawing/2010/main" xmlns:ma14="http://schemas.microsoft.com/office/mac/drawingml/2011/main" val="1"/>
             </a:ext>
           </a:extLst>
         </p:spPr>
@@ -21101,7 +21586,7 @@
           </a:ln>
           <a:extLst>
             <a:ext uri="{C572A759-6A51-4108-AA02-DFA0A04FC94B}">
-              <ma14:wrappingTextBoxFlag xmlns:ma14="http://schemas.microsoft.com/office/mac/drawingml/2011/main" xmlns:a14="http://schemas.microsoft.com/office/drawing/2010/main" xmlns:m="http://schemas.openxmlformats.org/officeDocument/2006/math" xmlns="" val="1"/>
+              <ma14:wrappingTextBoxFlag xmlns="" xmlns:m="http://schemas.openxmlformats.org/officeDocument/2006/math" xmlns:a14="http://schemas.microsoft.com/office/drawing/2010/main" xmlns:ma14="http://schemas.microsoft.com/office/mac/drawingml/2011/main" val="1"/>
             </a:ext>
           </a:extLst>
         </p:spPr>
@@ -21257,7 +21742,7 @@
           </a:ln>
           <a:extLst>
             <a:ext uri="{C572A759-6A51-4108-AA02-DFA0A04FC94B}">
-              <ma14:wrappingTextBoxFlag xmlns:ma14="http://schemas.microsoft.com/office/mac/drawingml/2011/main" xmlns:a14="http://schemas.microsoft.com/office/drawing/2010/main" xmlns:m="http://schemas.openxmlformats.org/officeDocument/2006/math" xmlns="" val="1"/>
+              <ma14:wrappingTextBoxFlag xmlns="" xmlns:m="http://schemas.openxmlformats.org/officeDocument/2006/math" xmlns:a14="http://schemas.microsoft.com/office/drawing/2010/main" xmlns:ma14="http://schemas.microsoft.com/office/mac/drawingml/2011/main" val="1"/>
             </a:ext>
           </a:extLst>
         </p:spPr>
@@ -21339,7 +21824,7 @@
           </a:ln>
           <a:extLst>
             <a:ext uri="{C572A759-6A51-4108-AA02-DFA0A04FC94B}">
-              <ma14:wrappingTextBoxFlag xmlns:ma14="http://schemas.microsoft.com/office/mac/drawingml/2011/main" xmlns:a14="http://schemas.microsoft.com/office/drawing/2010/main" xmlns:m="http://schemas.openxmlformats.org/officeDocument/2006/math" xmlns="" val="1"/>
+              <ma14:wrappingTextBoxFlag xmlns="" xmlns:m="http://schemas.openxmlformats.org/officeDocument/2006/math" xmlns:a14="http://schemas.microsoft.com/office/drawing/2010/main" xmlns:ma14="http://schemas.microsoft.com/office/mac/drawingml/2011/main" val="1"/>
             </a:ext>
           </a:extLst>
         </p:spPr>
@@ -21495,7 +21980,7 @@
           </a:ln>
           <a:extLst>
             <a:ext uri="{C572A759-6A51-4108-AA02-DFA0A04FC94B}">
-              <ma14:wrappingTextBoxFlag xmlns:ma14="http://schemas.microsoft.com/office/mac/drawingml/2011/main" xmlns:a14="http://schemas.microsoft.com/office/drawing/2010/main" xmlns:m="http://schemas.openxmlformats.org/officeDocument/2006/math" xmlns="" val="1"/>
+              <ma14:wrappingTextBoxFlag xmlns="" xmlns:m="http://schemas.openxmlformats.org/officeDocument/2006/math" xmlns:a14="http://schemas.microsoft.com/office/drawing/2010/main" xmlns:ma14="http://schemas.microsoft.com/office/mac/drawingml/2011/main" val="1"/>
             </a:ext>
           </a:extLst>
         </p:spPr>
@@ -21590,7 +22075,7 @@
           </a:ln>
           <a:extLst>
             <a:ext uri="{C572A759-6A51-4108-AA02-DFA0A04FC94B}">
-              <ma14:wrappingTextBoxFlag xmlns:ma14="http://schemas.microsoft.com/office/mac/drawingml/2011/main" xmlns:a14="http://schemas.microsoft.com/office/drawing/2010/main" xmlns:m="http://schemas.openxmlformats.org/officeDocument/2006/math" xmlns="" val="1"/>
+              <ma14:wrappingTextBoxFlag xmlns="" xmlns:m="http://schemas.openxmlformats.org/officeDocument/2006/math" xmlns:a14="http://schemas.microsoft.com/office/drawing/2010/main" xmlns:ma14="http://schemas.microsoft.com/office/mac/drawingml/2011/main" val="1"/>
             </a:ext>
           </a:extLst>
         </p:spPr>

</xml_diff>

<commit_message>
CS 220 Lec 18
</commit_message>
<xml_diff>
--- a/tyler/meena/cs220/s20/materials/lec_15_S20.pptx
+++ b/tyler/meena/cs220/s20/materials/lec_15_S20.pptx
@@ -2182,7 +2182,7 @@
           </a:ln>
           <a:extLst>
             <a:ext uri="{C572A759-6A51-4108-AA02-DFA0A04FC94B}">
-              <ma14:wrappingTextBoxFlag xmlns="" xmlns:m="http://schemas.openxmlformats.org/officeDocument/2006/math" xmlns:a14="http://schemas.microsoft.com/office/drawing/2010/main" xmlns:ma14="http://schemas.microsoft.com/office/mac/drawingml/2011/main" val="1"/>
+              <ma14:wrappingTextBoxFlag xmlns:ma14="http://schemas.microsoft.com/office/mac/drawingml/2011/main" xmlns:a14="http://schemas.microsoft.com/office/drawing/2010/main" xmlns:m="http://schemas.openxmlformats.org/officeDocument/2006/math" xmlns="" val="1"/>
             </a:ext>
           </a:extLst>
         </p:spPr>
@@ -2221,7 +2221,7 @@
           </a:ln>
           <a:extLst>
             <a:ext uri="{C572A759-6A51-4108-AA02-DFA0A04FC94B}">
-              <ma14:wrappingTextBoxFlag xmlns="" xmlns:m="http://schemas.openxmlformats.org/officeDocument/2006/math" xmlns:a14="http://schemas.microsoft.com/office/drawing/2010/main" xmlns:ma14="http://schemas.microsoft.com/office/mac/drawingml/2011/main" val="1"/>
+              <ma14:wrappingTextBoxFlag xmlns:ma14="http://schemas.microsoft.com/office/mac/drawingml/2011/main" xmlns:a14="http://schemas.microsoft.com/office/drawing/2010/main" xmlns:m="http://schemas.openxmlformats.org/officeDocument/2006/math" xmlns="" val="1"/>
             </a:ext>
           </a:extLst>
         </p:spPr>
@@ -3459,7 +3459,7 @@
           </a:ln>
           <a:extLst>
             <a:ext uri="{C572A759-6A51-4108-AA02-DFA0A04FC94B}">
-              <ma14:wrappingTextBoxFlag xmlns="" xmlns:m="http://schemas.openxmlformats.org/officeDocument/2006/math" xmlns:a14="http://schemas.microsoft.com/office/drawing/2010/main" xmlns:ma14="http://schemas.microsoft.com/office/mac/drawingml/2011/main" val="1"/>
+              <ma14:wrappingTextBoxFlag xmlns:ma14="http://schemas.microsoft.com/office/mac/drawingml/2011/main" xmlns:a14="http://schemas.microsoft.com/office/drawing/2010/main" xmlns:m="http://schemas.openxmlformats.org/officeDocument/2006/math" xmlns="" val="1"/>
             </a:ext>
           </a:extLst>
         </p:spPr>
@@ -3515,7 +3515,7 @@
           </a:ln>
           <a:extLst>
             <a:ext uri="{C572A759-6A51-4108-AA02-DFA0A04FC94B}">
-              <ma14:wrappingTextBoxFlag xmlns="" xmlns:m="http://schemas.openxmlformats.org/officeDocument/2006/math" xmlns:a14="http://schemas.microsoft.com/office/drawing/2010/main" xmlns:ma14="http://schemas.microsoft.com/office/mac/drawingml/2011/main" val="1"/>
+              <ma14:wrappingTextBoxFlag xmlns:ma14="http://schemas.microsoft.com/office/mac/drawingml/2011/main" xmlns:a14="http://schemas.microsoft.com/office/drawing/2010/main" xmlns:m="http://schemas.openxmlformats.org/officeDocument/2006/math" xmlns="" val="1"/>
             </a:ext>
           </a:extLst>
         </p:spPr>
@@ -3671,7 +3671,7 @@
           </a:ln>
           <a:extLst>
             <a:ext uri="{C572A759-6A51-4108-AA02-DFA0A04FC94B}">
-              <ma14:wrappingTextBoxFlag xmlns="" xmlns:m="http://schemas.openxmlformats.org/officeDocument/2006/math" xmlns:a14="http://schemas.microsoft.com/office/drawing/2010/main" xmlns:ma14="http://schemas.microsoft.com/office/mac/drawingml/2011/main" val="1"/>
+              <ma14:wrappingTextBoxFlag xmlns:ma14="http://schemas.microsoft.com/office/mac/drawingml/2011/main" xmlns:a14="http://schemas.microsoft.com/office/drawing/2010/main" xmlns:m="http://schemas.openxmlformats.org/officeDocument/2006/math" xmlns="" val="1"/>
             </a:ext>
           </a:extLst>
         </p:spPr>
@@ -3740,7 +3740,7 @@
           </a:ln>
           <a:extLst>
             <a:ext uri="{C572A759-6A51-4108-AA02-DFA0A04FC94B}">
-              <ma14:wrappingTextBoxFlag xmlns="" xmlns:m="http://schemas.openxmlformats.org/officeDocument/2006/math" xmlns:a14="http://schemas.microsoft.com/office/drawing/2010/main" xmlns:ma14="http://schemas.microsoft.com/office/mac/drawingml/2011/main" val="1"/>
+              <ma14:wrappingTextBoxFlag xmlns:ma14="http://schemas.microsoft.com/office/mac/drawingml/2011/main" xmlns:a14="http://schemas.microsoft.com/office/drawing/2010/main" xmlns:m="http://schemas.openxmlformats.org/officeDocument/2006/math" xmlns="" val="1"/>
             </a:ext>
           </a:extLst>
         </p:spPr>
@@ -3896,7 +3896,7 @@
           </a:ln>
           <a:extLst>
             <a:ext uri="{C572A759-6A51-4108-AA02-DFA0A04FC94B}">
-              <ma14:wrappingTextBoxFlag xmlns="" xmlns:m="http://schemas.openxmlformats.org/officeDocument/2006/math" xmlns:a14="http://schemas.microsoft.com/office/drawing/2010/main" xmlns:ma14="http://schemas.microsoft.com/office/mac/drawingml/2011/main" val="1"/>
+              <ma14:wrappingTextBoxFlag xmlns:ma14="http://schemas.microsoft.com/office/mac/drawingml/2011/main" xmlns:a14="http://schemas.microsoft.com/office/drawing/2010/main" xmlns:m="http://schemas.openxmlformats.org/officeDocument/2006/math" xmlns="" val="1"/>
             </a:ext>
           </a:extLst>
         </p:spPr>
@@ -3978,7 +3978,7 @@
           </a:ln>
           <a:extLst>
             <a:ext uri="{C572A759-6A51-4108-AA02-DFA0A04FC94B}">
-              <ma14:wrappingTextBoxFlag xmlns="" xmlns:m="http://schemas.openxmlformats.org/officeDocument/2006/math" xmlns:a14="http://schemas.microsoft.com/office/drawing/2010/main" xmlns:ma14="http://schemas.microsoft.com/office/mac/drawingml/2011/main" val="1"/>
+              <ma14:wrappingTextBoxFlag xmlns:ma14="http://schemas.microsoft.com/office/mac/drawingml/2011/main" xmlns:a14="http://schemas.microsoft.com/office/drawing/2010/main" xmlns:m="http://schemas.openxmlformats.org/officeDocument/2006/math" xmlns="" val="1"/>
             </a:ext>
           </a:extLst>
         </p:spPr>
@@ -4134,7 +4134,7 @@
           </a:ln>
           <a:extLst>
             <a:ext uri="{C572A759-6A51-4108-AA02-DFA0A04FC94B}">
-              <ma14:wrappingTextBoxFlag xmlns="" xmlns:m="http://schemas.openxmlformats.org/officeDocument/2006/math" xmlns:a14="http://schemas.microsoft.com/office/drawing/2010/main" xmlns:ma14="http://schemas.microsoft.com/office/mac/drawingml/2011/main" val="1"/>
+              <ma14:wrappingTextBoxFlag xmlns:ma14="http://schemas.microsoft.com/office/mac/drawingml/2011/main" xmlns:a14="http://schemas.microsoft.com/office/drawing/2010/main" xmlns:m="http://schemas.openxmlformats.org/officeDocument/2006/math" xmlns="" val="1"/>
             </a:ext>
           </a:extLst>
         </p:spPr>
@@ -4229,7 +4229,7 @@
           </a:ln>
           <a:extLst>
             <a:ext uri="{C572A759-6A51-4108-AA02-DFA0A04FC94B}">
-              <ma14:wrappingTextBoxFlag xmlns="" xmlns:m="http://schemas.openxmlformats.org/officeDocument/2006/math" xmlns:a14="http://schemas.microsoft.com/office/drawing/2010/main" xmlns:ma14="http://schemas.microsoft.com/office/mac/drawingml/2011/main" val="1"/>
+              <ma14:wrappingTextBoxFlag xmlns:ma14="http://schemas.microsoft.com/office/mac/drawingml/2011/main" xmlns:a14="http://schemas.microsoft.com/office/drawing/2010/main" xmlns:m="http://schemas.openxmlformats.org/officeDocument/2006/math" xmlns="" val="1"/>
             </a:ext>
           </a:extLst>
         </p:spPr>
@@ -4385,7 +4385,7 @@
           </a:ln>
           <a:extLst>
             <a:ext uri="{C572A759-6A51-4108-AA02-DFA0A04FC94B}">
-              <ma14:wrappingTextBoxFlag xmlns="" xmlns:m="http://schemas.openxmlformats.org/officeDocument/2006/math" xmlns:a14="http://schemas.microsoft.com/office/drawing/2010/main" xmlns:ma14="http://schemas.microsoft.com/office/mac/drawingml/2011/main" val="1"/>
+              <ma14:wrappingTextBoxFlag xmlns:ma14="http://schemas.microsoft.com/office/mac/drawingml/2011/main" xmlns:a14="http://schemas.microsoft.com/office/drawing/2010/main" xmlns:m="http://schemas.openxmlformats.org/officeDocument/2006/math" xmlns="" val="1"/>
             </a:ext>
           </a:extLst>
         </p:spPr>
@@ -4595,7 +4595,7 @@
           </a:ln>
           <a:extLst>
             <a:ext uri="{C572A759-6A51-4108-AA02-DFA0A04FC94B}">
-              <ma14:wrappingTextBoxFlag xmlns="" xmlns:m="http://schemas.openxmlformats.org/officeDocument/2006/math" xmlns:a14="http://schemas.microsoft.com/office/drawing/2010/main" xmlns:ma14="http://schemas.microsoft.com/office/mac/drawingml/2011/main" val="1"/>
+              <ma14:wrappingTextBoxFlag xmlns:ma14="http://schemas.microsoft.com/office/mac/drawingml/2011/main" xmlns:a14="http://schemas.microsoft.com/office/drawing/2010/main" xmlns:m="http://schemas.openxmlformats.org/officeDocument/2006/math" xmlns="" val="1"/>
             </a:ext>
           </a:extLst>
         </p:spPr>
@@ -4751,7 +4751,7 @@
           </a:ln>
           <a:extLst>
             <a:ext uri="{C572A759-6A51-4108-AA02-DFA0A04FC94B}">
-              <ma14:wrappingTextBoxFlag xmlns="" xmlns:m="http://schemas.openxmlformats.org/officeDocument/2006/math" xmlns:a14="http://schemas.microsoft.com/office/drawing/2010/main" xmlns:ma14="http://schemas.microsoft.com/office/mac/drawingml/2011/main" val="1"/>
+              <ma14:wrappingTextBoxFlag xmlns:ma14="http://schemas.microsoft.com/office/mac/drawingml/2011/main" xmlns:a14="http://schemas.microsoft.com/office/drawing/2010/main" xmlns:m="http://schemas.openxmlformats.org/officeDocument/2006/math" xmlns="" val="1"/>
             </a:ext>
           </a:extLst>
         </p:spPr>
@@ -4795,7 +4795,7 @@
           </a:ln>
           <a:extLst>
             <a:ext uri="{C572A759-6A51-4108-AA02-DFA0A04FC94B}">
-              <ma14:wrappingTextBoxFlag xmlns="" xmlns:m="http://schemas.openxmlformats.org/officeDocument/2006/math" xmlns:a14="http://schemas.microsoft.com/office/drawing/2010/main" xmlns:ma14="http://schemas.microsoft.com/office/mac/drawingml/2011/main" val="1"/>
+              <ma14:wrappingTextBoxFlag xmlns:ma14="http://schemas.microsoft.com/office/mac/drawingml/2011/main" xmlns:a14="http://schemas.microsoft.com/office/drawing/2010/main" xmlns:m="http://schemas.openxmlformats.org/officeDocument/2006/math" xmlns="" val="1"/>
             </a:ext>
           </a:extLst>
         </p:spPr>
@@ -4959,7 +4959,7 @@
           </a:ln>
           <a:extLst>
             <a:ext uri="{C572A759-6A51-4108-AA02-DFA0A04FC94B}">
-              <ma14:wrappingTextBoxFlag xmlns="" xmlns:m="http://schemas.openxmlformats.org/officeDocument/2006/math" xmlns:a14="http://schemas.microsoft.com/office/drawing/2010/main" xmlns:ma14="http://schemas.microsoft.com/office/mac/drawingml/2011/main" val="1"/>
+              <ma14:wrappingTextBoxFlag xmlns:ma14="http://schemas.microsoft.com/office/mac/drawingml/2011/main" xmlns:a14="http://schemas.microsoft.com/office/drawing/2010/main" xmlns:m="http://schemas.openxmlformats.org/officeDocument/2006/math" xmlns="" val="1"/>
             </a:ext>
           </a:extLst>
         </p:spPr>
@@ -5003,7 +5003,7 @@
           </a:ln>
           <a:extLst>
             <a:ext uri="{C572A759-6A51-4108-AA02-DFA0A04FC94B}">
-              <ma14:wrappingTextBoxFlag xmlns="" xmlns:m="http://schemas.openxmlformats.org/officeDocument/2006/math" xmlns:a14="http://schemas.microsoft.com/office/drawing/2010/main" xmlns:ma14="http://schemas.microsoft.com/office/mac/drawingml/2011/main" val="1"/>
+              <ma14:wrappingTextBoxFlag xmlns:ma14="http://schemas.microsoft.com/office/mac/drawingml/2011/main" xmlns:a14="http://schemas.microsoft.com/office/drawing/2010/main" xmlns:m="http://schemas.openxmlformats.org/officeDocument/2006/math" xmlns="" val="1"/>
             </a:ext>
           </a:extLst>
         </p:spPr>
@@ -5135,7 +5135,7 @@
           </a:ln>
           <a:extLst>
             <a:ext uri="{C572A759-6A51-4108-AA02-DFA0A04FC94B}">
-              <ma14:wrappingTextBoxFlag xmlns="" xmlns:m="http://schemas.openxmlformats.org/officeDocument/2006/math" xmlns:a14="http://schemas.microsoft.com/office/drawing/2010/main" xmlns:ma14="http://schemas.microsoft.com/office/mac/drawingml/2011/main" val="1"/>
+              <ma14:wrappingTextBoxFlag xmlns:ma14="http://schemas.microsoft.com/office/mac/drawingml/2011/main" xmlns:a14="http://schemas.microsoft.com/office/drawing/2010/main" xmlns:m="http://schemas.openxmlformats.org/officeDocument/2006/math" xmlns="" val="1"/>
             </a:ext>
           </a:extLst>
         </p:spPr>
@@ -5242,7 +5242,7 @@
           </a:ln>
           <a:extLst>
             <a:ext uri="{C572A759-6A51-4108-AA02-DFA0A04FC94B}">
-              <ma14:wrappingTextBoxFlag xmlns="" xmlns:m="http://schemas.openxmlformats.org/officeDocument/2006/math" xmlns:a14="http://schemas.microsoft.com/office/drawing/2010/main" xmlns:ma14="http://schemas.microsoft.com/office/mac/drawingml/2011/main" val="1"/>
+              <ma14:wrappingTextBoxFlag xmlns:ma14="http://schemas.microsoft.com/office/mac/drawingml/2011/main" xmlns:a14="http://schemas.microsoft.com/office/drawing/2010/main" xmlns:m="http://schemas.openxmlformats.org/officeDocument/2006/math" xmlns="" val="1"/>
             </a:ext>
           </a:extLst>
         </p:spPr>
@@ -5410,7 +5410,7 @@
           </a:ln>
           <a:extLst>
             <a:ext uri="{C572A759-6A51-4108-AA02-DFA0A04FC94B}">
-              <ma14:wrappingTextBoxFlag xmlns="" xmlns:m="http://schemas.openxmlformats.org/officeDocument/2006/math" xmlns:a14="http://schemas.microsoft.com/office/drawing/2010/main" xmlns:ma14="http://schemas.microsoft.com/office/mac/drawingml/2011/main" val="1"/>
+              <ma14:wrappingTextBoxFlag xmlns:ma14="http://schemas.microsoft.com/office/mac/drawingml/2011/main" xmlns:a14="http://schemas.microsoft.com/office/drawing/2010/main" xmlns:m="http://schemas.openxmlformats.org/officeDocument/2006/math" xmlns="" val="1"/>
             </a:ext>
           </a:extLst>
         </p:spPr>
@@ -5457,7 +5457,7 @@
           </a:ln>
           <a:extLst>
             <a:ext uri="{C572A759-6A51-4108-AA02-DFA0A04FC94B}">
-              <ma14:wrappingTextBoxFlag xmlns="" xmlns:m="http://schemas.openxmlformats.org/officeDocument/2006/math" xmlns:a14="http://schemas.microsoft.com/office/drawing/2010/main" xmlns:ma14="http://schemas.microsoft.com/office/mac/drawingml/2011/main" val="1"/>
+              <ma14:wrappingTextBoxFlag xmlns:ma14="http://schemas.microsoft.com/office/mac/drawingml/2011/main" xmlns:a14="http://schemas.microsoft.com/office/drawing/2010/main" xmlns:m="http://schemas.openxmlformats.org/officeDocument/2006/math" xmlns="" val="1"/>
             </a:ext>
           </a:extLst>
         </p:spPr>
@@ -5577,7 +5577,7 @@
           </a:ln>
           <a:extLst>
             <a:ext uri="{C572A759-6A51-4108-AA02-DFA0A04FC94B}">
-              <ma14:wrappingTextBoxFlag xmlns="" xmlns:m="http://schemas.openxmlformats.org/officeDocument/2006/math" xmlns:a14="http://schemas.microsoft.com/office/drawing/2010/main" xmlns:ma14="http://schemas.microsoft.com/office/mac/drawingml/2011/main" val="1"/>
+              <ma14:wrappingTextBoxFlag xmlns:ma14="http://schemas.microsoft.com/office/mac/drawingml/2011/main" xmlns:a14="http://schemas.microsoft.com/office/drawing/2010/main" xmlns:m="http://schemas.openxmlformats.org/officeDocument/2006/math" xmlns="" val="1"/>
             </a:ext>
           </a:extLst>
         </p:spPr>
@@ -5633,7 +5633,7 @@
           </a:ln>
           <a:extLst>
             <a:ext uri="{C572A759-6A51-4108-AA02-DFA0A04FC94B}">
-              <ma14:wrappingTextBoxFlag xmlns="" xmlns:m="http://schemas.openxmlformats.org/officeDocument/2006/math" xmlns:a14="http://schemas.microsoft.com/office/drawing/2010/main" xmlns:ma14="http://schemas.microsoft.com/office/mac/drawingml/2011/main" val="1"/>
+              <ma14:wrappingTextBoxFlag xmlns:ma14="http://schemas.microsoft.com/office/mac/drawingml/2011/main" xmlns:a14="http://schemas.microsoft.com/office/drawing/2010/main" xmlns:m="http://schemas.openxmlformats.org/officeDocument/2006/math" xmlns="" val="1"/>
             </a:ext>
           </a:extLst>
         </p:spPr>
@@ -5810,7 +5810,7 @@
           </a:ln>
           <a:extLst>
             <a:ext uri="{C572A759-6A51-4108-AA02-DFA0A04FC94B}">
-              <ma14:wrappingTextBoxFlag xmlns="" xmlns:m="http://schemas.openxmlformats.org/officeDocument/2006/math" xmlns:a14="http://schemas.microsoft.com/office/drawing/2010/main" xmlns:ma14="http://schemas.microsoft.com/office/mac/drawingml/2011/main" val="1"/>
+              <ma14:wrappingTextBoxFlag xmlns:ma14="http://schemas.microsoft.com/office/mac/drawingml/2011/main" xmlns:a14="http://schemas.microsoft.com/office/drawing/2010/main" xmlns:m="http://schemas.openxmlformats.org/officeDocument/2006/math" xmlns="" val="1"/>
             </a:ext>
           </a:extLst>
         </p:spPr>
@@ -5978,7 +5978,7 @@
           </a:ln>
           <a:extLst>
             <a:ext uri="{C572A759-6A51-4108-AA02-DFA0A04FC94B}">
-              <ma14:wrappingTextBoxFlag xmlns="" xmlns:m="http://schemas.openxmlformats.org/officeDocument/2006/math" xmlns:a14="http://schemas.microsoft.com/office/drawing/2010/main" xmlns:ma14="http://schemas.microsoft.com/office/mac/drawingml/2011/main" val="1"/>
+              <ma14:wrappingTextBoxFlag xmlns:ma14="http://schemas.microsoft.com/office/mac/drawingml/2011/main" xmlns:a14="http://schemas.microsoft.com/office/drawing/2010/main" xmlns:m="http://schemas.openxmlformats.org/officeDocument/2006/math" xmlns="" val="1"/>
             </a:ext>
           </a:extLst>
         </p:spPr>
@@ -6072,7 +6072,7 @@
           </a:ln>
           <a:extLst>
             <a:ext uri="{C572A759-6A51-4108-AA02-DFA0A04FC94B}">
-              <ma14:wrappingTextBoxFlag xmlns="" xmlns:m="http://schemas.openxmlformats.org/officeDocument/2006/math" xmlns:a14="http://schemas.microsoft.com/office/drawing/2010/main" xmlns:ma14="http://schemas.microsoft.com/office/mac/drawingml/2011/main" val="1"/>
+              <ma14:wrappingTextBoxFlag xmlns:ma14="http://schemas.microsoft.com/office/mac/drawingml/2011/main" xmlns:a14="http://schemas.microsoft.com/office/drawing/2010/main" xmlns:m="http://schemas.openxmlformats.org/officeDocument/2006/math" xmlns="" val="1"/>
             </a:ext>
           </a:extLst>
         </p:spPr>
@@ -6134,7 +6134,7 @@
           </a:ln>
           <a:extLst>
             <a:ext uri="{C572A759-6A51-4108-AA02-DFA0A04FC94B}">
-              <ma14:wrappingTextBoxFlag xmlns="" xmlns:m="http://schemas.openxmlformats.org/officeDocument/2006/math" xmlns:a14="http://schemas.microsoft.com/office/drawing/2010/main" xmlns:ma14="http://schemas.microsoft.com/office/mac/drawingml/2011/main" val="1"/>
+              <ma14:wrappingTextBoxFlag xmlns:ma14="http://schemas.microsoft.com/office/mac/drawingml/2011/main" xmlns:a14="http://schemas.microsoft.com/office/drawing/2010/main" xmlns:m="http://schemas.openxmlformats.org/officeDocument/2006/math" xmlns="" val="1"/>
             </a:ext>
           </a:extLst>
         </p:spPr>
@@ -6173,7 +6173,7 @@
           </a:ln>
           <a:extLst>
             <a:ext uri="{C572A759-6A51-4108-AA02-DFA0A04FC94B}">
-              <ma14:wrappingTextBoxFlag xmlns="" xmlns:m="http://schemas.openxmlformats.org/officeDocument/2006/math" xmlns:a14="http://schemas.microsoft.com/office/drawing/2010/main" xmlns:ma14="http://schemas.microsoft.com/office/mac/drawingml/2011/main" val="1"/>
+              <ma14:wrappingTextBoxFlag xmlns:ma14="http://schemas.microsoft.com/office/mac/drawingml/2011/main" xmlns:a14="http://schemas.microsoft.com/office/drawing/2010/main" xmlns:m="http://schemas.openxmlformats.org/officeDocument/2006/math" xmlns="" val="1"/>
             </a:ext>
           </a:extLst>
         </p:spPr>
@@ -6238,7 +6238,7 @@
           </a:ln>
           <a:extLst>
             <a:ext uri="{C572A759-6A51-4108-AA02-DFA0A04FC94B}">
-              <ma14:wrappingTextBoxFlag xmlns="" xmlns:m="http://schemas.openxmlformats.org/officeDocument/2006/math" xmlns:a14="http://schemas.microsoft.com/office/drawing/2010/main" xmlns:ma14="http://schemas.microsoft.com/office/mac/drawingml/2011/main" val="1"/>
+              <ma14:wrappingTextBoxFlag xmlns:ma14="http://schemas.microsoft.com/office/mac/drawingml/2011/main" xmlns:a14="http://schemas.microsoft.com/office/drawing/2010/main" xmlns:m="http://schemas.openxmlformats.org/officeDocument/2006/math" xmlns="" val="1"/>
             </a:ext>
           </a:extLst>
         </p:spPr>
@@ -6294,7 +6294,7 @@
           </a:ln>
           <a:extLst>
             <a:ext uri="{C572A759-6A51-4108-AA02-DFA0A04FC94B}">
-              <ma14:wrappingTextBoxFlag xmlns="" xmlns:m="http://schemas.openxmlformats.org/officeDocument/2006/math" xmlns:a14="http://schemas.microsoft.com/office/drawing/2010/main" xmlns:ma14="http://schemas.microsoft.com/office/mac/drawingml/2011/main" val="1"/>
+              <ma14:wrappingTextBoxFlag xmlns:ma14="http://schemas.microsoft.com/office/mac/drawingml/2011/main" xmlns:a14="http://schemas.microsoft.com/office/drawing/2010/main" xmlns:m="http://schemas.openxmlformats.org/officeDocument/2006/math" xmlns="" val="1"/>
             </a:ext>
           </a:extLst>
         </p:spPr>
@@ -6446,7 +6446,7 @@
           </a:ln>
           <a:extLst>
             <a:ext uri="{C572A759-6A51-4108-AA02-DFA0A04FC94B}">
-              <ma14:wrappingTextBoxFlag xmlns="" xmlns:m="http://schemas.openxmlformats.org/officeDocument/2006/math" xmlns:a14="http://schemas.microsoft.com/office/drawing/2010/main" xmlns:ma14="http://schemas.microsoft.com/office/mac/drawingml/2011/main" val="1"/>
+              <ma14:wrappingTextBoxFlag xmlns:ma14="http://schemas.microsoft.com/office/mac/drawingml/2011/main" xmlns:a14="http://schemas.microsoft.com/office/drawing/2010/main" xmlns:m="http://schemas.openxmlformats.org/officeDocument/2006/math" xmlns="" val="1"/>
             </a:ext>
           </a:extLst>
         </p:spPr>
@@ -6528,7 +6528,7 @@
           </a:ln>
           <a:extLst>
             <a:ext uri="{C572A759-6A51-4108-AA02-DFA0A04FC94B}">
-              <ma14:wrappingTextBoxFlag xmlns="" xmlns:m="http://schemas.openxmlformats.org/officeDocument/2006/math" xmlns:a14="http://schemas.microsoft.com/office/drawing/2010/main" xmlns:ma14="http://schemas.microsoft.com/office/mac/drawingml/2011/main" val="1"/>
+              <ma14:wrappingTextBoxFlag xmlns:ma14="http://schemas.microsoft.com/office/mac/drawingml/2011/main" xmlns:a14="http://schemas.microsoft.com/office/drawing/2010/main" xmlns:m="http://schemas.openxmlformats.org/officeDocument/2006/math" xmlns="" val="1"/>
             </a:ext>
           </a:extLst>
         </p:spPr>
@@ -6831,7 +6831,7 @@
           </a:ln>
           <a:extLst>
             <a:ext uri="{C572A759-6A51-4108-AA02-DFA0A04FC94B}">
-              <ma14:wrappingTextBoxFlag xmlns="" xmlns:m="http://schemas.openxmlformats.org/officeDocument/2006/math" xmlns:a14="http://schemas.microsoft.com/office/drawing/2010/main" xmlns:ma14="http://schemas.microsoft.com/office/mac/drawingml/2011/main" val="1"/>
+              <ma14:wrappingTextBoxFlag xmlns:ma14="http://schemas.microsoft.com/office/mac/drawingml/2011/main" xmlns:a14="http://schemas.microsoft.com/office/drawing/2010/main" xmlns:m="http://schemas.openxmlformats.org/officeDocument/2006/math" xmlns="" val="1"/>
             </a:ext>
           </a:extLst>
         </p:spPr>
@@ -6894,7 +6894,7 @@
           </a:ln>
           <a:extLst>
             <a:ext uri="{C572A759-6A51-4108-AA02-DFA0A04FC94B}">
-              <ma14:wrappingTextBoxFlag xmlns="" xmlns:m="http://schemas.openxmlformats.org/officeDocument/2006/math" xmlns:a14="http://schemas.microsoft.com/office/drawing/2010/main" xmlns:ma14="http://schemas.microsoft.com/office/mac/drawingml/2011/main" val="1"/>
+              <ma14:wrappingTextBoxFlag xmlns:ma14="http://schemas.microsoft.com/office/mac/drawingml/2011/main" xmlns:a14="http://schemas.microsoft.com/office/drawing/2010/main" xmlns:m="http://schemas.openxmlformats.org/officeDocument/2006/math" xmlns="" val="1"/>
             </a:ext>
           </a:extLst>
         </p:spPr>
@@ -7002,7 +7002,7 @@
           </a:ln>
           <a:extLst>
             <a:ext uri="{C572A759-6A51-4108-AA02-DFA0A04FC94B}">
-              <ma14:wrappingTextBoxFlag xmlns="" xmlns:m="http://schemas.openxmlformats.org/officeDocument/2006/math" xmlns:a14="http://schemas.microsoft.com/office/drawing/2010/main" xmlns:ma14="http://schemas.microsoft.com/office/mac/drawingml/2011/main" val="1"/>
+              <ma14:wrappingTextBoxFlag xmlns:ma14="http://schemas.microsoft.com/office/mac/drawingml/2011/main" xmlns:a14="http://schemas.microsoft.com/office/drawing/2010/main" xmlns:m="http://schemas.openxmlformats.org/officeDocument/2006/math" xmlns="" val="1"/>
             </a:ext>
           </a:extLst>
         </p:spPr>
@@ -7162,7 +7162,7 @@
           </a:ln>
           <a:extLst>
             <a:ext uri="{C572A759-6A51-4108-AA02-DFA0A04FC94B}">
-              <ma14:wrappingTextBoxFlag xmlns="" xmlns:m="http://schemas.openxmlformats.org/officeDocument/2006/math" xmlns:a14="http://schemas.microsoft.com/office/drawing/2010/main" xmlns:ma14="http://schemas.microsoft.com/office/mac/drawingml/2011/main" val="1"/>
+              <ma14:wrappingTextBoxFlag xmlns:ma14="http://schemas.microsoft.com/office/mac/drawingml/2011/main" xmlns:a14="http://schemas.microsoft.com/office/drawing/2010/main" xmlns:m="http://schemas.openxmlformats.org/officeDocument/2006/math" xmlns="" val="1"/>
             </a:ext>
           </a:extLst>
         </p:spPr>
@@ -7256,7 +7256,7 @@
           </a:ln>
           <a:extLst>
             <a:ext uri="{C572A759-6A51-4108-AA02-DFA0A04FC94B}">
-              <ma14:wrappingTextBoxFlag xmlns="" xmlns:m="http://schemas.openxmlformats.org/officeDocument/2006/math" xmlns:a14="http://schemas.microsoft.com/office/drawing/2010/main" xmlns:ma14="http://schemas.microsoft.com/office/mac/drawingml/2011/main" val="1"/>
+              <ma14:wrappingTextBoxFlag xmlns:ma14="http://schemas.microsoft.com/office/mac/drawingml/2011/main" xmlns:a14="http://schemas.microsoft.com/office/drawing/2010/main" xmlns:m="http://schemas.openxmlformats.org/officeDocument/2006/math" xmlns="" val="1"/>
             </a:ext>
           </a:extLst>
         </p:spPr>
@@ -7390,7 +7390,7 @@
           </a:ln>
           <a:extLst>
             <a:ext uri="{C572A759-6A51-4108-AA02-DFA0A04FC94B}">
-              <ma14:wrappingTextBoxFlag xmlns="" xmlns:m="http://schemas.openxmlformats.org/officeDocument/2006/math" xmlns:a14="http://schemas.microsoft.com/office/drawing/2010/main" xmlns:ma14="http://schemas.microsoft.com/office/mac/drawingml/2011/main" val="1"/>
+              <ma14:wrappingTextBoxFlag xmlns:ma14="http://schemas.microsoft.com/office/mac/drawingml/2011/main" xmlns:a14="http://schemas.microsoft.com/office/drawing/2010/main" xmlns:m="http://schemas.openxmlformats.org/officeDocument/2006/math" xmlns="" val="1"/>
             </a:ext>
           </a:extLst>
         </p:spPr>
@@ -7463,7 +7463,7 @@
           </a:ln>
           <a:extLst>
             <a:ext uri="{C572A759-6A51-4108-AA02-DFA0A04FC94B}">
-              <ma14:wrappingTextBoxFlag xmlns="" xmlns:m="http://schemas.openxmlformats.org/officeDocument/2006/math" xmlns:a14="http://schemas.microsoft.com/office/drawing/2010/main" xmlns:ma14="http://schemas.microsoft.com/office/mac/drawingml/2011/main" val="1"/>
+              <ma14:wrappingTextBoxFlag xmlns:ma14="http://schemas.microsoft.com/office/mac/drawingml/2011/main" xmlns:a14="http://schemas.microsoft.com/office/drawing/2010/main" xmlns:m="http://schemas.openxmlformats.org/officeDocument/2006/math" xmlns="" val="1"/>
             </a:ext>
           </a:extLst>
         </p:spPr>
@@ -7545,7 +7545,7 @@
           </a:ln>
           <a:extLst>
             <a:ext uri="{C572A759-6A51-4108-AA02-DFA0A04FC94B}">
-              <ma14:wrappingTextBoxFlag xmlns="" xmlns:m="http://schemas.openxmlformats.org/officeDocument/2006/math" xmlns:a14="http://schemas.microsoft.com/office/drawing/2010/main" xmlns:ma14="http://schemas.microsoft.com/office/mac/drawingml/2011/main" val="1"/>
+              <ma14:wrappingTextBoxFlag xmlns:ma14="http://schemas.microsoft.com/office/mac/drawingml/2011/main" xmlns:a14="http://schemas.microsoft.com/office/drawing/2010/main" xmlns:m="http://schemas.openxmlformats.org/officeDocument/2006/math" xmlns="" val="1"/>
             </a:ext>
           </a:extLst>
         </p:spPr>
@@ -7705,7 +7705,7 @@
           </a:ln>
           <a:extLst>
             <a:ext uri="{C572A759-6A51-4108-AA02-DFA0A04FC94B}">
-              <ma14:wrappingTextBoxFlag xmlns="" xmlns:m="http://schemas.openxmlformats.org/officeDocument/2006/math" xmlns:a14="http://schemas.microsoft.com/office/drawing/2010/main" xmlns:ma14="http://schemas.microsoft.com/office/mac/drawingml/2011/main" val="1"/>
+              <ma14:wrappingTextBoxFlag xmlns:ma14="http://schemas.microsoft.com/office/mac/drawingml/2011/main" xmlns:a14="http://schemas.microsoft.com/office/drawing/2010/main" xmlns:m="http://schemas.openxmlformats.org/officeDocument/2006/math" xmlns="" val="1"/>
             </a:ext>
           </a:extLst>
         </p:spPr>
@@ -7800,7 +7800,7 @@
           </a:ln>
           <a:extLst>
             <a:ext uri="{C572A759-6A51-4108-AA02-DFA0A04FC94B}">
-              <ma14:wrappingTextBoxFlag xmlns="" xmlns:m="http://schemas.openxmlformats.org/officeDocument/2006/math" xmlns:a14="http://schemas.microsoft.com/office/drawing/2010/main" xmlns:ma14="http://schemas.microsoft.com/office/mac/drawingml/2011/main" val="1"/>
+              <ma14:wrappingTextBoxFlag xmlns:ma14="http://schemas.microsoft.com/office/mac/drawingml/2011/main" xmlns:a14="http://schemas.microsoft.com/office/drawing/2010/main" xmlns:m="http://schemas.openxmlformats.org/officeDocument/2006/math" xmlns="" val="1"/>
             </a:ext>
           </a:extLst>
         </p:spPr>
@@ -7960,7 +7960,7 @@
           </a:ln>
           <a:extLst>
             <a:ext uri="{C572A759-6A51-4108-AA02-DFA0A04FC94B}">
-              <ma14:wrappingTextBoxFlag xmlns="" xmlns:m="http://schemas.openxmlformats.org/officeDocument/2006/math" xmlns:a14="http://schemas.microsoft.com/office/drawing/2010/main" xmlns:ma14="http://schemas.microsoft.com/office/mac/drawingml/2011/main" val="1"/>
+              <ma14:wrappingTextBoxFlag xmlns:ma14="http://schemas.microsoft.com/office/mac/drawingml/2011/main" xmlns:a14="http://schemas.microsoft.com/office/drawing/2010/main" xmlns:m="http://schemas.openxmlformats.org/officeDocument/2006/math" xmlns="" val="1"/>
             </a:ext>
           </a:extLst>
         </p:spPr>
@@ -8068,7 +8068,7 @@
           </a:ln>
           <a:extLst>
             <a:ext uri="{C572A759-6A51-4108-AA02-DFA0A04FC94B}">
-              <ma14:wrappingTextBoxFlag xmlns="" xmlns:m="http://schemas.openxmlformats.org/officeDocument/2006/math" xmlns:a14="http://schemas.microsoft.com/office/drawing/2010/main" xmlns:ma14="http://schemas.microsoft.com/office/mac/drawingml/2011/main" val="1"/>
+              <ma14:wrappingTextBoxFlag xmlns:ma14="http://schemas.microsoft.com/office/mac/drawingml/2011/main" xmlns:a14="http://schemas.microsoft.com/office/drawing/2010/main" xmlns:m="http://schemas.openxmlformats.org/officeDocument/2006/math" xmlns="" val="1"/>
             </a:ext>
           </a:extLst>
         </p:spPr>
@@ -8228,7 +8228,7 @@
           </a:ln>
           <a:extLst>
             <a:ext uri="{C572A759-6A51-4108-AA02-DFA0A04FC94B}">
-              <ma14:wrappingTextBoxFlag xmlns="" xmlns:m="http://schemas.openxmlformats.org/officeDocument/2006/math" xmlns:a14="http://schemas.microsoft.com/office/drawing/2010/main" xmlns:ma14="http://schemas.microsoft.com/office/mac/drawingml/2011/main" val="1"/>
+              <ma14:wrappingTextBoxFlag xmlns:ma14="http://schemas.microsoft.com/office/mac/drawingml/2011/main" xmlns:a14="http://schemas.microsoft.com/office/drawing/2010/main" xmlns:m="http://schemas.openxmlformats.org/officeDocument/2006/math" xmlns="" val="1"/>
             </a:ext>
           </a:extLst>
         </p:spPr>
@@ -8378,7 +8378,7 @@
           </a:ln>
           <a:extLst>
             <a:ext uri="{C572A759-6A51-4108-AA02-DFA0A04FC94B}">
-              <ma14:wrappingTextBoxFlag xmlns="" xmlns:m="http://schemas.openxmlformats.org/officeDocument/2006/math" xmlns:a14="http://schemas.microsoft.com/office/drawing/2010/main" xmlns:ma14="http://schemas.microsoft.com/office/mac/drawingml/2011/main" val="1"/>
+              <ma14:wrappingTextBoxFlag xmlns:ma14="http://schemas.microsoft.com/office/mac/drawingml/2011/main" xmlns:a14="http://schemas.microsoft.com/office/drawing/2010/main" xmlns:m="http://schemas.openxmlformats.org/officeDocument/2006/math" xmlns="" val="1"/>
             </a:ext>
           </a:extLst>
         </p:spPr>
@@ -9169,7 +9169,7 @@
           </a:ln>
           <a:extLst>
             <a:ext uri="{C572A759-6A51-4108-AA02-DFA0A04FC94B}">
-              <ma14:wrappingTextBoxFlag xmlns="" xmlns:m="http://schemas.openxmlformats.org/officeDocument/2006/math" xmlns:a14="http://schemas.microsoft.com/office/drawing/2010/main" xmlns:ma14="http://schemas.microsoft.com/office/mac/drawingml/2011/main" val="1"/>
+              <ma14:wrappingTextBoxFlag xmlns:ma14="http://schemas.microsoft.com/office/mac/drawingml/2011/main" xmlns:a14="http://schemas.microsoft.com/office/drawing/2010/main" xmlns:m="http://schemas.openxmlformats.org/officeDocument/2006/math" xmlns="" val="1"/>
             </a:ext>
           </a:extLst>
         </p:spPr>
@@ -9220,7 +9220,7 @@
           </a:ln>
           <a:extLst>
             <a:ext uri="{C572A759-6A51-4108-AA02-DFA0A04FC94B}">
-              <ma14:wrappingTextBoxFlag xmlns="" xmlns:m="http://schemas.openxmlformats.org/officeDocument/2006/math" xmlns:a14="http://schemas.microsoft.com/office/drawing/2010/main" xmlns:ma14="http://schemas.microsoft.com/office/mac/drawingml/2011/main" val="1"/>
+              <ma14:wrappingTextBoxFlag xmlns:ma14="http://schemas.microsoft.com/office/mac/drawingml/2011/main" xmlns:a14="http://schemas.microsoft.com/office/drawing/2010/main" xmlns:m="http://schemas.openxmlformats.org/officeDocument/2006/math" xmlns="" val="1"/>
             </a:ext>
           </a:extLst>
         </p:spPr>
@@ -9268,7 +9268,7 @@
           </a:ln>
           <a:extLst>
             <a:ext uri="{C572A759-6A51-4108-AA02-DFA0A04FC94B}">
-              <ma14:wrappingTextBoxFlag xmlns="" xmlns:m="http://schemas.openxmlformats.org/officeDocument/2006/math" xmlns:a14="http://schemas.microsoft.com/office/drawing/2010/main" xmlns:ma14="http://schemas.microsoft.com/office/mac/drawingml/2011/main" val="1"/>
+              <ma14:wrappingTextBoxFlag xmlns:ma14="http://schemas.microsoft.com/office/mac/drawingml/2011/main" xmlns:a14="http://schemas.microsoft.com/office/drawing/2010/main" xmlns:m="http://schemas.openxmlformats.org/officeDocument/2006/math" xmlns="" val="1"/>
             </a:ext>
           </a:extLst>
         </p:spPr>
@@ -9316,7 +9316,7 @@
           </a:ln>
           <a:extLst>
             <a:ext uri="{C572A759-6A51-4108-AA02-DFA0A04FC94B}">
-              <ma14:wrappingTextBoxFlag xmlns="" xmlns:m="http://schemas.openxmlformats.org/officeDocument/2006/math" xmlns:a14="http://schemas.microsoft.com/office/drawing/2010/main" xmlns:ma14="http://schemas.microsoft.com/office/mac/drawingml/2011/main" val="1"/>
+              <ma14:wrappingTextBoxFlag xmlns:ma14="http://schemas.microsoft.com/office/mac/drawingml/2011/main" xmlns:a14="http://schemas.microsoft.com/office/drawing/2010/main" xmlns:m="http://schemas.openxmlformats.org/officeDocument/2006/math" xmlns="" val="1"/>
             </a:ext>
           </a:extLst>
         </p:spPr>
@@ -9367,7 +9367,7 @@
           </a:ln>
           <a:extLst>
             <a:ext uri="{C572A759-6A51-4108-AA02-DFA0A04FC94B}">
-              <ma14:wrappingTextBoxFlag xmlns="" xmlns:m="http://schemas.openxmlformats.org/officeDocument/2006/math" xmlns:a14="http://schemas.microsoft.com/office/drawing/2010/main" xmlns:ma14="http://schemas.microsoft.com/office/mac/drawingml/2011/main" val="1"/>
+              <ma14:wrappingTextBoxFlag xmlns:ma14="http://schemas.microsoft.com/office/mac/drawingml/2011/main" xmlns:a14="http://schemas.microsoft.com/office/drawing/2010/main" xmlns:m="http://schemas.openxmlformats.org/officeDocument/2006/math" xmlns="" val="1"/>
             </a:ext>
           </a:extLst>
         </p:spPr>
@@ -9418,7 +9418,7 @@
           </a:ln>
           <a:extLst>
             <a:ext uri="{C572A759-6A51-4108-AA02-DFA0A04FC94B}">
-              <ma14:wrappingTextBoxFlag xmlns="" xmlns:m="http://schemas.openxmlformats.org/officeDocument/2006/math" xmlns:a14="http://schemas.microsoft.com/office/drawing/2010/main" xmlns:ma14="http://schemas.microsoft.com/office/mac/drawingml/2011/main" val="1"/>
+              <ma14:wrappingTextBoxFlag xmlns:ma14="http://schemas.microsoft.com/office/mac/drawingml/2011/main" xmlns:a14="http://schemas.microsoft.com/office/drawing/2010/main" xmlns:m="http://schemas.openxmlformats.org/officeDocument/2006/math" xmlns="" val="1"/>
             </a:ext>
           </a:extLst>
         </p:spPr>
@@ -9469,7 +9469,7 @@
           </a:ln>
           <a:extLst>
             <a:ext uri="{C572A759-6A51-4108-AA02-DFA0A04FC94B}">
-              <ma14:wrappingTextBoxFlag xmlns="" xmlns:m="http://schemas.openxmlformats.org/officeDocument/2006/math" xmlns:a14="http://schemas.microsoft.com/office/drawing/2010/main" xmlns:ma14="http://schemas.microsoft.com/office/mac/drawingml/2011/main" val="1"/>
+              <ma14:wrappingTextBoxFlag xmlns:ma14="http://schemas.microsoft.com/office/mac/drawingml/2011/main" xmlns:a14="http://schemas.microsoft.com/office/drawing/2010/main" xmlns:m="http://schemas.openxmlformats.org/officeDocument/2006/math" xmlns="" val="1"/>
             </a:ext>
           </a:extLst>
         </p:spPr>
@@ -9514,7 +9514,7 @@
           </a:ln>
           <a:extLst>
             <a:ext uri="{C572A759-6A51-4108-AA02-DFA0A04FC94B}">
-              <ma14:wrappingTextBoxFlag xmlns="" xmlns:m="http://schemas.openxmlformats.org/officeDocument/2006/math" xmlns:a14="http://schemas.microsoft.com/office/drawing/2010/main" xmlns:ma14="http://schemas.microsoft.com/office/mac/drawingml/2011/main" val="1"/>
+              <ma14:wrappingTextBoxFlag xmlns:ma14="http://schemas.microsoft.com/office/mac/drawingml/2011/main" xmlns:a14="http://schemas.microsoft.com/office/drawing/2010/main" xmlns:m="http://schemas.openxmlformats.org/officeDocument/2006/math" xmlns="" val="1"/>
             </a:ext>
           </a:extLst>
         </p:spPr>
@@ -9652,7 +9652,7 @@
           </a:ln>
           <a:extLst>
             <a:ext uri="{C572A759-6A51-4108-AA02-DFA0A04FC94B}">
-              <ma14:wrappingTextBoxFlag xmlns="" xmlns:m="http://schemas.openxmlformats.org/officeDocument/2006/math" xmlns:a14="http://schemas.microsoft.com/office/drawing/2010/main" xmlns:ma14="http://schemas.microsoft.com/office/mac/drawingml/2011/main" val="1"/>
+              <ma14:wrappingTextBoxFlag xmlns:ma14="http://schemas.microsoft.com/office/mac/drawingml/2011/main" xmlns:a14="http://schemas.microsoft.com/office/drawing/2010/main" xmlns:m="http://schemas.openxmlformats.org/officeDocument/2006/math" xmlns="" val="1"/>
             </a:ext>
           </a:extLst>
         </p:spPr>
@@ -9696,7 +9696,7 @@
           </a:ln>
           <a:extLst>
             <a:ext uri="{C572A759-6A51-4108-AA02-DFA0A04FC94B}">
-              <ma14:wrappingTextBoxFlag xmlns="" xmlns:m="http://schemas.openxmlformats.org/officeDocument/2006/math" xmlns:a14="http://schemas.microsoft.com/office/drawing/2010/main" xmlns:ma14="http://schemas.microsoft.com/office/mac/drawingml/2011/main" val="1"/>
+              <ma14:wrappingTextBoxFlag xmlns:ma14="http://schemas.microsoft.com/office/mac/drawingml/2011/main" xmlns:a14="http://schemas.microsoft.com/office/drawing/2010/main" xmlns:m="http://schemas.openxmlformats.org/officeDocument/2006/math" xmlns="" val="1"/>
             </a:ext>
           </a:extLst>
         </p:spPr>
@@ -9740,7 +9740,7 @@
           </a:ln>
           <a:extLst>
             <a:ext uri="{C572A759-6A51-4108-AA02-DFA0A04FC94B}">
-              <ma14:wrappingTextBoxFlag xmlns="" xmlns:m="http://schemas.openxmlformats.org/officeDocument/2006/math" xmlns:a14="http://schemas.microsoft.com/office/drawing/2010/main" xmlns:ma14="http://schemas.microsoft.com/office/mac/drawingml/2011/main" val="1"/>
+              <ma14:wrappingTextBoxFlag xmlns:ma14="http://schemas.microsoft.com/office/mac/drawingml/2011/main" xmlns:a14="http://schemas.microsoft.com/office/drawing/2010/main" xmlns:m="http://schemas.openxmlformats.org/officeDocument/2006/math" xmlns="" val="1"/>
             </a:ext>
           </a:extLst>
         </p:spPr>
@@ -9816,7 +9816,7 @@
           </a:ln>
           <a:extLst>
             <a:ext uri="{C572A759-6A51-4108-AA02-DFA0A04FC94B}">
-              <ma14:wrappingTextBoxFlag xmlns="" xmlns:m="http://schemas.openxmlformats.org/officeDocument/2006/math" xmlns:a14="http://schemas.microsoft.com/office/drawing/2010/main" xmlns:ma14="http://schemas.microsoft.com/office/mac/drawingml/2011/main" val="1"/>
+              <ma14:wrappingTextBoxFlag xmlns:ma14="http://schemas.microsoft.com/office/mac/drawingml/2011/main" xmlns:a14="http://schemas.microsoft.com/office/drawing/2010/main" xmlns:m="http://schemas.openxmlformats.org/officeDocument/2006/math" xmlns="" val="1"/>
             </a:ext>
           </a:extLst>
         </p:spPr>
@@ -10128,7 +10128,7 @@
           </a:ln>
           <a:extLst>
             <a:ext uri="{C572A759-6A51-4108-AA02-DFA0A04FC94B}">
-              <ma14:wrappingTextBoxFlag xmlns="" xmlns:m="http://schemas.openxmlformats.org/officeDocument/2006/math" xmlns:a14="http://schemas.microsoft.com/office/drawing/2010/main" xmlns:ma14="http://schemas.microsoft.com/office/mac/drawingml/2011/main" val="1"/>
+              <ma14:wrappingTextBoxFlag xmlns:ma14="http://schemas.microsoft.com/office/mac/drawingml/2011/main" xmlns:a14="http://schemas.microsoft.com/office/drawing/2010/main" xmlns:m="http://schemas.openxmlformats.org/officeDocument/2006/math" xmlns="" val="1"/>
             </a:ext>
           </a:extLst>
         </p:spPr>
@@ -10172,7 +10172,7 @@
           </a:ln>
           <a:extLst>
             <a:ext uri="{C572A759-6A51-4108-AA02-DFA0A04FC94B}">
-              <ma14:wrappingTextBoxFlag xmlns="" xmlns:m="http://schemas.openxmlformats.org/officeDocument/2006/math" xmlns:a14="http://schemas.microsoft.com/office/drawing/2010/main" xmlns:ma14="http://schemas.microsoft.com/office/mac/drawingml/2011/main" val="1"/>
+              <ma14:wrappingTextBoxFlag xmlns:ma14="http://schemas.microsoft.com/office/mac/drawingml/2011/main" xmlns:a14="http://schemas.microsoft.com/office/drawing/2010/main" xmlns:m="http://schemas.openxmlformats.org/officeDocument/2006/math" xmlns="" val="1"/>
             </a:ext>
           </a:extLst>
         </p:spPr>
@@ -10216,7 +10216,7 @@
           </a:ln>
           <a:extLst>
             <a:ext uri="{C572A759-6A51-4108-AA02-DFA0A04FC94B}">
-              <ma14:wrappingTextBoxFlag xmlns="" xmlns:m="http://schemas.openxmlformats.org/officeDocument/2006/math" xmlns:a14="http://schemas.microsoft.com/office/drawing/2010/main" xmlns:ma14="http://schemas.microsoft.com/office/mac/drawingml/2011/main" val="1"/>
+              <ma14:wrappingTextBoxFlag xmlns:ma14="http://schemas.microsoft.com/office/mac/drawingml/2011/main" xmlns:a14="http://schemas.microsoft.com/office/drawing/2010/main" xmlns:m="http://schemas.openxmlformats.org/officeDocument/2006/math" xmlns="" val="1"/>
             </a:ext>
           </a:extLst>
         </p:spPr>
@@ -10304,7 +10304,7 @@
           </a:ln>
           <a:extLst>
             <a:ext uri="{C572A759-6A51-4108-AA02-DFA0A04FC94B}">
-              <ma14:wrappingTextBoxFlag xmlns="" xmlns:m="http://schemas.openxmlformats.org/officeDocument/2006/math" xmlns:a14="http://schemas.microsoft.com/office/drawing/2010/main" xmlns:ma14="http://schemas.microsoft.com/office/mac/drawingml/2011/main" val="1"/>
+              <ma14:wrappingTextBoxFlag xmlns:ma14="http://schemas.microsoft.com/office/mac/drawingml/2011/main" xmlns:a14="http://schemas.microsoft.com/office/drawing/2010/main" xmlns:m="http://schemas.openxmlformats.org/officeDocument/2006/math" xmlns="" val="1"/>
             </a:ext>
           </a:extLst>
         </p:spPr>
@@ -10491,7 +10491,7 @@
           </a:ln>
           <a:extLst>
             <a:ext uri="{C572A759-6A51-4108-AA02-DFA0A04FC94B}">
-              <ma14:wrappingTextBoxFlag xmlns="" xmlns:m="http://schemas.openxmlformats.org/officeDocument/2006/math" xmlns:a14="http://schemas.microsoft.com/office/drawing/2010/main" xmlns:ma14="http://schemas.microsoft.com/office/mac/drawingml/2011/main" val="1"/>
+              <ma14:wrappingTextBoxFlag xmlns:ma14="http://schemas.microsoft.com/office/mac/drawingml/2011/main" xmlns:a14="http://schemas.microsoft.com/office/drawing/2010/main" xmlns:m="http://schemas.openxmlformats.org/officeDocument/2006/math" xmlns="" val="1"/>
             </a:ext>
           </a:extLst>
         </p:spPr>
@@ -10535,7 +10535,7 @@
           </a:ln>
           <a:extLst>
             <a:ext uri="{C572A759-6A51-4108-AA02-DFA0A04FC94B}">
-              <ma14:wrappingTextBoxFlag xmlns="" xmlns:m="http://schemas.openxmlformats.org/officeDocument/2006/math" xmlns:a14="http://schemas.microsoft.com/office/drawing/2010/main" xmlns:ma14="http://schemas.microsoft.com/office/mac/drawingml/2011/main" val="1"/>
+              <ma14:wrappingTextBoxFlag xmlns:ma14="http://schemas.microsoft.com/office/mac/drawingml/2011/main" xmlns:a14="http://schemas.microsoft.com/office/drawing/2010/main" xmlns:m="http://schemas.openxmlformats.org/officeDocument/2006/math" xmlns="" val="1"/>
             </a:ext>
           </a:extLst>
         </p:spPr>
@@ -10579,7 +10579,7 @@
           </a:ln>
           <a:extLst>
             <a:ext uri="{C572A759-6A51-4108-AA02-DFA0A04FC94B}">
-              <ma14:wrappingTextBoxFlag xmlns="" xmlns:m="http://schemas.openxmlformats.org/officeDocument/2006/math" xmlns:a14="http://schemas.microsoft.com/office/drawing/2010/main" xmlns:ma14="http://schemas.microsoft.com/office/mac/drawingml/2011/main" val="1"/>
+              <ma14:wrappingTextBoxFlag xmlns:ma14="http://schemas.microsoft.com/office/mac/drawingml/2011/main" xmlns:a14="http://schemas.microsoft.com/office/drawing/2010/main" xmlns:m="http://schemas.openxmlformats.org/officeDocument/2006/math" xmlns="" val="1"/>
             </a:ext>
           </a:extLst>
         </p:spPr>
@@ -10662,7 +10662,7 @@
           </a:ln>
           <a:extLst>
             <a:ext uri="{C572A759-6A51-4108-AA02-DFA0A04FC94B}">
-              <ma14:wrappingTextBoxFlag xmlns="" xmlns:m="http://schemas.openxmlformats.org/officeDocument/2006/math" xmlns:a14="http://schemas.microsoft.com/office/drawing/2010/main" xmlns:ma14="http://schemas.microsoft.com/office/mac/drawingml/2011/main" val="1"/>
+              <ma14:wrappingTextBoxFlag xmlns:ma14="http://schemas.microsoft.com/office/mac/drawingml/2011/main" xmlns:a14="http://schemas.microsoft.com/office/drawing/2010/main" xmlns:m="http://schemas.openxmlformats.org/officeDocument/2006/math" xmlns="" val="1"/>
             </a:ext>
           </a:extLst>
         </p:spPr>
@@ -10844,7 +10844,7 @@
           </a:ln>
           <a:extLst>
             <a:ext uri="{C572A759-6A51-4108-AA02-DFA0A04FC94B}">
-              <ma14:wrappingTextBoxFlag xmlns="" xmlns:m="http://schemas.openxmlformats.org/officeDocument/2006/math" xmlns:a14="http://schemas.microsoft.com/office/drawing/2010/main" xmlns:ma14="http://schemas.microsoft.com/office/mac/drawingml/2011/main" val="1"/>
+              <ma14:wrappingTextBoxFlag xmlns:ma14="http://schemas.microsoft.com/office/mac/drawingml/2011/main" xmlns:a14="http://schemas.microsoft.com/office/drawing/2010/main" xmlns:m="http://schemas.openxmlformats.org/officeDocument/2006/math" xmlns="" val="1"/>
             </a:ext>
           </a:extLst>
         </p:spPr>
@@ -10888,7 +10888,7 @@
           </a:ln>
           <a:extLst>
             <a:ext uri="{C572A759-6A51-4108-AA02-DFA0A04FC94B}">
-              <ma14:wrappingTextBoxFlag xmlns="" xmlns:m="http://schemas.openxmlformats.org/officeDocument/2006/math" xmlns:a14="http://schemas.microsoft.com/office/drawing/2010/main" xmlns:ma14="http://schemas.microsoft.com/office/mac/drawingml/2011/main" val="1"/>
+              <ma14:wrappingTextBoxFlag xmlns:ma14="http://schemas.microsoft.com/office/mac/drawingml/2011/main" xmlns:a14="http://schemas.microsoft.com/office/drawing/2010/main" xmlns:m="http://schemas.openxmlformats.org/officeDocument/2006/math" xmlns="" val="1"/>
             </a:ext>
           </a:extLst>
         </p:spPr>
@@ -10932,7 +10932,7 @@
           </a:ln>
           <a:extLst>
             <a:ext uri="{C572A759-6A51-4108-AA02-DFA0A04FC94B}">
-              <ma14:wrappingTextBoxFlag xmlns="" xmlns:m="http://schemas.openxmlformats.org/officeDocument/2006/math" xmlns:a14="http://schemas.microsoft.com/office/drawing/2010/main" xmlns:ma14="http://schemas.microsoft.com/office/mac/drawingml/2011/main" val="1"/>
+              <ma14:wrappingTextBoxFlag xmlns:ma14="http://schemas.microsoft.com/office/mac/drawingml/2011/main" xmlns:a14="http://schemas.microsoft.com/office/drawing/2010/main" xmlns:m="http://schemas.openxmlformats.org/officeDocument/2006/math" xmlns="" val="1"/>
             </a:ext>
           </a:extLst>
         </p:spPr>
@@ -11048,7 +11048,7 @@
           </a:ln>
           <a:extLst>
             <a:ext uri="{C572A759-6A51-4108-AA02-DFA0A04FC94B}">
-              <ma14:wrappingTextBoxFlag xmlns="" xmlns:m="http://schemas.openxmlformats.org/officeDocument/2006/math" xmlns:a14="http://schemas.microsoft.com/office/drawing/2010/main" xmlns:ma14="http://schemas.microsoft.com/office/mac/drawingml/2011/main" val="1"/>
+              <ma14:wrappingTextBoxFlag xmlns:ma14="http://schemas.microsoft.com/office/mac/drawingml/2011/main" xmlns:a14="http://schemas.microsoft.com/office/drawing/2010/main" xmlns:m="http://schemas.openxmlformats.org/officeDocument/2006/math" xmlns="" val="1"/>
             </a:ext>
           </a:extLst>
         </p:spPr>
@@ -11263,7 +11263,7 @@
           </a:ln>
           <a:extLst>
             <a:ext uri="{C572A759-6A51-4108-AA02-DFA0A04FC94B}">
-              <ma14:wrappingTextBoxFlag xmlns="" xmlns:m="http://schemas.openxmlformats.org/officeDocument/2006/math" xmlns:a14="http://schemas.microsoft.com/office/drawing/2010/main" xmlns:ma14="http://schemas.microsoft.com/office/mac/drawingml/2011/main" val="1"/>
+              <ma14:wrappingTextBoxFlag xmlns:ma14="http://schemas.microsoft.com/office/mac/drawingml/2011/main" xmlns:a14="http://schemas.microsoft.com/office/drawing/2010/main" xmlns:m="http://schemas.openxmlformats.org/officeDocument/2006/math" xmlns="" val="1"/>
             </a:ext>
           </a:extLst>
         </p:spPr>
@@ -11307,7 +11307,7 @@
           </a:ln>
           <a:extLst>
             <a:ext uri="{C572A759-6A51-4108-AA02-DFA0A04FC94B}">
-              <ma14:wrappingTextBoxFlag xmlns="" xmlns:m="http://schemas.openxmlformats.org/officeDocument/2006/math" xmlns:a14="http://schemas.microsoft.com/office/drawing/2010/main" xmlns:ma14="http://schemas.microsoft.com/office/mac/drawingml/2011/main" val="1"/>
+              <ma14:wrappingTextBoxFlag xmlns:ma14="http://schemas.microsoft.com/office/mac/drawingml/2011/main" xmlns:a14="http://schemas.microsoft.com/office/drawing/2010/main" xmlns:m="http://schemas.openxmlformats.org/officeDocument/2006/math" xmlns="" val="1"/>
             </a:ext>
           </a:extLst>
         </p:spPr>
@@ -11351,7 +11351,7 @@
           </a:ln>
           <a:extLst>
             <a:ext uri="{C572A759-6A51-4108-AA02-DFA0A04FC94B}">
-              <ma14:wrappingTextBoxFlag xmlns="" xmlns:m="http://schemas.openxmlformats.org/officeDocument/2006/math" xmlns:a14="http://schemas.microsoft.com/office/drawing/2010/main" xmlns:ma14="http://schemas.microsoft.com/office/mac/drawingml/2011/main" val="1"/>
+              <ma14:wrappingTextBoxFlag xmlns:ma14="http://schemas.microsoft.com/office/mac/drawingml/2011/main" xmlns:a14="http://schemas.microsoft.com/office/drawing/2010/main" xmlns:m="http://schemas.openxmlformats.org/officeDocument/2006/math" xmlns="" val="1"/>
             </a:ext>
           </a:extLst>
         </p:spPr>
@@ -11439,7 +11439,7 @@
           </a:ln>
           <a:extLst>
             <a:ext uri="{C572A759-6A51-4108-AA02-DFA0A04FC94B}">
-              <ma14:wrappingTextBoxFlag xmlns="" xmlns:m="http://schemas.openxmlformats.org/officeDocument/2006/math" xmlns:a14="http://schemas.microsoft.com/office/drawing/2010/main" xmlns:ma14="http://schemas.microsoft.com/office/mac/drawingml/2011/main" val="1"/>
+              <ma14:wrappingTextBoxFlag xmlns:ma14="http://schemas.microsoft.com/office/mac/drawingml/2011/main" xmlns:a14="http://schemas.microsoft.com/office/drawing/2010/main" xmlns:m="http://schemas.openxmlformats.org/officeDocument/2006/math" xmlns="" val="1"/>
             </a:ext>
           </a:extLst>
         </p:spPr>
@@ -11720,7 +11720,7 @@
           </a:ln>
           <a:extLst>
             <a:ext uri="{C572A759-6A51-4108-AA02-DFA0A04FC94B}">
-              <ma14:wrappingTextBoxFlag xmlns="" xmlns:m="http://schemas.openxmlformats.org/officeDocument/2006/math" xmlns:a14="http://schemas.microsoft.com/office/drawing/2010/main" xmlns:ma14="http://schemas.microsoft.com/office/mac/drawingml/2011/main" val="1"/>
+              <ma14:wrappingTextBoxFlag xmlns:ma14="http://schemas.microsoft.com/office/mac/drawingml/2011/main" xmlns:a14="http://schemas.microsoft.com/office/drawing/2010/main" xmlns:m="http://schemas.openxmlformats.org/officeDocument/2006/math" xmlns="" val="1"/>
             </a:ext>
           </a:extLst>
         </p:spPr>
@@ -11755,7 +11755,7 @@
           </a:ln>
           <a:extLst>
             <a:ext uri="{C572A759-6A51-4108-AA02-DFA0A04FC94B}">
-              <ma14:wrappingTextBoxFlag xmlns="" xmlns:m="http://schemas.openxmlformats.org/officeDocument/2006/math" xmlns:a14="http://schemas.microsoft.com/office/drawing/2010/main" xmlns:ma14="http://schemas.microsoft.com/office/mac/drawingml/2011/main" val="1"/>
+              <ma14:wrappingTextBoxFlag xmlns:ma14="http://schemas.microsoft.com/office/mac/drawingml/2011/main" xmlns:a14="http://schemas.microsoft.com/office/drawing/2010/main" xmlns:m="http://schemas.openxmlformats.org/officeDocument/2006/math" xmlns="" val="1"/>
             </a:ext>
           </a:extLst>
         </p:spPr>
@@ -11790,7 +11790,7 @@
           </a:ln>
           <a:extLst>
             <a:ext uri="{C572A759-6A51-4108-AA02-DFA0A04FC94B}">
-              <ma14:wrappingTextBoxFlag xmlns="" xmlns:m="http://schemas.openxmlformats.org/officeDocument/2006/math" xmlns:a14="http://schemas.microsoft.com/office/drawing/2010/main" xmlns:ma14="http://schemas.microsoft.com/office/mac/drawingml/2011/main" val="1"/>
+              <ma14:wrappingTextBoxFlag xmlns:ma14="http://schemas.microsoft.com/office/mac/drawingml/2011/main" xmlns:a14="http://schemas.microsoft.com/office/drawing/2010/main" xmlns:m="http://schemas.openxmlformats.org/officeDocument/2006/math" xmlns="" val="1"/>
             </a:ext>
           </a:extLst>
         </p:spPr>
@@ -11940,7 +11940,7 @@
           </a:ln>
           <a:extLst>
             <a:ext uri="{C572A759-6A51-4108-AA02-DFA0A04FC94B}">
-              <ma14:wrappingTextBoxFlag xmlns="" xmlns:m="http://schemas.openxmlformats.org/officeDocument/2006/math" xmlns:a14="http://schemas.microsoft.com/office/drawing/2010/main" xmlns:ma14="http://schemas.microsoft.com/office/mac/drawingml/2011/main" val="1"/>
+              <ma14:wrappingTextBoxFlag xmlns:ma14="http://schemas.microsoft.com/office/mac/drawingml/2011/main" xmlns:a14="http://schemas.microsoft.com/office/drawing/2010/main" xmlns:m="http://schemas.openxmlformats.org/officeDocument/2006/math" xmlns="" val="1"/>
             </a:ext>
           </a:extLst>
         </p:spPr>
@@ -11978,7 +11978,7 @@
           </a:ln>
           <a:extLst>
             <a:ext uri="{C572A759-6A51-4108-AA02-DFA0A04FC94B}">
-              <ma14:wrappingTextBoxFlag xmlns="" xmlns:m="http://schemas.openxmlformats.org/officeDocument/2006/math" xmlns:a14="http://schemas.microsoft.com/office/drawing/2010/main" xmlns:ma14="http://schemas.microsoft.com/office/mac/drawingml/2011/main" val="1"/>
+              <ma14:wrappingTextBoxFlag xmlns:ma14="http://schemas.microsoft.com/office/mac/drawingml/2011/main" xmlns:a14="http://schemas.microsoft.com/office/drawing/2010/main" xmlns:m="http://schemas.openxmlformats.org/officeDocument/2006/math" xmlns="" val="1"/>
             </a:ext>
           </a:extLst>
         </p:spPr>
@@ -12016,7 +12016,7 @@
           </a:ln>
           <a:extLst>
             <a:ext uri="{C572A759-6A51-4108-AA02-DFA0A04FC94B}">
-              <ma14:wrappingTextBoxFlag xmlns="" xmlns:m="http://schemas.openxmlformats.org/officeDocument/2006/math" xmlns:a14="http://schemas.microsoft.com/office/drawing/2010/main" xmlns:ma14="http://schemas.microsoft.com/office/mac/drawingml/2011/main" val="1"/>
+              <ma14:wrappingTextBoxFlag xmlns:ma14="http://schemas.microsoft.com/office/mac/drawingml/2011/main" xmlns:a14="http://schemas.microsoft.com/office/drawing/2010/main" xmlns:m="http://schemas.openxmlformats.org/officeDocument/2006/math" xmlns="" val="1"/>
             </a:ext>
           </a:extLst>
         </p:spPr>
@@ -12051,7 +12051,7 @@
           </a:ln>
           <a:extLst>
             <a:ext uri="{C572A759-6A51-4108-AA02-DFA0A04FC94B}">
-              <ma14:wrappingTextBoxFlag xmlns="" xmlns:m="http://schemas.openxmlformats.org/officeDocument/2006/math" xmlns:a14="http://schemas.microsoft.com/office/drawing/2010/main" xmlns:ma14="http://schemas.microsoft.com/office/mac/drawingml/2011/main" val="1"/>
+              <ma14:wrappingTextBoxFlag xmlns:ma14="http://schemas.microsoft.com/office/mac/drawingml/2011/main" xmlns:a14="http://schemas.microsoft.com/office/drawing/2010/main" xmlns:m="http://schemas.openxmlformats.org/officeDocument/2006/math" xmlns="" val="1"/>
             </a:ext>
           </a:extLst>
         </p:spPr>
@@ -12180,7 +12180,7 @@
           </a:ln>
           <a:extLst>
             <a:ext uri="{C572A759-6A51-4108-AA02-DFA0A04FC94B}">
-              <ma14:wrappingTextBoxFlag xmlns="" xmlns:m="http://schemas.openxmlformats.org/officeDocument/2006/math" xmlns:a14="http://schemas.microsoft.com/office/drawing/2010/main" xmlns:ma14="http://schemas.microsoft.com/office/mac/drawingml/2011/main" val="1"/>
+              <ma14:wrappingTextBoxFlag xmlns:ma14="http://schemas.microsoft.com/office/mac/drawingml/2011/main" xmlns:a14="http://schemas.microsoft.com/office/drawing/2010/main" xmlns:m="http://schemas.openxmlformats.org/officeDocument/2006/math" xmlns="" val="1"/>
             </a:ext>
           </a:extLst>
         </p:spPr>
@@ -12401,7 +12401,7 @@
           </a:ln>
           <a:extLst>
             <a:ext uri="{C572A759-6A51-4108-AA02-DFA0A04FC94B}">
-              <ma14:wrappingTextBoxFlag xmlns="" xmlns:m="http://schemas.openxmlformats.org/officeDocument/2006/math" xmlns:a14="http://schemas.microsoft.com/office/drawing/2010/main" xmlns:ma14="http://schemas.microsoft.com/office/mac/drawingml/2011/main" val="1"/>
+              <ma14:wrappingTextBoxFlag xmlns:ma14="http://schemas.microsoft.com/office/mac/drawingml/2011/main" xmlns:a14="http://schemas.microsoft.com/office/drawing/2010/main" xmlns:m="http://schemas.openxmlformats.org/officeDocument/2006/math" xmlns="" val="1"/>
             </a:ext>
           </a:extLst>
         </p:spPr>
@@ -12551,7 +12551,7 @@
           </a:ln>
           <a:extLst>
             <a:ext uri="{C572A759-6A51-4108-AA02-DFA0A04FC94B}">
-              <ma14:wrappingTextBoxFlag xmlns="" xmlns:m="http://schemas.openxmlformats.org/officeDocument/2006/math" xmlns:a14="http://schemas.microsoft.com/office/drawing/2010/main" xmlns:ma14="http://schemas.microsoft.com/office/mac/drawingml/2011/main" val="1"/>
+              <ma14:wrappingTextBoxFlag xmlns:ma14="http://schemas.microsoft.com/office/mac/drawingml/2011/main" xmlns:a14="http://schemas.microsoft.com/office/drawing/2010/main" xmlns:m="http://schemas.openxmlformats.org/officeDocument/2006/math" xmlns="" val="1"/>
             </a:ext>
           </a:extLst>
         </p:spPr>
@@ -12590,7 +12590,7 @@
           </a:ln>
           <a:extLst>
             <a:ext uri="{C572A759-6A51-4108-AA02-DFA0A04FC94B}">
-              <ma14:wrappingTextBoxFlag xmlns="" xmlns:m="http://schemas.openxmlformats.org/officeDocument/2006/math" xmlns:a14="http://schemas.microsoft.com/office/drawing/2010/main" xmlns:ma14="http://schemas.microsoft.com/office/mac/drawingml/2011/main" val="1"/>
+              <ma14:wrappingTextBoxFlag xmlns:ma14="http://schemas.microsoft.com/office/mac/drawingml/2011/main" xmlns:a14="http://schemas.microsoft.com/office/drawing/2010/main" xmlns:m="http://schemas.openxmlformats.org/officeDocument/2006/math" xmlns="" val="1"/>
             </a:ext>
           </a:extLst>
         </p:spPr>
@@ -12691,7 +12691,7 @@
           </a:ln>
           <a:extLst>
             <a:ext uri="{C572A759-6A51-4108-AA02-DFA0A04FC94B}">
-              <ma14:wrappingTextBoxFlag xmlns="" xmlns:m="http://schemas.openxmlformats.org/officeDocument/2006/math" xmlns:a14="http://schemas.microsoft.com/office/drawing/2010/main" xmlns:ma14="http://schemas.microsoft.com/office/mac/drawingml/2011/main" val="1"/>
+              <ma14:wrappingTextBoxFlag xmlns:ma14="http://schemas.microsoft.com/office/mac/drawingml/2011/main" xmlns:a14="http://schemas.microsoft.com/office/drawing/2010/main" xmlns:m="http://schemas.openxmlformats.org/officeDocument/2006/math" xmlns="" val="1"/>
             </a:ext>
           </a:extLst>
         </p:spPr>
@@ -12872,7 +12872,7 @@
           </a:ln>
           <a:extLst>
             <a:ext uri="{C572A759-6A51-4108-AA02-DFA0A04FC94B}">
-              <ma14:wrappingTextBoxFlag xmlns="" xmlns:m="http://schemas.openxmlformats.org/officeDocument/2006/math" xmlns:a14="http://schemas.microsoft.com/office/drawing/2010/main" xmlns:ma14="http://schemas.microsoft.com/office/mac/drawingml/2011/main" val="1"/>
+              <ma14:wrappingTextBoxFlag xmlns:ma14="http://schemas.microsoft.com/office/mac/drawingml/2011/main" xmlns:a14="http://schemas.microsoft.com/office/drawing/2010/main" xmlns:m="http://schemas.openxmlformats.org/officeDocument/2006/math" xmlns="" val="1"/>
             </a:ext>
           </a:extLst>
         </p:spPr>
@@ -12980,7 +12980,7 @@
           </a:ln>
           <a:extLst>
             <a:ext uri="{C572A759-6A51-4108-AA02-DFA0A04FC94B}">
-              <ma14:wrappingTextBoxFlag xmlns="" xmlns:m="http://schemas.openxmlformats.org/officeDocument/2006/math" xmlns:a14="http://schemas.microsoft.com/office/drawing/2010/main" xmlns:ma14="http://schemas.microsoft.com/office/mac/drawingml/2011/main" val="1"/>
+              <ma14:wrappingTextBoxFlag xmlns:ma14="http://schemas.microsoft.com/office/mac/drawingml/2011/main" xmlns:a14="http://schemas.microsoft.com/office/drawing/2010/main" xmlns:m="http://schemas.openxmlformats.org/officeDocument/2006/math" xmlns="" val="1"/>
             </a:ext>
           </a:extLst>
         </p:spPr>
@@ -13552,7 +13552,7 @@
           </a:ln>
           <a:extLst>
             <a:ext uri="{C572A759-6A51-4108-AA02-DFA0A04FC94B}">
-              <ma14:wrappingTextBoxFlag xmlns="" xmlns:m="http://schemas.openxmlformats.org/officeDocument/2006/math" xmlns:a14="http://schemas.microsoft.com/office/drawing/2010/main" xmlns:ma14="http://schemas.microsoft.com/office/mac/drawingml/2011/main" val="1"/>
+              <ma14:wrappingTextBoxFlag xmlns:ma14="http://schemas.microsoft.com/office/mac/drawingml/2011/main" xmlns:a14="http://schemas.microsoft.com/office/drawing/2010/main" xmlns:m="http://schemas.openxmlformats.org/officeDocument/2006/math" xmlns="" val="1"/>
             </a:ext>
           </a:extLst>
         </p:spPr>
@@ -13591,7 +13591,7 @@
           </a:ln>
           <a:extLst>
             <a:ext uri="{C572A759-6A51-4108-AA02-DFA0A04FC94B}">
-              <ma14:wrappingTextBoxFlag xmlns="" xmlns:m="http://schemas.openxmlformats.org/officeDocument/2006/math" xmlns:a14="http://schemas.microsoft.com/office/drawing/2010/main" xmlns:ma14="http://schemas.microsoft.com/office/mac/drawingml/2011/main" val="1"/>
+              <ma14:wrappingTextBoxFlag xmlns:ma14="http://schemas.microsoft.com/office/mac/drawingml/2011/main" xmlns:a14="http://schemas.microsoft.com/office/drawing/2010/main" xmlns:m="http://schemas.openxmlformats.org/officeDocument/2006/math" xmlns="" val="1"/>
             </a:ext>
           </a:extLst>
         </p:spPr>
@@ -13630,7 +13630,7 @@
           </a:ln>
           <a:extLst>
             <a:ext uri="{C572A759-6A51-4108-AA02-DFA0A04FC94B}">
-              <ma14:wrappingTextBoxFlag xmlns="" xmlns:m="http://schemas.openxmlformats.org/officeDocument/2006/math" xmlns:a14="http://schemas.microsoft.com/office/drawing/2010/main" xmlns:ma14="http://schemas.microsoft.com/office/mac/drawingml/2011/main" val="1"/>
+              <ma14:wrappingTextBoxFlag xmlns:ma14="http://schemas.microsoft.com/office/mac/drawingml/2011/main" xmlns:a14="http://schemas.microsoft.com/office/drawing/2010/main" xmlns:m="http://schemas.openxmlformats.org/officeDocument/2006/math" xmlns="" val="1"/>
             </a:ext>
           </a:extLst>
         </p:spPr>
@@ -13673,7 +13673,7 @@
           </a:ln>
           <a:extLst>
             <a:ext uri="{C572A759-6A51-4108-AA02-DFA0A04FC94B}">
-              <ma14:wrappingTextBoxFlag xmlns="" xmlns:m="http://schemas.openxmlformats.org/officeDocument/2006/math" xmlns:a14="http://schemas.microsoft.com/office/drawing/2010/main" xmlns:ma14="http://schemas.microsoft.com/office/mac/drawingml/2011/main" val="1"/>
+              <ma14:wrappingTextBoxFlag xmlns:ma14="http://schemas.microsoft.com/office/mac/drawingml/2011/main" xmlns:a14="http://schemas.microsoft.com/office/drawing/2010/main" xmlns:m="http://schemas.openxmlformats.org/officeDocument/2006/math" xmlns="" val="1"/>
             </a:ext>
           </a:extLst>
         </p:spPr>
@@ -13716,7 +13716,7 @@
           </a:ln>
           <a:extLst>
             <a:ext uri="{C572A759-6A51-4108-AA02-DFA0A04FC94B}">
-              <ma14:wrappingTextBoxFlag xmlns="" xmlns:m="http://schemas.openxmlformats.org/officeDocument/2006/math" xmlns:a14="http://schemas.microsoft.com/office/drawing/2010/main" xmlns:ma14="http://schemas.microsoft.com/office/mac/drawingml/2011/main" val="1"/>
+              <ma14:wrappingTextBoxFlag xmlns:ma14="http://schemas.microsoft.com/office/mac/drawingml/2011/main" xmlns:a14="http://schemas.microsoft.com/office/drawing/2010/main" xmlns:m="http://schemas.openxmlformats.org/officeDocument/2006/math" xmlns="" val="1"/>
             </a:ext>
           </a:extLst>
         </p:spPr>
@@ -13760,7 +13760,7 @@
           </a:ln>
           <a:extLst>
             <a:ext uri="{C572A759-6A51-4108-AA02-DFA0A04FC94B}">
-              <ma14:wrappingTextBoxFlag xmlns="" xmlns:m="http://schemas.openxmlformats.org/officeDocument/2006/math" xmlns:a14="http://schemas.microsoft.com/office/drawing/2010/main" xmlns:ma14="http://schemas.microsoft.com/office/mac/drawingml/2011/main" val="1"/>
+              <ma14:wrappingTextBoxFlag xmlns:ma14="http://schemas.microsoft.com/office/mac/drawingml/2011/main" xmlns:a14="http://schemas.microsoft.com/office/drawing/2010/main" xmlns:m="http://schemas.openxmlformats.org/officeDocument/2006/math" xmlns="" val="1"/>
             </a:ext>
           </a:extLst>
         </p:spPr>
@@ -13804,7 +13804,7 @@
           </a:ln>
           <a:extLst>
             <a:ext uri="{C572A759-6A51-4108-AA02-DFA0A04FC94B}">
-              <ma14:wrappingTextBoxFlag xmlns="" xmlns:m="http://schemas.openxmlformats.org/officeDocument/2006/math" xmlns:a14="http://schemas.microsoft.com/office/drawing/2010/main" xmlns:ma14="http://schemas.microsoft.com/office/mac/drawingml/2011/main" val="1"/>
+              <ma14:wrappingTextBoxFlag xmlns:ma14="http://schemas.microsoft.com/office/mac/drawingml/2011/main" xmlns:a14="http://schemas.microsoft.com/office/drawing/2010/main" xmlns:m="http://schemas.openxmlformats.org/officeDocument/2006/math" xmlns="" val="1"/>
             </a:ext>
           </a:extLst>
         </p:spPr>
@@ -13848,7 +13848,7 @@
           </a:ln>
           <a:extLst>
             <a:ext uri="{C572A759-6A51-4108-AA02-DFA0A04FC94B}">
-              <ma14:wrappingTextBoxFlag xmlns="" xmlns:m="http://schemas.openxmlformats.org/officeDocument/2006/math" xmlns:a14="http://schemas.microsoft.com/office/drawing/2010/main" xmlns:ma14="http://schemas.microsoft.com/office/mac/drawingml/2011/main" val="1"/>
+              <ma14:wrappingTextBoxFlag xmlns:ma14="http://schemas.microsoft.com/office/mac/drawingml/2011/main" xmlns:a14="http://schemas.microsoft.com/office/drawing/2010/main" xmlns:m="http://schemas.openxmlformats.org/officeDocument/2006/math" xmlns="" val="1"/>
             </a:ext>
           </a:extLst>
         </p:spPr>
@@ -13892,7 +13892,7 @@
           </a:ln>
           <a:extLst>
             <a:ext uri="{C572A759-6A51-4108-AA02-DFA0A04FC94B}">
-              <ma14:wrappingTextBoxFlag xmlns="" xmlns:m="http://schemas.openxmlformats.org/officeDocument/2006/math" xmlns:a14="http://schemas.microsoft.com/office/drawing/2010/main" xmlns:ma14="http://schemas.microsoft.com/office/mac/drawingml/2011/main" val="1"/>
+              <ma14:wrappingTextBoxFlag xmlns:ma14="http://schemas.microsoft.com/office/mac/drawingml/2011/main" xmlns:a14="http://schemas.microsoft.com/office/drawing/2010/main" xmlns:m="http://schemas.openxmlformats.org/officeDocument/2006/math" xmlns="" val="1"/>
             </a:ext>
           </a:extLst>
         </p:spPr>
@@ -13936,7 +13936,7 @@
           </a:ln>
           <a:extLst>
             <a:ext uri="{C572A759-6A51-4108-AA02-DFA0A04FC94B}">
-              <ma14:wrappingTextBoxFlag xmlns="" xmlns:m="http://schemas.openxmlformats.org/officeDocument/2006/math" xmlns:a14="http://schemas.microsoft.com/office/drawing/2010/main" xmlns:ma14="http://schemas.microsoft.com/office/mac/drawingml/2011/main" val="1"/>
+              <ma14:wrappingTextBoxFlag xmlns:ma14="http://schemas.microsoft.com/office/mac/drawingml/2011/main" xmlns:a14="http://schemas.microsoft.com/office/drawing/2010/main" xmlns:m="http://schemas.openxmlformats.org/officeDocument/2006/math" xmlns="" val="1"/>
             </a:ext>
           </a:extLst>
         </p:spPr>
@@ -13980,7 +13980,7 @@
           </a:ln>
           <a:extLst>
             <a:ext uri="{C572A759-6A51-4108-AA02-DFA0A04FC94B}">
-              <ma14:wrappingTextBoxFlag xmlns="" xmlns:m="http://schemas.openxmlformats.org/officeDocument/2006/math" xmlns:a14="http://schemas.microsoft.com/office/drawing/2010/main" xmlns:ma14="http://schemas.microsoft.com/office/mac/drawingml/2011/main" val="1"/>
+              <ma14:wrappingTextBoxFlag xmlns:ma14="http://schemas.microsoft.com/office/mac/drawingml/2011/main" xmlns:a14="http://schemas.microsoft.com/office/drawing/2010/main" xmlns:m="http://schemas.openxmlformats.org/officeDocument/2006/math" xmlns="" val="1"/>
             </a:ext>
           </a:extLst>
         </p:spPr>
@@ -14024,7 +14024,7 @@
           </a:ln>
           <a:extLst>
             <a:ext uri="{C572A759-6A51-4108-AA02-DFA0A04FC94B}">
-              <ma14:wrappingTextBoxFlag xmlns="" xmlns:m="http://schemas.openxmlformats.org/officeDocument/2006/math" xmlns:a14="http://schemas.microsoft.com/office/drawing/2010/main" xmlns:ma14="http://schemas.microsoft.com/office/mac/drawingml/2011/main" val="1"/>
+              <ma14:wrappingTextBoxFlag xmlns:ma14="http://schemas.microsoft.com/office/mac/drawingml/2011/main" xmlns:a14="http://schemas.microsoft.com/office/drawing/2010/main" xmlns:m="http://schemas.openxmlformats.org/officeDocument/2006/math" xmlns="" val="1"/>
             </a:ext>
           </a:extLst>
         </p:spPr>
@@ -14882,7 +14882,7 @@
           </a:ln>
           <a:extLst>
             <a:ext uri="{C572A759-6A51-4108-AA02-DFA0A04FC94B}">
-              <ma14:wrappingTextBoxFlag xmlns="" xmlns:m="http://schemas.openxmlformats.org/officeDocument/2006/math" xmlns:a14="http://schemas.microsoft.com/office/drawing/2010/main" xmlns:ma14="http://schemas.microsoft.com/office/mac/drawingml/2011/main" val="1"/>
+              <ma14:wrappingTextBoxFlag xmlns:ma14="http://schemas.microsoft.com/office/mac/drawingml/2011/main" xmlns:a14="http://schemas.microsoft.com/office/drawing/2010/main" xmlns:m="http://schemas.openxmlformats.org/officeDocument/2006/math" xmlns="" val="1"/>
             </a:ext>
           </a:extLst>
         </p:spPr>
@@ -15026,7 +15026,7 @@
           </a:ln>
           <a:extLst>
             <a:ext uri="{C572A759-6A51-4108-AA02-DFA0A04FC94B}">
-              <ma14:wrappingTextBoxFlag xmlns="" xmlns:m="http://schemas.openxmlformats.org/officeDocument/2006/math" xmlns:a14="http://schemas.microsoft.com/office/drawing/2010/main" xmlns:ma14="http://schemas.microsoft.com/office/mac/drawingml/2011/main" val="1"/>
+              <ma14:wrappingTextBoxFlag xmlns:ma14="http://schemas.microsoft.com/office/mac/drawingml/2011/main" xmlns:a14="http://schemas.microsoft.com/office/drawing/2010/main" xmlns:m="http://schemas.openxmlformats.org/officeDocument/2006/math" xmlns="" val="1"/>
             </a:ext>
           </a:extLst>
         </p:spPr>
@@ -15079,7 +15079,7 @@
           </a:ln>
           <a:extLst>
             <a:ext uri="{C572A759-6A51-4108-AA02-DFA0A04FC94B}">
-              <ma14:wrappingTextBoxFlag xmlns="" xmlns:m="http://schemas.openxmlformats.org/officeDocument/2006/math" xmlns:a14="http://schemas.microsoft.com/office/drawing/2010/main" xmlns:ma14="http://schemas.microsoft.com/office/mac/drawingml/2011/main" val="1"/>
+              <ma14:wrappingTextBoxFlag xmlns:ma14="http://schemas.microsoft.com/office/mac/drawingml/2011/main" xmlns:a14="http://schemas.microsoft.com/office/drawing/2010/main" xmlns:m="http://schemas.openxmlformats.org/officeDocument/2006/math" xmlns="" val="1"/>
             </a:ext>
           </a:extLst>
         </p:spPr>
@@ -15129,7 +15129,7 @@
           </a:ln>
           <a:extLst>
             <a:ext uri="{C572A759-6A51-4108-AA02-DFA0A04FC94B}">
-              <ma14:wrappingTextBoxFlag xmlns="" xmlns:m="http://schemas.openxmlformats.org/officeDocument/2006/math" xmlns:a14="http://schemas.microsoft.com/office/drawing/2010/main" xmlns:ma14="http://schemas.microsoft.com/office/mac/drawingml/2011/main" val="1"/>
+              <ma14:wrappingTextBoxFlag xmlns:ma14="http://schemas.microsoft.com/office/mac/drawingml/2011/main" xmlns:a14="http://schemas.microsoft.com/office/drawing/2010/main" xmlns:m="http://schemas.openxmlformats.org/officeDocument/2006/math" xmlns="" val="1"/>
             </a:ext>
           </a:extLst>
         </p:spPr>
@@ -15179,7 +15179,7 @@
           </a:ln>
           <a:extLst>
             <a:ext uri="{C572A759-6A51-4108-AA02-DFA0A04FC94B}">
-              <ma14:wrappingTextBoxFlag xmlns="" xmlns:m="http://schemas.openxmlformats.org/officeDocument/2006/math" xmlns:a14="http://schemas.microsoft.com/office/drawing/2010/main" xmlns:ma14="http://schemas.microsoft.com/office/mac/drawingml/2011/main" val="1"/>
+              <ma14:wrappingTextBoxFlag xmlns:ma14="http://schemas.microsoft.com/office/mac/drawingml/2011/main" xmlns:a14="http://schemas.microsoft.com/office/drawing/2010/main" xmlns:m="http://schemas.openxmlformats.org/officeDocument/2006/math" xmlns="" val="1"/>
             </a:ext>
           </a:extLst>
         </p:spPr>
@@ -15229,7 +15229,7 @@
           </a:ln>
           <a:extLst>
             <a:ext uri="{C572A759-6A51-4108-AA02-DFA0A04FC94B}">
-              <ma14:wrappingTextBoxFlag xmlns="" xmlns:m="http://schemas.openxmlformats.org/officeDocument/2006/math" xmlns:a14="http://schemas.microsoft.com/office/drawing/2010/main" xmlns:ma14="http://schemas.microsoft.com/office/mac/drawingml/2011/main" val="1"/>
+              <ma14:wrappingTextBoxFlag xmlns:ma14="http://schemas.microsoft.com/office/mac/drawingml/2011/main" xmlns:a14="http://schemas.microsoft.com/office/drawing/2010/main" xmlns:m="http://schemas.openxmlformats.org/officeDocument/2006/math" xmlns="" val="1"/>
             </a:ext>
           </a:extLst>
         </p:spPr>
@@ -15279,7 +15279,7 @@
           </a:ln>
           <a:extLst>
             <a:ext uri="{C572A759-6A51-4108-AA02-DFA0A04FC94B}">
-              <ma14:wrappingTextBoxFlag xmlns="" xmlns:m="http://schemas.openxmlformats.org/officeDocument/2006/math" xmlns:a14="http://schemas.microsoft.com/office/drawing/2010/main" xmlns:ma14="http://schemas.microsoft.com/office/mac/drawingml/2011/main" val="1"/>
+              <ma14:wrappingTextBoxFlag xmlns:ma14="http://schemas.microsoft.com/office/mac/drawingml/2011/main" xmlns:a14="http://schemas.microsoft.com/office/drawing/2010/main" xmlns:m="http://schemas.openxmlformats.org/officeDocument/2006/math" xmlns="" val="1"/>
             </a:ext>
           </a:extLst>
         </p:spPr>
@@ -15332,7 +15332,7 @@
           </a:ln>
           <a:extLst>
             <a:ext uri="{C572A759-6A51-4108-AA02-DFA0A04FC94B}">
-              <ma14:wrappingTextBoxFlag xmlns="" xmlns:m="http://schemas.openxmlformats.org/officeDocument/2006/math" xmlns:a14="http://schemas.microsoft.com/office/drawing/2010/main" xmlns:ma14="http://schemas.microsoft.com/office/mac/drawingml/2011/main" val="1"/>
+              <ma14:wrappingTextBoxFlag xmlns:ma14="http://schemas.microsoft.com/office/mac/drawingml/2011/main" xmlns:a14="http://schemas.microsoft.com/office/drawing/2010/main" xmlns:m="http://schemas.openxmlformats.org/officeDocument/2006/math" xmlns="" val="1"/>
             </a:ext>
           </a:extLst>
         </p:spPr>
@@ -15374,7 +15374,7 @@
           </a:ln>
           <a:extLst>
             <a:ext uri="{C572A759-6A51-4108-AA02-DFA0A04FC94B}">
-              <ma14:wrappingTextBoxFlag xmlns="" xmlns:m="http://schemas.openxmlformats.org/officeDocument/2006/math" xmlns:a14="http://schemas.microsoft.com/office/drawing/2010/main" xmlns:ma14="http://schemas.microsoft.com/office/mac/drawingml/2011/main" val="1"/>
+              <ma14:wrappingTextBoxFlag xmlns:ma14="http://schemas.microsoft.com/office/mac/drawingml/2011/main" xmlns:a14="http://schemas.microsoft.com/office/drawing/2010/main" xmlns:m="http://schemas.openxmlformats.org/officeDocument/2006/math" xmlns="" val="1"/>
             </a:ext>
           </a:extLst>
         </p:spPr>
@@ -15421,7 +15421,7 @@
           </a:ln>
           <a:extLst>
             <a:ext uri="{C572A759-6A51-4108-AA02-DFA0A04FC94B}">
-              <ma14:wrappingTextBoxFlag xmlns="" xmlns:m="http://schemas.openxmlformats.org/officeDocument/2006/math" xmlns:a14="http://schemas.microsoft.com/office/drawing/2010/main" xmlns:ma14="http://schemas.microsoft.com/office/mac/drawingml/2011/main" val="1"/>
+              <ma14:wrappingTextBoxFlag xmlns:ma14="http://schemas.microsoft.com/office/mac/drawingml/2011/main" xmlns:a14="http://schemas.microsoft.com/office/drawing/2010/main" xmlns:m="http://schemas.openxmlformats.org/officeDocument/2006/math" xmlns="" val="1"/>
             </a:ext>
           </a:extLst>
         </p:spPr>
@@ -15468,7 +15468,7 @@
           </a:ln>
           <a:extLst>
             <a:ext uri="{C572A759-6A51-4108-AA02-DFA0A04FC94B}">
-              <ma14:wrappingTextBoxFlag xmlns="" xmlns:m="http://schemas.openxmlformats.org/officeDocument/2006/math" xmlns:a14="http://schemas.microsoft.com/office/drawing/2010/main" xmlns:ma14="http://schemas.microsoft.com/office/mac/drawingml/2011/main" val="1"/>
+              <ma14:wrappingTextBoxFlag xmlns:ma14="http://schemas.microsoft.com/office/mac/drawingml/2011/main" xmlns:a14="http://schemas.microsoft.com/office/drawing/2010/main" xmlns:m="http://schemas.openxmlformats.org/officeDocument/2006/math" xmlns="" val="1"/>
             </a:ext>
           </a:extLst>
         </p:spPr>
@@ -15515,7 +15515,7 @@
           </a:ln>
           <a:extLst>
             <a:ext uri="{C572A759-6A51-4108-AA02-DFA0A04FC94B}">
-              <ma14:wrappingTextBoxFlag xmlns="" xmlns:m="http://schemas.openxmlformats.org/officeDocument/2006/math" xmlns:a14="http://schemas.microsoft.com/office/drawing/2010/main" xmlns:ma14="http://schemas.microsoft.com/office/mac/drawingml/2011/main" val="1"/>
+              <ma14:wrappingTextBoxFlag xmlns:ma14="http://schemas.microsoft.com/office/mac/drawingml/2011/main" xmlns:a14="http://schemas.microsoft.com/office/drawing/2010/main" xmlns:m="http://schemas.openxmlformats.org/officeDocument/2006/math" xmlns="" val="1"/>
             </a:ext>
           </a:extLst>
         </p:spPr>
@@ -15573,7 +15573,7 @@
           </a:ln>
           <a:extLst>
             <a:ext uri="{C572A759-6A51-4108-AA02-DFA0A04FC94B}">
-              <ma14:wrappingTextBoxFlag xmlns="" xmlns:m="http://schemas.openxmlformats.org/officeDocument/2006/math" xmlns:a14="http://schemas.microsoft.com/office/drawing/2010/main" xmlns:ma14="http://schemas.microsoft.com/office/mac/drawingml/2011/main" val="1"/>
+              <ma14:wrappingTextBoxFlag xmlns:ma14="http://schemas.microsoft.com/office/mac/drawingml/2011/main" xmlns:a14="http://schemas.microsoft.com/office/drawing/2010/main" xmlns:m="http://schemas.openxmlformats.org/officeDocument/2006/math" xmlns="" val="1"/>
             </a:ext>
           </a:extLst>
         </p:spPr>
@@ -15626,7 +15626,7 @@
           </a:ln>
           <a:extLst>
             <a:ext uri="{C572A759-6A51-4108-AA02-DFA0A04FC94B}">
-              <ma14:wrappingTextBoxFlag xmlns="" xmlns:m="http://schemas.openxmlformats.org/officeDocument/2006/math" xmlns:a14="http://schemas.microsoft.com/office/drawing/2010/main" xmlns:ma14="http://schemas.microsoft.com/office/mac/drawingml/2011/main" val="1"/>
+              <ma14:wrappingTextBoxFlag xmlns:ma14="http://schemas.microsoft.com/office/mac/drawingml/2011/main" xmlns:a14="http://schemas.microsoft.com/office/drawing/2010/main" xmlns:m="http://schemas.openxmlformats.org/officeDocument/2006/math" xmlns="" val="1"/>
             </a:ext>
           </a:extLst>
         </p:spPr>
@@ -15679,7 +15679,7 @@
           </a:ln>
           <a:extLst>
             <a:ext uri="{C572A759-6A51-4108-AA02-DFA0A04FC94B}">
-              <ma14:wrappingTextBoxFlag xmlns="" xmlns:m="http://schemas.openxmlformats.org/officeDocument/2006/math" xmlns:a14="http://schemas.microsoft.com/office/drawing/2010/main" xmlns:ma14="http://schemas.microsoft.com/office/mac/drawingml/2011/main" val="1"/>
+              <ma14:wrappingTextBoxFlag xmlns:ma14="http://schemas.microsoft.com/office/mac/drawingml/2011/main" xmlns:a14="http://schemas.microsoft.com/office/drawing/2010/main" xmlns:m="http://schemas.openxmlformats.org/officeDocument/2006/math" xmlns="" val="1"/>
             </a:ext>
           </a:extLst>
         </p:spPr>
@@ -15732,7 +15732,7 @@
           </a:ln>
           <a:extLst>
             <a:ext uri="{C572A759-6A51-4108-AA02-DFA0A04FC94B}">
-              <ma14:wrappingTextBoxFlag xmlns="" xmlns:m="http://schemas.openxmlformats.org/officeDocument/2006/math" xmlns:a14="http://schemas.microsoft.com/office/drawing/2010/main" xmlns:ma14="http://schemas.microsoft.com/office/mac/drawingml/2011/main" val="1"/>
+              <ma14:wrappingTextBoxFlag xmlns:ma14="http://schemas.microsoft.com/office/mac/drawingml/2011/main" xmlns:a14="http://schemas.microsoft.com/office/drawing/2010/main" xmlns:m="http://schemas.openxmlformats.org/officeDocument/2006/math" xmlns="" val="1"/>
             </a:ext>
           </a:extLst>
         </p:spPr>
@@ -15782,7 +15782,7 @@
           </a:ln>
           <a:extLst>
             <a:ext uri="{C572A759-6A51-4108-AA02-DFA0A04FC94B}">
-              <ma14:wrappingTextBoxFlag xmlns="" xmlns:m="http://schemas.openxmlformats.org/officeDocument/2006/math" xmlns:a14="http://schemas.microsoft.com/office/drawing/2010/main" xmlns:ma14="http://schemas.microsoft.com/office/mac/drawingml/2011/main" val="1"/>
+              <ma14:wrappingTextBoxFlag xmlns:ma14="http://schemas.microsoft.com/office/mac/drawingml/2011/main" xmlns:a14="http://schemas.microsoft.com/office/drawing/2010/main" xmlns:m="http://schemas.openxmlformats.org/officeDocument/2006/math" xmlns="" val="1"/>
             </a:ext>
           </a:extLst>
         </p:spPr>
@@ -15824,7 +15824,7 @@
           </a:ln>
           <a:extLst>
             <a:ext uri="{C572A759-6A51-4108-AA02-DFA0A04FC94B}">
-              <ma14:wrappingTextBoxFlag xmlns="" xmlns:m="http://schemas.openxmlformats.org/officeDocument/2006/math" xmlns:a14="http://schemas.microsoft.com/office/drawing/2010/main" xmlns:ma14="http://schemas.microsoft.com/office/mac/drawingml/2011/main" val="1"/>
+              <ma14:wrappingTextBoxFlag xmlns:ma14="http://schemas.microsoft.com/office/mac/drawingml/2011/main" xmlns:a14="http://schemas.microsoft.com/office/drawing/2010/main" xmlns:m="http://schemas.openxmlformats.org/officeDocument/2006/math" xmlns="" val="1"/>
             </a:ext>
           </a:extLst>
         </p:spPr>
@@ -15871,7 +15871,7 @@
           </a:ln>
           <a:extLst>
             <a:ext uri="{C572A759-6A51-4108-AA02-DFA0A04FC94B}">
-              <ma14:wrappingTextBoxFlag xmlns="" xmlns:m="http://schemas.openxmlformats.org/officeDocument/2006/math" xmlns:a14="http://schemas.microsoft.com/office/drawing/2010/main" xmlns:ma14="http://schemas.microsoft.com/office/mac/drawingml/2011/main" val="1"/>
+              <ma14:wrappingTextBoxFlag xmlns:ma14="http://schemas.microsoft.com/office/mac/drawingml/2011/main" xmlns:a14="http://schemas.microsoft.com/office/drawing/2010/main" xmlns:m="http://schemas.openxmlformats.org/officeDocument/2006/math" xmlns="" val="1"/>
             </a:ext>
           </a:extLst>
         </p:spPr>
@@ -15918,7 +15918,7 @@
           </a:ln>
           <a:extLst>
             <a:ext uri="{C572A759-6A51-4108-AA02-DFA0A04FC94B}">
-              <ma14:wrappingTextBoxFlag xmlns="" xmlns:m="http://schemas.openxmlformats.org/officeDocument/2006/math" xmlns:a14="http://schemas.microsoft.com/office/drawing/2010/main" xmlns:ma14="http://schemas.microsoft.com/office/mac/drawingml/2011/main" val="1"/>
+              <ma14:wrappingTextBoxFlag xmlns:ma14="http://schemas.microsoft.com/office/mac/drawingml/2011/main" xmlns:a14="http://schemas.microsoft.com/office/drawing/2010/main" xmlns:m="http://schemas.openxmlformats.org/officeDocument/2006/math" xmlns="" val="1"/>
             </a:ext>
           </a:extLst>
         </p:spPr>
@@ -15965,7 +15965,7 @@
           </a:ln>
           <a:extLst>
             <a:ext uri="{C572A759-6A51-4108-AA02-DFA0A04FC94B}">
-              <ma14:wrappingTextBoxFlag xmlns="" xmlns:m="http://schemas.openxmlformats.org/officeDocument/2006/math" xmlns:a14="http://schemas.microsoft.com/office/drawing/2010/main" xmlns:ma14="http://schemas.microsoft.com/office/mac/drawingml/2011/main" val="1"/>
+              <ma14:wrappingTextBoxFlag xmlns:ma14="http://schemas.microsoft.com/office/mac/drawingml/2011/main" xmlns:a14="http://schemas.microsoft.com/office/drawing/2010/main" xmlns:m="http://schemas.openxmlformats.org/officeDocument/2006/math" xmlns="" val="1"/>
             </a:ext>
           </a:extLst>
         </p:spPr>
@@ -16012,7 +16012,7 @@
           </a:ln>
           <a:extLst>
             <a:ext uri="{C572A759-6A51-4108-AA02-DFA0A04FC94B}">
-              <ma14:wrappingTextBoxFlag xmlns="" xmlns:m="http://schemas.openxmlformats.org/officeDocument/2006/math" xmlns:a14="http://schemas.microsoft.com/office/drawing/2010/main" xmlns:ma14="http://schemas.microsoft.com/office/mac/drawingml/2011/main" val="1"/>
+              <ma14:wrappingTextBoxFlag xmlns:ma14="http://schemas.microsoft.com/office/mac/drawingml/2011/main" xmlns:a14="http://schemas.microsoft.com/office/drawing/2010/main" xmlns:m="http://schemas.openxmlformats.org/officeDocument/2006/math" xmlns="" val="1"/>
             </a:ext>
           </a:extLst>
         </p:spPr>
@@ -16059,7 +16059,7 @@
           </a:ln>
           <a:extLst>
             <a:ext uri="{C572A759-6A51-4108-AA02-DFA0A04FC94B}">
-              <ma14:wrappingTextBoxFlag xmlns="" xmlns:m="http://schemas.openxmlformats.org/officeDocument/2006/math" xmlns:a14="http://schemas.microsoft.com/office/drawing/2010/main" xmlns:ma14="http://schemas.microsoft.com/office/mac/drawingml/2011/main" val="1"/>
+              <ma14:wrappingTextBoxFlag xmlns:ma14="http://schemas.microsoft.com/office/mac/drawingml/2011/main" xmlns:a14="http://schemas.microsoft.com/office/drawing/2010/main" xmlns:m="http://schemas.openxmlformats.org/officeDocument/2006/math" xmlns="" val="1"/>
             </a:ext>
           </a:extLst>
         </p:spPr>
@@ -16106,7 +16106,7 @@
           </a:ln>
           <a:extLst>
             <a:ext uri="{C572A759-6A51-4108-AA02-DFA0A04FC94B}">
-              <ma14:wrappingTextBoxFlag xmlns="" xmlns:m="http://schemas.openxmlformats.org/officeDocument/2006/math" xmlns:a14="http://schemas.microsoft.com/office/drawing/2010/main" xmlns:ma14="http://schemas.microsoft.com/office/mac/drawingml/2011/main" val="1"/>
+              <ma14:wrappingTextBoxFlag xmlns:ma14="http://schemas.microsoft.com/office/mac/drawingml/2011/main" xmlns:a14="http://schemas.microsoft.com/office/drawing/2010/main" xmlns:m="http://schemas.openxmlformats.org/officeDocument/2006/math" xmlns="" val="1"/>
             </a:ext>
           </a:extLst>
         </p:spPr>
@@ -16153,7 +16153,7 @@
           </a:ln>
           <a:extLst>
             <a:ext uri="{C572A759-6A51-4108-AA02-DFA0A04FC94B}">
-              <ma14:wrappingTextBoxFlag xmlns="" xmlns:m="http://schemas.openxmlformats.org/officeDocument/2006/math" xmlns:a14="http://schemas.microsoft.com/office/drawing/2010/main" xmlns:ma14="http://schemas.microsoft.com/office/mac/drawingml/2011/main" val="1"/>
+              <ma14:wrappingTextBoxFlag xmlns:ma14="http://schemas.microsoft.com/office/mac/drawingml/2011/main" xmlns:a14="http://schemas.microsoft.com/office/drawing/2010/main" xmlns:m="http://schemas.openxmlformats.org/officeDocument/2006/math" xmlns="" val="1"/>
             </a:ext>
           </a:extLst>
         </p:spPr>
@@ -16200,7 +16200,7 @@
           </a:ln>
           <a:extLst>
             <a:ext uri="{C572A759-6A51-4108-AA02-DFA0A04FC94B}">
-              <ma14:wrappingTextBoxFlag xmlns="" xmlns:m="http://schemas.openxmlformats.org/officeDocument/2006/math" xmlns:a14="http://schemas.microsoft.com/office/drawing/2010/main" xmlns:ma14="http://schemas.microsoft.com/office/mac/drawingml/2011/main" val="1"/>
+              <ma14:wrappingTextBoxFlag xmlns:ma14="http://schemas.microsoft.com/office/mac/drawingml/2011/main" xmlns:a14="http://schemas.microsoft.com/office/drawing/2010/main" xmlns:m="http://schemas.openxmlformats.org/officeDocument/2006/math" xmlns="" val="1"/>
             </a:ext>
           </a:extLst>
         </p:spPr>
@@ -16239,7 +16239,7 @@
           </a:ln>
           <a:extLst>
             <a:ext uri="{C572A759-6A51-4108-AA02-DFA0A04FC94B}">
-              <ma14:wrappingTextBoxFlag xmlns="" xmlns:m="http://schemas.openxmlformats.org/officeDocument/2006/math" xmlns:a14="http://schemas.microsoft.com/office/drawing/2010/main" xmlns:ma14="http://schemas.microsoft.com/office/mac/drawingml/2011/main" val="1"/>
+              <ma14:wrappingTextBoxFlag xmlns:ma14="http://schemas.microsoft.com/office/mac/drawingml/2011/main" xmlns:a14="http://schemas.microsoft.com/office/drawing/2010/main" xmlns:m="http://schemas.openxmlformats.org/officeDocument/2006/math" xmlns="" val="1"/>
             </a:ext>
           </a:extLst>
         </p:spPr>
@@ -16334,7 +16334,7 @@
           </a:ln>
           <a:extLst>
             <a:ext uri="{C572A759-6A51-4108-AA02-DFA0A04FC94B}">
-              <ma14:wrappingTextBoxFlag xmlns="" xmlns:m="http://schemas.openxmlformats.org/officeDocument/2006/math" xmlns:a14="http://schemas.microsoft.com/office/drawing/2010/main" xmlns:ma14="http://schemas.microsoft.com/office/mac/drawingml/2011/main" val="1"/>
+              <ma14:wrappingTextBoxFlag xmlns:ma14="http://schemas.microsoft.com/office/mac/drawingml/2011/main" xmlns:a14="http://schemas.microsoft.com/office/drawing/2010/main" xmlns:m="http://schemas.openxmlformats.org/officeDocument/2006/math" xmlns="" val="1"/>
             </a:ext>
           </a:extLst>
         </p:spPr>
@@ -17122,7 +17122,7 @@
           </a:ln>
           <a:extLst>
             <a:ext uri="{C572A759-6A51-4108-AA02-DFA0A04FC94B}">
-              <ma14:wrappingTextBoxFlag xmlns="" xmlns:m="http://schemas.openxmlformats.org/officeDocument/2006/math" xmlns:a14="http://schemas.microsoft.com/office/drawing/2010/main" xmlns:ma14="http://schemas.microsoft.com/office/mac/drawingml/2011/main" val="1"/>
+              <ma14:wrappingTextBoxFlag xmlns:ma14="http://schemas.microsoft.com/office/mac/drawingml/2011/main" xmlns:a14="http://schemas.microsoft.com/office/drawing/2010/main" xmlns:m="http://schemas.openxmlformats.org/officeDocument/2006/math" xmlns="" val="1"/>
             </a:ext>
           </a:extLst>
         </p:spPr>
@@ -17172,7 +17172,7 @@
           </a:ln>
           <a:extLst>
             <a:ext uri="{C572A759-6A51-4108-AA02-DFA0A04FC94B}">
-              <ma14:wrappingTextBoxFlag xmlns="" xmlns:m="http://schemas.openxmlformats.org/officeDocument/2006/math" xmlns:a14="http://schemas.microsoft.com/office/drawing/2010/main" xmlns:ma14="http://schemas.microsoft.com/office/mac/drawingml/2011/main" val="1"/>
+              <ma14:wrappingTextBoxFlag xmlns:ma14="http://schemas.microsoft.com/office/mac/drawingml/2011/main" xmlns:a14="http://schemas.microsoft.com/office/drawing/2010/main" xmlns:m="http://schemas.openxmlformats.org/officeDocument/2006/math" xmlns="" val="1"/>
             </a:ext>
           </a:extLst>
         </p:spPr>
@@ -17563,7 +17563,7 @@
           </a:ln>
           <a:extLst>
             <a:ext uri="{C572A759-6A51-4108-AA02-DFA0A04FC94B}">
-              <ma14:wrappingTextBoxFlag xmlns="" xmlns:m="http://schemas.openxmlformats.org/officeDocument/2006/math" xmlns:a14="http://schemas.microsoft.com/office/drawing/2010/main" xmlns:ma14="http://schemas.microsoft.com/office/mac/drawingml/2011/main" val="1"/>
+              <ma14:wrappingTextBoxFlag xmlns:ma14="http://schemas.microsoft.com/office/mac/drawingml/2011/main" xmlns:a14="http://schemas.microsoft.com/office/drawing/2010/main" xmlns:m="http://schemas.openxmlformats.org/officeDocument/2006/math" xmlns="" val="1"/>
             </a:ext>
           </a:extLst>
         </p:spPr>
@@ -18121,7 +18121,7 @@
           </a:ln>
           <a:extLst>
             <a:ext uri="{C572A759-6A51-4108-AA02-DFA0A04FC94B}">
-              <ma14:wrappingTextBoxFlag xmlns="" xmlns:m="http://schemas.openxmlformats.org/officeDocument/2006/math" xmlns:a14="http://schemas.microsoft.com/office/drawing/2010/main" xmlns:ma14="http://schemas.microsoft.com/office/mac/drawingml/2011/main" val="1"/>
+              <ma14:wrappingTextBoxFlag xmlns:ma14="http://schemas.microsoft.com/office/mac/drawingml/2011/main" xmlns:a14="http://schemas.microsoft.com/office/drawing/2010/main" xmlns:m="http://schemas.openxmlformats.org/officeDocument/2006/math" xmlns="" val="1"/>
             </a:ext>
           </a:extLst>
         </p:spPr>
@@ -18216,7 +18216,7 @@
           </a:ln>
           <a:extLst>
             <a:ext uri="{C572A759-6A51-4108-AA02-DFA0A04FC94B}">
-              <ma14:wrappingTextBoxFlag xmlns="" xmlns:m="http://schemas.openxmlformats.org/officeDocument/2006/math" xmlns:a14="http://schemas.microsoft.com/office/drawing/2010/main" xmlns:ma14="http://schemas.microsoft.com/office/mac/drawingml/2011/main" val="1"/>
+              <ma14:wrappingTextBoxFlag xmlns:ma14="http://schemas.microsoft.com/office/mac/drawingml/2011/main" xmlns:a14="http://schemas.microsoft.com/office/drawing/2010/main" xmlns:m="http://schemas.openxmlformats.org/officeDocument/2006/math" xmlns="" val="1"/>
             </a:ext>
           </a:extLst>
         </p:spPr>
@@ -18310,7 +18310,7 @@
           </a:ln>
           <a:extLst>
             <a:ext uri="{C572A759-6A51-4108-AA02-DFA0A04FC94B}">
-              <ma14:wrappingTextBoxFlag xmlns="" xmlns:m="http://schemas.openxmlformats.org/officeDocument/2006/math" xmlns:a14="http://schemas.microsoft.com/office/drawing/2010/main" xmlns:ma14="http://schemas.microsoft.com/office/mac/drawingml/2011/main" val="1"/>
+              <ma14:wrappingTextBoxFlag xmlns:ma14="http://schemas.microsoft.com/office/mac/drawingml/2011/main" xmlns:a14="http://schemas.microsoft.com/office/drawing/2010/main" xmlns:m="http://schemas.openxmlformats.org/officeDocument/2006/math" xmlns="" val="1"/>
             </a:ext>
           </a:extLst>
         </p:spPr>
@@ -18361,7 +18361,7 @@
           </a:ln>
           <a:extLst>
             <a:ext uri="{C572A759-6A51-4108-AA02-DFA0A04FC94B}">
-              <ma14:wrappingTextBoxFlag xmlns="" xmlns:m="http://schemas.openxmlformats.org/officeDocument/2006/math" xmlns:a14="http://schemas.microsoft.com/office/drawing/2010/main" xmlns:ma14="http://schemas.microsoft.com/office/mac/drawingml/2011/main" val="1"/>
+              <ma14:wrappingTextBoxFlag xmlns:ma14="http://schemas.microsoft.com/office/mac/drawingml/2011/main" xmlns:a14="http://schemas.microsoft.com/office/drawing/2010/main" xmlns:m="http://schemas.openxmlformats.org/officeDocument/2006/math" xmlns="" val="1"/>
             </a:ext>
           </a:extLst>
         </p:spPr>
@@ -18467,7 +18467,7 @@
           </a:ln>
           <a:extLst>
             <a:ext uri="{C572A759-6A51-4108-AA02-DFA0A04FC94B}">
-              <ma14:wrappingTextBoxFlag xmlns="" xmlns:m="http://schemas.openxmlformats.org/officeDocument/2006/math" xmlns:a14="http://schemas.microsoft.com/office/drawing/2010/main" xmlns:ma14="http://schemas.microsoft.com/office/mac/drawingml/2011/main" val="1"/>
+              <ma14:wrappingTextBoxFlag xmlns:ma14="http://schemas.microsoft.com/office/mac/drawingml/2011/main" xmlns:a14="http://schemas.microsoft.com/office/drawing/2010/main" xmlns:m="http://schemas.openxmlformats.org/officeDocument/2006/math" xmlns="" val="1"/>
             </a:ext>
           </a:extLst>
         </p:spPr>
@@ -18605,7 +18605,7 @@
           </a:ln>
           <a:extLst>
             <a:ext uri="{C572A759-6A51-4108-AA02-DFA0A04FC94B}">
-              <ma14:wrappingTextBoxFlag xmlns="" xmlns:m="http://schemas.openxmlformats.org/officeDocument/2006/math" xmlns:a14="http://schemas.microsoft.com/office/drawing/2010/main" xmlns:ma14="http://schemas.microsoft.com/office/mac/drawingml/2011/main" val="1"/>
+              <ma14:wrappingTextBoxFlag xmlns:ma14="http://schemas.microsoft.com/office/mac/drawingml/2011/main" xmlns:a14="http://schemas.microsoft.com/office/drawing/2010/main" xmlns:m="http://schemas.openxmlformats.org/officeDocument/2006/math" xmlns="" val="1"/>
             </a:ext>
           </a:extLst>
         </p:spPr>
@@ -18656,7 +18656,7 @@
           </a:ln>
           <a:extLst>
             <a:ext uri="{C572A759-6A51-4108-AA02-DFA0A04FC94B}">
-              <ma14:wrappingTextBoxFlag xmlns="" xmlns:m="http://schemas.openxmlformats.org/officeDocument/2006/math" xmlns:a14="http://schemas.microsoft.com/office/drawing/2010/main" xmlns:ma14="http://schemas.microsoft.com/office/mac/drawingml/2011/main" val="1"/>
+              <ma14:wrappingTextBoxFlag xmlns:ma14="http://schemas.microsoft.com/office/mac/drawingml/2011/main" xmlns:a14="http://schemas.microsoft.com/office/drawing/2010/main" xmlns:m="http://schemas.openxmlformats.org/officeDocument/2006/math" xmlns="" val="1"/>
             </a:ext>
           </a:extLst>
         </p:spPr>
@@ -18707,7 +18707,7 @@
           </a:ln>
           <a:extLst>
             <a:ext uri="{C572A759-6A51-4108-AA02-DFA0A04FC94B}">
-              <ma14:wrappingTextBoxFlag xmlns="" xmlns:m="http://schemas.openxmlformats.org/officeDocument/2006/math" xmlns:a14="http://schemas.microsoft.com/office/drawing/2010/main" xmlns:ma14="http://schemas.microsoft.com/office/mac/drawingml/2011/main" val="1"/>
+              <ma14:wrappingTextBoxFlag xmlns:ma14="http://schemas.microsoft.com/office/mac/drawingml/2011/main" xmlns:a14="http://schemas.microsoft.com/office/drawing/2010/main" xmlns:m="http://schemas.openxmlformats.org/officeDocument/2006/math" xmlns="" val="1"/>
             </a:ext>
           </a:extLst>
         </p:spPr>
@@ -18781,7 +18781,7 @@
           </a:ln>
           <a:extLst>
             <a:ext uri="{C572A759-6A51-4108-AA02-DFA0A04FC94B}">
-              <ma14:wrappingTextBoxFlag xmlns="" xmlns:m="http://schemas.openxmlformats.org/officeDocument/2006/math" xmlns:a14="http://schemas.microsoft.com/office/drawing/2010/main" xmlns:ma14="http://schemas.microsoft.com/office/mac/drawingml/2011/main" val="1"/>
+              <ma14:wrappingTextBoxFlag xmlns:ma14="http://schemas.microsoft.com/office/mac/drawingml/2011/main" xmlns:a14="http://schemas.microsoft.com/office/drawing/2010/main" xmlns:m="http://schemas.openxmlformats.org/officeDocument/2006/math" xmlns="" val="1"/>
             </a:ext>
           </a:extLst>
         </p:spPr>
@@ -18894,7 +18894,7 @@
           </a:ln>
           <a:extLst>
             <a:ext uri="{C572A759-6A51-4108-AA02-DFA0A04FC94B}">
-              <ma14:wrappingTextBoxFlag xmlns="" xmlns:m="http://schemas.openxmlformats.org/officeDocument/2006/math" xmlns:a14="http://schemas.microsoft.com/office/drawing/2010/main" xmlns:ma14="http://schemas.microsoft.com/office/mac/drawingml/2011/main" val="1"/>
+              <ma14:wrappingTextBoxFlag xmlns:ma14="http://schemas.microsoft.com/office/mac/drawingml/2011/main" xmlns:a14="http://schemas.microsoft.com/office/drawing/2010/main" xmlns:m="http://schemas.openxmlformats.org/officeDocument/2006/math" xmlns="" val="1"/>
             </a:ext>
           </a:extLst>
         </p:spPr>
@@ -19032,7 +19032,7 @@
           </a:ln>
           <a:extLst>
             <a:ext uri="{C572A759-6A51-4108-AA02-DFA0A04FC94B}">
-              <ma14:wrappingTextBoxFlag xmlns="" xmlns:m="http://schemas.openxmlformats.org/officeDocument/2006/math" xmlns:a14="http://schemas.microsoft.com/office/drawing/2010/main" xmlns:ma14="http://schemas.microsoft.com/office/mac/drawingml/2011/main" val="1"/>
+              <ma14:wrappingTextBoxFlag xmlns:ma14="http://schemas.microsoft.com/office/mac/drawingml/2011/main" xmlns:a14="http://schemas.microsoft.com/office/drawing/2010/main" xmlns:m="http://schemas.openxmlformats.org/officeDocument/2006/math" xmlns="" val="1"/>
             </a:ext>
           </a:extLst>
         </p:spPr>
@@ -19083,7 +19083,7 @@
           </a:ln>
           <a:extLst>
             <a:ext uri="{C572A759-6A51-4108-AA02-DFA0A04FC94B}">
-              <ma14:wrappingTextBoxFlag xmlns="" xmlns:m="http://schemas.openxmlformats.org/officeDocument/2006/math" xmlns:a14="http://schemas.microsoft.com/office/drawing/2010/main" xmlns:ma14="http://schemas.microsoft.com/office/mac/drawingml/2011/main" val="1"/>
+              <ma14:wrappingTextBoxFlag xmlns:ma14="http://schemas.microsoft.com/office/mac/drawingml/2011/main" xmlns:a14="http://schemas.microsoft.com/office/drawing/2010/main" xmlns:m="http://schemas.openxmlformats.org/officeDocument/2006/math" xmlns="" val="1"/>
             </a:ext>
           </a:extLst>
         </p:spPr>
@@ -19130,7 +19130,7 @@
           </a:ln>
           <a:extLst>
             <a:ext uri="{C572A759-6A51-4108-AA02-DFA0A04FC94B}">
-              <ma14:wrappingTextBoxFlag xmlns="" xmlns:m="http://schemas.openxmlformats.org/officeDocument/2006/math" xmlns:a14="http://schemas.microsoft.com/office/drawing/2010/main" xmlns:ma14="http://schemas.microsoft.com/office/mac/drawingml/2011/main" val="1"/>
+              <ma14:wrappingTextBoxFlag xmlns:ma14="http://schemas.microsoft.com/office/mac/drawingml/2011/main" xmlns:a14="http://schemas.microsoft.com/office/drawing/2010/main" xmlns:m="http://schemas.openxmlformats.org/officeDocument/2006/math" xmlns="" val="1"/>
             </a:ext>
           </a:extLst>
         </p:spPr>
@@ -19208,7 +19208,7 @@
           </a:ln>
           <a:extLst>
             <a:ext uri="{C572A759-6A51-4108-AA02-DFA0A04FC94B}">
-              <ma14:wrappingTextBoxFlag xmlns="" xmlns:m="http://schemas.openxmlformats.org/officeDocument/2006/math" xmlns:a14="http://schemas.microsoft.com/office/drawing/2010/main" xmlns:ma14="http://schemas.microsoft.com/office/mac/drawingml/2011/main" val="1"/>
+              <ma14:wrappingTextBoxFlag xmlns:ma14="http://schemas.microsoft.com/office/mac/drawingml/2011/main" xmlns:a14="http://schemas.microsoft.com/office/drawing/2010/main" xmlns:m="http://schemas.openxmlformats.org/officeDocument/2006/math" xmlns="" val="1"/>
             </a:ext>
           </a:extLst>
         </p:spPr>
@@ -19321,7 +19321,7 @@
           </a:ln>
           <a:extLst>
             <a:ext uri="{C572A759-6A51-4108-AA02-DFA0A04FC94B}">
-              <ma14:wrappingTextBoxFlag xmlns="" xmlns:m="http://schemas.openxmlformats.org/officeDocument/2006/math" xmlns:a14="http://schemas.microsoft.com/office/drawing/2010/main" xmlns:ma14="http://schemas.microsoft.com/office/mac/drawingml/2011/main" val="1"/>
+              <ma14:wrappingTextBoxFlag xmlns:ma14="http://schemas.microsoft.com/office/mac/drawingml/2011/main" xmlns:a14="http://schemas.microsoft.com/office/drawing/2010/main" xmlns:m="http://schemas.openxmlformats.org/officeDocument/2006/math" xmlns="" val="1"/>
             </a:ext>
           </a:extLst>
         </p:spPr>
@@ -19459,7 +19459,7 @@
           </a:ln>
           <a:extLst>
             <a:ext uri="{C572A759-6A51-4108-AA02-DFA0A04FC94B}">
-              <ma14:wrappingTextBoxFlag xmlns="" xmlns:m="http://schemas.openxmlformats.org/officeDocument/2006/math" xmlns:a14="http://schemas.microsoft.com/office/drawing/2010/main" xmlns:ma14="http://schemas.microsoft.com/office/mac/drawingml/2011/main" val="1"/>
+              <ma14:wrappingTextBoxFlag xmlns:ma14="http://schemas.microsoft.com/office/mac/drawingml/2011/main" xmlns:a14="http://schemas.microsoft.com/office/drawing/2010/main" xmlns:m="http://schemas.openxmlformats.org/officeDocument/2006/math" xmlns="" val="1"/>
             </a:ext>
           </a:extLst>
         </p:spPr>
@@ -19510,7 +19510,7 @@
           </a:ln>
           <a:extLst>
             <a:ext uri="{C572A759-6A51-4108-AA02-DFA0A04FC94B}">
-              <ma14:wrappingTextBoxFlag xmlns="" xmlns:m="http://schemas.openxmlformats.org/officeDocument/2006/math" xmlns:a14="http://schemas.microsoft.com/office/drawing/2010/main" xmlns:ma14="http://schemas.microsoft.com/office/mac/drawingml/2011/main" val="1"/>
+              <ma14:wrappingTextBoxFlag xmlns:ma14="http://schemas.microsoft.com/office/mac/drawingml/2011/main" xmlns:a14="http://schemas.microsoft.com/office/drawing/2010/main" xmlns:m="http://schemas.openxmlformats.org/officeDocument/2006/math" xmlns="" val="1"/>
             </a:ext>
           </a:extLst>
         </p:spPr>
@@ -19601,7 +19601,7 @@
           </a:ln>
           <a:extLst>
             <a:ext uri="{C572A759-6A51-4108-AA02-DFA0A04FC94B}">
-              <ma14:wrappingTextBoxFlag xmlns="" xmlns:m="http://schemas.openxmlformats.org/officeDocument/2006/math" xmlns:a14="http://schemas.microsoft.com/office/drawing/2010/main" xmlns:ma14="http://schemas.microsoft.com/office/mac/drawingml/2011/main" val="1"/>
+              <ma14:wrappingTextBoxFlag xmlns:ma14="http://schemas.microsoft.com/office/mac/drawingml/2011/main" xmlns:a14="http://schemas.microsoft.com/office/drawing/2010/main" xmlns:m="http://schemas.openxmlformats.org/officeDocument/2006/math" xmlns="" val="1"/>
             </a:ext>
           </a:extLst>
         </p:spPr>
@@ -19648,7 +19648,7 @@
           </a:ln>
           <a:extLst>
             <a:ext uri="{C572A759-6A51-4108-AA02-DFA0A04FC94B}">
-              <ma14:wrappingTextBoxFlag xmlns="" xmlns:m="http://schemas.openxmlformats.org/officeDocument/2006/math" xmlns:a14="http://schemas.microsoft.com/office/drawing/2010/main" xmlns:ma14="http://schemas.microsoft.com/office/mac/drawingml/2011/main" val="1"/>
+              <ma14:wrappingTextBoxFlag xmlns:ma14="http://schemas.microsoft.com/office/mac/drawingml/2011/main" xmlns:a14="http://schemas.microsoft.com/office/drawing/2010/main" xmlns:m="http://schemas.openxmlformats.org/officeDocument/2006/math" xmlns="" val="1"/>
             </a:ext>
           </a:extLst>
         </p:spPr>
@@ -19722,7 +19722,7 @@
           </a:ln>
           <a:extLst>
             <a:ext uri="{C572A759-6A51-4108-AA02-DFA0A04FC94B}">
-              <ma14:wrappingTextBoxFlag xmlns="" xmlns:m="http://schemas.openxmlformats.org/officeDocument/2006/math" xmlns:a14="http://schemas.microsoft.com/office/drawing/2010/main" xmlns:ma14="http://schemas.microsoft.com/office/mac/drawingml/2011/main" val="1"/>
+              <ma14:wrappingTextBoxFlag xmlns:ma14="http://schemas.microsoft.com/office/mac/drawingml/2011/main" xmlns:a14="http://schemas.microsoft.com/office/drawing/2010/main" xmlns:m="http://schemas.openxmlformats.org/officeDocument/2006/math" xmlns="" val="1"/>
             </a:ext>
           </a:extLst>
         </p:spPr>
@@ -19835,7 +19835,7 @@
           </a:ln>
           <a:extLst>
             <a:ext uri="{C572A759-6A51-4108-AA02-DFA0A04FC94B}">
-              <ma14:wrappingTextBoxFlag xmlns="" xmlns:m="http://schemas.openxmlformats.org/officeDocument/2006/math" xmlns:a14="http://schemas.microsoft.com/office/drawing/2010/main" xmlns:ma14="http://schemas.microsoft.com/office/mac/drawingml/2011/main" val="1"/>
+              <ma14:wrappingTextBoxFlag xmlns:ma14="http://schemas.microsoft.com/office/mac/drawingml/2011/main" xmlns:a14="http://schemas.microsoft.com/office/drawing/2010/main" xmlns:m="http://schemas.openxmlformats.org/officeDocument/2006/math" xmlns="" val="1"/>
             </a:ext>
           </a:extLst>
         </p:spPr>
@@ -19973,7 +19973,7 @@
           </a:ln>
           <a:extLst>
             <a:ext uri="{C572A759-6A51-4108-AA02-DFA0A04FC94B}">
-              <ma14:wrappingTextBoxFlag xmlns="" xmlns:m="http://schemas.openxmlformats.org/officeDocument/2006/math" xmlns:a14="http://schemas.microsoft.com/office/drawing/2010/main" xmlns:ma14="http://schemas.microsoft.com/office/mac/drawingml/2011/main" val="1"/>
+              <ma14:wrappingTextBoxFlag xmlns:ma14="http://schemas.microsoft.com/office/mac/drawingml/2011/main" xmlns:a14="http://schemas.microsoft.com/office/drawing/2010/main" xmlns:m="http://schemas.openxmlformats.org/officeDocument/2006/math" xmlns="" val="1"/>
             </a:ext>
           </a:extLst>
         </p:spPr>
@@ -20024,7 +20024,7 @@
           </a:ln>
           <a:extLst>
             <a:ext uri="{C572A759-6A51-4108-AA02-DFA0A04FC94B}">
-              <ma14:wrappingTextBoxFlag xmlns="" xmlns:m="http://schemas.openxmlformats.org/officeDocument/2006/math" xmlns:a14="http://schemas.microsoft.com/office/drawing/2010/main" xmlns:ma14="http://schemas.microsoft.com/office/mac/drawingml/2011/main" val="1"/>
+              <ma14:wrappingTextBoxFlag xmlns:ma14="http://schemas.microsoft.com/office/mac/drawingml/2011/main" xmlns:a14="http://schemas.microsoft.com/office/drawing/2010/main" xmlns:m="http://schemas.openxmlformats.org/officeDocument/2006/math" xmlns="" val="1"/>
             </a:ext>
           </a:extLst>
         </p:spPr>
@@ -20075,7 +20075,7 @@
           </a:ln>
           <a:extLst>
             <a:ext uri="{C572A759-6A51-4108-AA02-DFA0A04FC94B}">
-              <ma14:wrappingTextBoxFlag xmlns="" xmlns:m="http://schemas.openxmlformats.org/officeDocument/2006/math" xmlns:a14="http://schemas.microsoft.com/office/drawing/2010/main" xmlns:ma14="http://schemas.microsoft.com/office/mac/drawingml/2011/main" val="1"/>
+              <ma14:wrappingTextBoxFlag xmlns:ma14="http://schemas.microsoft.com/office/mac/drawingml/2011/main" xmlns:a14="http://schemas.microsoft.com/office/drawing/2010/main" xmlns:m="http://schemas.openxmlformats.org/officeDocument/2006/math" xmlns="" val="1"/>
             </a:ext>
           </a:extLst>
         </p:spPr>
@@ -20149,7 +20149,7 @@
           </a:ln>
           <a:extLst>
             <a:ext uri="{C572A759-6A51-4108-AA02-DFA0A04FC94B}">
-              <ma14:wrappingTextBoxFlag xmlns="" xmlns:m="http://schemas.openxmlformats.org/officeDocument/2006/math" xmlns:a14="http://schemas.microsoft.com/office/drawing/2010/main" xmlns:ma14="http://schemas.microsoft.com/office/mac/drawingml/2011/main" val="1"/>
+              <ma14:wrappingTextBoxFlag xmlns:ma14="http://schemas.microsoft.com/office/mac/drawingml/2011/main" xmlns:a14="http://schemas.microsoft.com/office/drawing/2010/main" xmlns:m="http://schemas.openxmlformats.org/officeDocument/2006/math" xmlns="" val="1"/>
             </a:ext>
           </a:extLst>
         </p:spPr>
@@ -20280,6 +20280,7 @@
               </a:defRPr>
             </a:pPr>
             <a:r>
+              <a:rPr dirty="0"/>
               <a:t>Goal: write a function to replace curse words with stars</a:t>
             </a:r>
           </a:p>
@@ -20289,6 +20290,7 @@
               <a:buNone/>
             </a:pPr>
             <a:r>
+              <a:rPr dirty="0"/>
               <a:t>Input:</a:t>
             </a:r>
           </a:p>
@@ -20300,6 +20302,7 @@
               <a:defRPr sz="2800"/>
             </a:pPr>
             <a:r>
+              <a:rPr dirty="0"/>
               <a:t>A profane string</a:t>
             </a:r>
           </a:p>
@@ -20309,6 +20312,7 @@
               <a:buNone/>
             </a:pPr>
             <a:r>
+              <a:rPr dirty="0"/>
               <a:t>Output:</a:t>
             </a:r>
           </a:p>
@@ -20320,6 +20324,7 @@
               <a:defRPr sz="2800"/>
             </a:pPr>
             <a:r>
+              <a:rPr dirty="0"/>
               <a:t>A sanitized string</a:t>
             </a:r>
           </a:p>
@@ -20329,35 +20334,70 @@
               <a:buNone/>
             </a:pPr>
             <a:r>
+              <a:rPr dirty="0"/>
               <a:t>Example:</a:t>
             </a:r>
-            <a:br/>
             <a:br>
-              <a:rPr sz="2200"/>
+              <a:rPr dirty="0"/>
             </a:br>
-            <a:r>
-              <a:rPr sz="2800"/>
+            <a:br>
+              <a:rPr sz="2200" dirty="0"/>
+            </a:br>
+            <a:r>
+              <a:rPr sz="2800" dirty="0"/>
               <a:t>&gt;&gt;&gt; censor(“OMG this class is so fun”)</a:t>
             </a:r>
             <a:br>
-              <a:rPr sz="2800"/>
+              <a:rPr sz="2800" dirty="0"/>
             </a:br>
             <a:r>
-              <a:rPr sz="2800"/>
+              <a:rPr sz="2800" dirty="0"/>
               <a:t>‘*** this class is so fun’</a:t>
             </a:r>
             <a:br>
-              <a:rPr sz="2800"/>
+              <a:rPr sz="2800" dirty="0"/>
             </a:br>
             <a:r>
-              <a:rPr sz="2800"/>
-              <a:t>&gt;&gt;&gt; censor(“the midterm is darn soon”)</a:t>
+              <a:rPr lang="en-US" sz="2800" dirty="0"/>
+              <a:t>&gt;&gt;&gt; censor(“the </a:t>
+            </a:r>
+            <a:r>
+              <a:rPr lang="en-US" sz="2800" dirty="0">
+                <a:solidFill>
+                  <a:schemeClr val="accent5">
+                    <a:hueOff val="-82419"/>
+                    <a:satOff val="-9513"/>
+                    <a:lumOff val="-16343"/>
+                  </a:schemeClr>
+                </a:solidFill>
+              </a:rPr>
+              <a:t>midterm</a:t>
+            </a:r>
+            <a:r>
+              <a:rPr lang="en-US" sz="2800" dirty="0"/>
+              <a:t> was </a:t>
+            </a:r>
+            <a:r>
+              <a:rPr lang="en-US" sz="2800" dirty="0">
+                <a:solidFill>
+                  <a:schemeClr val="accent5">
+                    <a:hueOff val="-82419"/>
+                    <a:satOff val="-9513"/>
+                    <a:lumOff val="-16343"/>
+                  </a:schemeClr>
+                </a:solidFill>
+              </a:rPr>
+              <a:t>darn</a:t>
+            </a:r>
+            <a:r>
+              <a:rPr lang="en-US" sz="2800" dirty="0"/>
+              <a:t> tough”)</a:t>
             </a:r>
             <a:br>
-              <a:rPr sz="2800"/>
+              <a:rPr sz="2800" dirty="0"/>
             </a:br>
             <a:r>
-              <a:rPr sz="2800"/>
+              <a:rPr sz="2800" dirty="0"/>
               <a:t>‘the ******* was **** tough’</a:t>
             </a:r>
           </a:p>
@@ -20586,7 +20626,15 @@
             </a:r>
             <a:r>
               <a:rPr sz="2800" dirty="0"/>
-              <a:t> is </a:t>
+              <a:t> </a:t>
+            </a:r>
+            <a:r>
+              <a:rPr lang="en-US" sz="2800" dirty="0"/>
+              <a:t>was</a:t>
+            </a:r>
+            <a:r>
+              <a:rPr sz="2800" dirty="0"/>
+              <a:t> </a:t>
             </a:r>
             <a:r>
               <a:rPr sz="2800" dirty="0">
@@ -20602,7 +20650,15 @@
             </a:r>
             <a:r>
               <a:rPr sz="2800" dirty="0"/>
-              <a:t> soon”)</a:t>
+              <a:t> </a:t>
+            </a:r>
+            <a:r>
+              <a:rPr lang="en-US" sz="2800" dirty="0"/>
+              <a:t>tough</a:t>
+            </a:r>
+            <a:r>
+              <a:rPr sz="2800" dirty="0"/>
+              <a:t>”)</a:t>
             </a:r>
             <a:br>
               <a:rPr sz="2800" dirty="0"/>
@@ -20665,7 +20721,7 @@
           </a:ln>
           <a:extLst>
             <a:ext uri="{C572A759-6A51-4108-AA02-DFA0A04FC94B}">
-              <ma14:wrappingTextBoxFlag xmlns="" xmlns:m="http://schemas.openxmlformats.org/officeDocument/2006/math" xmlns:a14="http://schemas.microsoft.com/office/drawing/2010/main" xmlns:ma14="http://schemas.microsoft.com/office/mac/drawingml/2011/main" val="1"/>
+              <ma14:wrappingTextBoxFlag xmlns:ma14="http://schemas.microsoft.com/office/mac/drawingml/2011/main" xmlns:a14="http://schemas.microsoft.com/office/drawing/2010/main" xmlns:m="http://schemas.openxmlformats.org/officeDocument/2006/math" xmlns="" val="1"/>
             </a:ext>
           </a:extLst>
         </p:spPr>
@@ -20943,7 +20999,7 @@
           </a:ln>
           <a:extLst>
             <a:ext uri="{C572A759-6A51-4108-AA02-DFA0A04FC94B}">
-              <ma14:wrappingTextBoxFlag xmlns="" xmlns:m="http://schemas.openxmlformats.org/officeDocument/2006/math" xmlns:a14="http://schemas.microsoft.com/office/drawing/2010/main" xmlns:ma14="http://schemas.microsoft.com/office/mac/drawingml/2011/main" val="1"/>
+              <ma14:wrappingTextBoxFlag xmlns:ma14="http://schemas.microsoft.com/office/mac/drawingml/2011/main" xmlns:a14="http://schemas.microsoft.com/office/drawing/2010/main" xmlns:m="http://schemas.openxmlformats.org/officeDocument/2006/math" xmlns="" val="1"/>
             </a:ext>
           </a:extLst>
         </p:spPr>
@@ -20987,7 +21043,7 @@
           </a:ln>
           <a:extLst>
             <a:ext uri="{C572A759-6A51-4108-AA02-DFA0A04FC94B}">
-              <ma14:wrappingTextBoxFlag xmlns="" xmlns:m="http://schemas.openxmlformats.org/officeDocument/2006/math" xmlns:a14="http://schemas.microsoft.com/office/drawing/2010/main" xmlns:ma14="http://schemas.microsoft.com/office/mac/drawingml/2011/main" val="1"/>
+              <ma14:wrappingTextBoxFlag xmlns:ma14="http://schemas.microsoft.com/office/mac/drawingml/2011/main" xmlns:a14="http://schemas.microsoft.com/office/drawing/2010/main" xmlns:m="http://schemas.openxmlformats.org/officeDocument/2006/math" xmlns="" val="1"/>
             </a:ext>
           </a:extLst>
         </p:spPr>
@@ -21305,7 +21361,7 @@
           </a:ln>
           <a:extLst>
             <a:ext uri="{C572A759-6A51-4108-AA02-DFA0A04FC94B}">
-              <ma14:wrappingTextBoxFlag xmlns="" xmlns:m="http://schemas.openxmlformats.org/officeDocument/2006/math" xmlns:a14="http://schemas.microsoft.com/office/drawing/2010/main" xmlns:ma14="http://schemas.microsoft.com/office/mac/drawingml/2011/main" val="1"/>
+              <ma14:wrappingTextBoxFlag xmlns:ma14="http://schemas.microsoft.com/office/mac/drawingml/2011/main" xmlns:a14="http://schemas.microsoft.com/office/drawing/2010/main" xmlns:m="http://schemas.openxmlformats.org/officeDocument/2006/math" xmlns="" val="1"/>
             </a:ext>
           </a:extLst>
         </p:spPr>
@@ -21361,7 +21417,7 @@
           </a:ln>
           <a:extLst>
             <a:ext uri="{C572A759-6A51-4108-AA02-DFA0A04FC94B}">
-              <ma14:wrappingTextBoxFlag xmlns="" xmlns:m="http://schemas.openxmlformats.org/officeDocument/2006/math" xmlns:a14="http://schemas.microsoft.com/office/drawing/2010/main" xmlns:ma14="http://schemas.microsoft.com/office/mac/drawingml/2011/main" val="1"/>
+              <ma14:wrappingTextBoxFlag xmlns:ma14="http://schemas.microsoft.com/office/mac/drawingml/2011/main" xmlns:a14="http://schemas.microsoft.com/office/drawing/2010/main" xmlns:m="http://schemas.openxmlformats.org/officeDocument/2006/math" xmlns="" val="1"/>
             </a:ext>
           </a:extLst>
         </p:spPr>
@@ -21517,7 +21573,7 @@
           </a:ln>
           <a:extLst>
             <a:ext uri="{C572A759-6A51-4108-AA02-DFA0A04FC94B}">
-              <ma14:wrappingTextBoxFlag xmlns="" xmlns:m="http://schemas.openxmlformats.org/officeDocument/2006/math" xmlns:a14="http://schemas.microsoft.com/office/drawing/2010/main" xmlns:ma14="http://schemas.microsoft.com/office/mac/drawingml/2011/main" val="1"/>
+              <ma14:wrappingTextBoxFlag xmlns:ma14="http://schemas.microsoft.com/office/mac/drawingml/2011/main" xmlns:a14="http://schemas.microsoft.com/office/drawing/2010/main" xmlns:m="http://schemas.openxmlformats.org/officeDocument/2006/math" xmlns="" val="1"/>
             </a:ext>
           </a:extLst>
         </p:spPr>
@@ -21586,7 +21642,7 @@
           </a:ln>
           <a:extLst>
             <a:ext uri="{C572A759-6A51-4108-AA02-DFA0A04FC94B}">
-              <ma14:wrappingTextBoxFlag xmlns="" xmlns:m="http://schemas.openxmlformats.org/officeDocument/2006/math" xmlns:a14="http://schemas.microsoft.com/office/drawing/2010/main" xmlns:ma14="http://schemas.microsoft.com/office/mac/drawingml/2011/main" val="1"/>
+              <ma14:wrappingTextBoxFlag xmlns:ma14="http://schemas.microsoft.com/office/mac/drawingml/2011/main" xmlns:a14="http://schemas.microsoft.com/office/drawing/2010/main" xmlns:m="http://schemas.openxmlformats.org/officeDocument/2006/math" xmlns="" val="1"/>
             </a:ext>
           </a:extLst>
         </p:spPr>
@@ -21742,7 +21798,7 @@
           </a:ln>
           <a:extLst>
             <a:ext uri="{C572A759-6A51-4108-AA02-DFA0A04FC94B}">
-              <ma14:wrappingTextBoxFlag xmlns="" xmlns:m="http://schemas.openxmlformats.org/officeDocument/2006/math" xmlns:a14="http://schemas.microsoft.com/office/drawing/2010/main" xmlns:ma14="http://schemas.microsoft.com/office/mac/drawingml/2011/main" val="1"/>
+              <ma14:wrappingTextBoxFlag xmlns:ma14="http://schemas.microsoft.com/office/mac/drawingml/2011/main" xmlns:a14="http://schemas.microsoft.com/office/drawing/2010/main" xmlns:m="http://schemas.openxmlformats.org/officeDocument/2006/math" xmlns="" val="1"/>
             </a:ext>
           </a:extLst>
         </p:spPr>
@@ -21824,7 +21880,7 @@
           </a:ln>
           <a:extLst>
             <a:ext uri="{C572A759-6A51-4108-AA02-DFA0A04FC94B}">
-              <ma14:wrappingTextBoxFlag xmlns="" xmlns:m="http://schemas.openxmlformats.org/officeDocument/2006/math" xmlns:a14="http://schemas.microsoft.com/office/drawing/2010/main" xmlns:ma14="http://schemas.microsoft.com/office/mac/drawingml/2011/main" val="1"/>
+              <ma14:wrappingTextBoxFlag xmlns:ma14="http://schemas.microsoft.com/office/mac/drawingml/2011/main" xmlns:a14="http://schemas.microsoft.com/office/drawing/2010/main" xmlns:m="http://schemas.openxmlformats.org/officeDocument/2006/math" xmlns="" val="1"/>
             </a:ext>
           </a:extLst>
         </p:spPr>
@@ -21980,7 +22036,7 @@
           </a:ln>
           <a:extLst>
             <a:ext uri="{C572A759-6A51-4108-AA02-DFA0A04FC94B}">
-              <ma14:wrappingTextBoxFlag xmlns="" xmlns:m="http://schemas.openxmlformats.org/officeDocument/2006/math" xmlns:a14="http://schemas.microsoft.com/office/drawing/2010/main" xmlns:ma14="http://schemas.microsoft.com/office/mac/drawingml/2011/main" val="1"/>
+              <ma14:wrappingTextBoxFlag xmlns:ma14="http://schemas.microsoft.com/office/mac/drawingml/2011/main" xmlns:a14="http://schemas.microsoft.com/office/drawing/2010/main" xmlns:m="http://schemas.openxmlformats.org/officeDocument/2006/math" xmlns="" val="1"/>
             </a:ext>
           </a:extLst>
         </p:spPr>
@@ -22075,7 +22131,7 @@
           </a:ln>
           <a:extLst>
             <a:ext uri="{C572A759-6A51-4108-AA02-DFA0A04FC94B}">
-              <ma14:wrappingTextBoxFlag xmlns="" xmlns:m="http://schemas.openxmlformats.org/officeDocument/2006/math" xmlns:a14="http://schemas.microsoft.com/office/drawing/2010/main" xmlns:ma14="http://schemas.microsoft.com/office/mac/drawingml/2011/main" val="1"/>
+              <ma14:wrappingTextBoxFlag xmlns:ma14="http://schemas.microsoft.com/office/mac/drawingml/2011/main" xmlns:a14="http://schemas.microsoft.com/office/drawing/2010/main" xmlns:m="http://schemas.openxmlformats.org/officeDocument/2006/math" xmlns="" val="1"/>
             </a:ext>
           </a:extLst>
         </p:spPr>

</xml_diff>